<commit_message>
After session 1 of COACH #6 (summer 2024)
</commit_message>
<xml_diff>
--- a/Lecture Slides/COACH A02 - The AMOS Coach.pptx
+++ b/Lecture Slides/COACH A02 - The AMOS Coach.pptx
@@ -7178,6 +7178,40 @@
             <a:endParaRPr/>
           </a:p>
           <a:p>
+            <a:pPr indent="-317500" lvl="1" marL="914400" rtl="0" algn="l">
+              <a:spcBef>
+                <a:spcPts val="0"/>
+              </a:spcBef>
+              <a:spcAft>
+                <a:spcPts val="0"/>
+              </a:spcAft>
+              <a:buSzPts val="1400"/>
+              <a:buChar char="○"/>
+            </a:pPr>
+            <a:r>
+              <a:rPr lang="en"/>
+              <a:t>Participate in role</a:t>
+            </a:r>
+            <a:endParaRPr/>
+          </a:p>
+          <a:p>
+            <a:pPr indent="-317500" lvl="1" marL="914400" rtl="0" algn="l">
+              <a:spcBef>
+                <a:spcPts val="0"/>
+              </a:spcBef>
+              <a:spcAft>
+                <a:spcPts val="0"/>
+              </a:spcAft>
+              <a:buSzPts val="1400"/>
+              <a:buChar char="○"/>
+            </a:pPr>
+            <a:r>
+              <a:rPr lang="en"/>
+              <a:t>Fill in happiness index</a:t>
+            </a:r>
+            <a:endParaRPr/>
+          </a:p>
+          <a:p>
             <a:pPr indent="-342900" lvl="0" marL="457200" rtl="0" algn="l">
               <a:spcBef>
                 <a:spcPts val="0"/>
@@ -7191,6 +7225,40 @@
             <a:r>
               <a:rPr lang="en"/>
               <a:t>During the sprint</a:t>
+            </a:r>
+            <a:endParaRPr/>
+          </a:p>
+          <a:p>
+            <a:pPr indent="-317500" lvl="1" marL="914400" rtl="0" algn="l">
+              <a:spcBef>
+                <a:spcPts val="0"/>
+              </a:spcBef>
+              <a:spcAft>
+                <a:spcPts val="0"/>
+              </a:spcAft>
+              <a:buSzPts val="1400"/>
+              <a:buChar char="○"/>
+            </a:pPr>
+            <a:r>
+              <a:rPr lang="en"/>
+              <a:t>Perform work</a:t>
+            </a:r>
+            <a:endParaRPr/>
+          </a:p>
+          <a:p>
+            <a:pPr indent="-317500" lvl="1" marL="914400" rtl="0" algn="l">
+              <a:spcBef>
+                <a:spcPts val="0"/>
+              </a:spcBef>
+              <a:spcAft>
+                <a:spcPts val="0"/>
+              </a:spcAft>
+              <a:buSzPts val="1400"/>
+              <a:buChar char="○"/>
+            </a:pPr>
+            <a:r>
+              <a:rPr lang="en"/>
+              <a:t>Write stand-up emails</a:t>
             </a:r>
             <a:endParaRPr/>
           </a:p>
@@ -7909,13 +7977,13 @@
             <a:tbl>
               <a:tblPr>
                 <a:noFill/>
-                <a:tableStyleId>{C0BD8CB2-F7CC-462E-9617-907EAC617CFD}</a:tableStyleId>
+                <a:tableStyleId>{BEA15528-C3AB-4E92-A696-9FBEB04EC074}</a:tableStyleId>
               </a:tblPr>
               <a:tblGrid>
                 <a:gridCol w="1524625"/>
                 <a:gridCol w="7070725"/>
               </a:tblGrid>
-              <a:tr h="522525">
+              <a:tr h="548650">
                 <a:tc>
                   <a:txBody>
                     <a:bodyPr/>
@@ -7931,14 +7999,14 @@
                         <a:buNone/>
                       </a:pPr>
                       <a:r>
-                        <a:rPr b="1" lang="en" sz="1800">
+                        <a:rPr b="1" lang="en">
                           <a:solidFill>
                             <a:schemeClr val="lt1"/>
                           </a:solidFill>
                         </a:rPr>
                         <a:t>Shorthand</a:t>
                       </a:r>
-                      <a:endParaRPr b="1" sz="1800">
+                      <a:endParaRPr b="1">
                         <a:solidFill>
                           <a:schemeClr val="lt1"/>
                         </a:solidFill>
@@ -8002,14 +8070,14 @@
                         <a:buNone/>
                       </a:pPr>
                       <a:r>
-                        <a:rPr b="1" lang="en" sz="1800">
+                        <a:rPr b="1" lang="en">
                           <a:solidFill>
                             <a:schemeClr val="lt1"/>
                           </a:solidFill>
                         </a:rPr>
                         <a:t>Long form</a:t>
                       </a:r>
-                      <a:endParaRPr b="1" sz="1800">
+                      <a:endParaRPr b="1">
                         <a:solidFill>
                           <a:schemeClr val="lt1"/>
                         </a:solidFill>
@@ -8059,7 +8127,7 @@
                   </a:tcPr>
                 </a:tc>
               </a:tr>
-              <a:tr h="522525">
+              <a:tr h="548650">
                 <a:tc>
                   <a:txBody>
                     <a:bodyPr/>
@@ -8075,10 +8143,10 @@
                         <a:buNone/>
                       </a:pPr>
                       <a:r>
-                        <a:rPr lang="en" sz="1800"/>
+                        <a:rPr lang="en"/>
                         <a:t>PO</a:t>
                       </a:r>
-                      <a:endParaRPr sz="1800"/>
+                      <a:endParaRPr/>
                     </a:p>
                   </a:txBody>
                   <a:tcPr marT="91425" marB="91425" marR="91425" marL="91425" anchor="ctr">
@@ -8135,10 +8203,10 @@
                         <a:buNone/>
                       </a:pPr>
                       <a:r>
-                        <a:rPr lang="en" sz="1800"/>
+                        <a:rPr lang="en"/>
                         <a:t>Product owner</a:t>
                       </a:r>
-                      <a:endParaRPr sz="1800"/>
+                      <a:endParaRPr/>
                     </a:p>
                   </a:txBody>
                   <a:tcPr marT="91425" marB="91425" marR="91425" marL="91425" anchor="ctr">
@@ -8181,7 +8249,7 @@
                   </a:tcPr>
                 </a:tc>
               </a:tr>
-              <a:tr h="522525">
+              <a:tr h="548650">
                 <a:tc>
                   <a:txBody>
                     <a:bodyPr/>
@@ -8197,10 +8265,10 @@
                         <a:buNone/>
                       </a:pPr>
                       <a:r>
-                        <a:rPr lang="en" sz="1800"/>
+                        <a:rPr lang="en"/>
                         <a:t>SD</a:t>
                       </a:r>
-                      <a:endParaRPr sz="1800"/>
+                      <a:endParaRPr/>
                     </a:p>
                   </a:txBody>
                   <a:tcPr marT="91425" marB="91425" marR="91425" marL="91425" anchor="ctr">
@@ -8260,10 +8328,10 @@
                         <a:buNone/>
                       </a:pPr>
                       <a:r>
-                        <a:rPr lang="en" sz="1800"/>
+                        <a:rPr lang="en"/>
                         <a:t>Software developer</a:t>
                       </a:r>
-                      <a:endParaRPr sz="1800"/>
+                      <a:endParaRPr/>
                     </a:p>
                   </a:txBody>
                   <a:tcPr marT="91425" marB="91425" marR="91425" marL="91425" anchor="ctr">
@@ -8309,7 +8377,7 @@
                   </a:tcPr>
                 </a:tc>
               </a:tr>
-              <a:tr h="522525">
+              <a:tr h="548650">
                 <a:tc>
                   <a:txBody>
                     <a:bodyPr/>
@@ -8325,10 +8393,10 @@
                         <a:buNone/>
                       </a:pPr>
                       <a:r>
-                        <a:rPr lang="en" sz="1800"/>
+                        <a:rPr lang="en"/>
                         <a:t>SM</a:t>
                       </a:r>
-                      <a:endParaRPr sz="1800"/>
+                      <a:endParaRPr/>
                     </a:p>
                   </a:txBody>
                   <a:tcPr marT="91425" marB="91425" marR="91425" marL="91425" anchor="ctr">
@@ -8388,10 +8456,10 @@
                         <a:buNone/>
                       </a:pPr>
                       <a:r>
-                        <a:rPr lang="en" sz="1800"/>
+                        <a:rPr lang="en"/>
                         <a:t>Scrum master</a:t>
                       </a:r>
-                      <a:endParaRPr sz="1800"/>
+                      <a:endParaRPr/>
                     </a:p>
                   </a:txBody>
                   <a:tcPr marT="91425" marB="91425" marR="91425" marL="91425" anchor="ctr">
@@ -8437,7 +8505,7 @@
                   </a:tcPr>
                 </a:tc>
               </a:tr>
-              <a:tr h="522525">
+              <a:tr h="548650">
                 <a:tc>
                   <a:txBody>
                     <a:bodyPr/>
@@ -8453,10 +8521,10 @@
                         <a:buNone/>
                       </a:pPr>
                       <a:r>
-                        <a:rPr lang="en" sz="1800"/>
+                        <a:rPr lang="en"/>
                         <a:t>TM</a:t>
                       </a:r>
-                      <a:endParaRPr sz="1800"/>
+                      <a:endParaRPr/>
                     </a:p>
                   </a:txBody>
                   <a:tcPr marT="91425" marB="91425" marR="91425" marL="91425" anchor="ctr">
@@ -8516,10 +8584,10 @@
                         <a:buNone/>
                       </a:pPr>
                       <a:r>
-                        <a:rPr lang="en" sz="1800"/>
+                        <a:rPr lang="en"/>
                         <a:t>Team member</a:t>
                       </a:r>
-                      <a:endParaRPr sz="1800"/>
+                      <a:endParaRPr/>
                     </a:p>
                   </a:txBody>
                   <a:tcPr marT="91425" marB="91425" marR="91425" marL="91425" anchor="ctr">
@@ -8565,7 +8633,7 @@
                   </a:tcPr>
                 </a:tc>
               </a:tr>
-              <a:tr h="522525">
+              <a:tr h="548650">
                 <a:tc>
                   <a:txBody>
                     <a:bodyPr/>
@@ -8581,10 +8649,10 @@
                         <a:buNone/>
                       </a:pPr>
                       <a:r>
-                        <a:rPr lang="en" sz="1800"/>
+                        <a:rPr lang="en"/>
                         <a:t>RM</a:t>
                       </a:r>
-                      <a:endParaRPr sz="1800"/>
+                      <a:endParaRPr/>
                     </a:p>
                   </a:txBody>
                   <a:tcPr marT="91425" marB="91425" marR="91425" marL="91425" anchor="ctr">
@@ -8644,10 +8712,10 @@
                         <a:buNone/>
                       </a:pPr>
                       <a:r>
-                        <a:rPr lang="en" sz="1800"/>
+                        <a:rPr lang="en"/>
                         <a:t>Release manager</a:t>
                       </a:r>
-                      <a:endParaRPr sz="1800"/>
+                      <a:endParaRPr/>
                     </a:p>
                   </a:txBody>
                   <a:tcPr marT="91425" marB="91425" marR="91425" marL="91425" anchor="ctr">
@@ -8693,7 +8761,7 @@
                   </a:tcPr>
                 </a:tc>
               </a:tr>
-              <a:tr h="522525">
+              <a:tr h="548650">
                 <a:tc>
                   <a:txBody>
                     <a:bodyPr/>
@@ -8709,10 +8777,10 @@
                         <a:buNone/>
                       </a:pPr>
                       <a:r>
-                        <a:rPr lang="en" sz="1800"/>
+                        <a:rPr lang="en"/>
                         <a:t>HI</a:t>
                       </a:r>
-                      <a:endParaRPr sz="1800"/>
+                      <a:endParaRPr/>
                     </a:p>
                   </a:txBody>
                   <a:tcPr marT="91425" marB="91425" marR="91425" marL="91425" anchor="ctr">
@@ -8772,10 +8840,10 @@
                         <a:buNone/>
                       </a:pPr>
                       <a:r>
-                        <a:rPr lang="en" sz="1800"/>
+                        <a:rPr lang="en"/>
                         <a:t>Happiness index</a:t>
                       </a:r>
-                      <a:endParaRPr sz="1800"/>
+                      <a:endParaRPr/>
                     </a:p>
                   </a:txBody>
                   <a:tcPr marT="91425" marB="91425" marR="91425" marL="91425" anchor="ctr">
@@ -10188,7 +10256,7 @@
             </a:pPr>
             <a:r>
               <a:rPr lang="en"/>
-              <a:t>The agile review</a:t>
+              <a:t>The AMOS agile review</a:t>
             </a:r>
             <a:endParaRPr/>
           </a:p>
@@ -10968,7 +11036,7 @@
             </a:r>
             <a:r>
               <a:rPr lang="en"/>
-              <a:t>. The Agile Review</a:t>
+              <a:t>. The AMOS Agile Review</a:t>
             </a:r>
             <a:endParaRPr/>
           </a:p>
@@ -11033,7 +11101,7 @@
             </a:pPr>
             <a:r>
               <a:rPr lang="en"/>
-              <a:t>Agile Review</a:t>
+              <a:t>The AMOS Agile Review</a:t>
             </a:r>
             <a:endParaRPr/>
           </a:p>
@@ -11142,7 +11210,7 @@
             </a:pPr>
             <a:r>
               <a:rPr lang="en"/>
-              <a:t>(The AMOS) agile review is</a:t>
+              <a:t>The AMOS agile review is</a:t>
             </a:r>
             <a:endParaRPr/>
           </a:p>
@@ -11645,7 +11713,7 @@
             </a:pPr>
             <a:r>
               <a:rPr lang="en"/>
-              <a:t>Usually due at the end of team meeting day</a:t>
+              <a:t>Due (the latest) at the end of team meeting day</a:t>
             </a:r>
             <a:endParaRPr/>
           </a:p>
@@ -12176,7 +12244,7 @@
             </a:pPr>
             <a:r>
               <a:rPr lang="en"/>
-              <a:t>The agile review</a:t>
+              <a:t>The AMOS agile review</a:t>
             </a:r>
             <a:endParaRPr/>
           </a:p>
@@ -12681,7 +12749,7 @@
             </a:pPr>
             <a:r>
               <a:rPr lang="en"/>
-              <a:t>© Copyright 2023 Dirk Riehle, some rights reserved</a:t>
+              <a:t>© Copyright 2024 Dirk Riehle, some rights reserved</a:t>
             </a:r>
             <a:endParaRPr/>
           </a:p>
@@ -12945,11 +13013,7 @@
             </a:r>
             <a:r>
               <a:rPr b="1" lang="en"/>
-              <a:t>AMOS A04 - Project Timeline </a:t>
-            </a:r>
-            <a:r>
-              <a:rPr lang="en"/>
-              <a:t>(no link)</a:t>
+              <a:t>AMOS B02 - Scrum and AMOS</a:t>
             </a:r>
             <a:endParaRPr/>
           </a:p>
@@ -13157,11 +13221,7 @@
             </a:r>
             <a:r>
               <a:rPr b="1" lang="en"/>
-              <a:t>AMOS B02 Scrum and AMOS </a:t>
-            </a:r>
-            <a:r>
-              <a:rPr lang="en"/>
-              <a:t>(no link)</a:t>
+              <a:t>AMOS B02 - Scrum and AMOS</a:t>
             </a:r>
             <a:endParaRPr/>
           </a:p>
@@ -13344,13 +13404,13 @@
             <a:tbl>
               <a:tblPr>
                 <a:noFill/>
-                <a:tableStyleId>{C0BD8CB2-F7CC-462E-9617-907EAC617CFD}</a:tableStyleId>
+                <a:tableStyleId>{BEA15528-C3AB-4E92-A696-9FBEB04EC074}</a:tableStyleId>
               </a:tblPr>
               <a:tblGrid>
                 <a:gridCol w="4297675"/>
                 <a:gridCol w="4297675"/>
               </a:tblGrid>
-              <a:tr h="609600">
+              <a:tr h="548650">
                 <a:tc>
                   <a:txBody>
                     <a:bodyPr/>
@@ -13366,14 +13426,14 @@
                         <a:buNone/>
                       </a:pPr>
                       <a:r>
-                        <a:rPr b="1" lang="en" sz="1800">
+                        <a:rPr b="1" lang="en">
                           <a:solidFill>
                             <a:schemeClr val="lt1"/>
                           </a:solidFill>
                         </a:rPr>
                         <a:t>Assumption</a:t>
                       </a:r>
-                      <a:endParaRPr b="1" sz="1800">
+                      <a:endParaRPr b="1">
                         <a:solidFill>
                           <a:schemeClr val="lt1"/>
                         </a:solidFill>
@@ -13437,14 +13497,14 @@
                         <a:buNone/>
                       </a:pPr>
                       <a:r>
-                        <a:rPr b="1" lang="en" sz="1800">
+                        <a:rPr b="1" lang="en">
                           <a:solidFill>
                             <a:schemeClr val="lt1"/>
                           </a:solidFill>
                         </a:rPr>
                         <a:t>Reality</a:t>
                       </a:r>
-                      <a:endParaRPr b="1" sz="1800">
+                      <a:endParaRPr b="1">
                         <a:solidFill>
                           <a:schemeClr val="lt1"/>
                         </a:solidFill>
@@ -13494,7 +13554,7 @@
                   </a:tcPr>
                 </a:tc>
               </a:tr>
-              <a:tr h="609600">
+              <a:tr h="548650">
                 <a:tc>
                   <a:txBody>
                     <a:bodyPr/>
@@ -13510,10 +13570,10 @@
                         <a:buNone/>
                       </a:pPr>
                       <a:r>
-                        <a:rPr lang="en" sz="1800"/>
+                        <a:rPr lang="en"/>
                         <a:t>Full-time on project</a:t>
                       </a:r>
-                      <a:endParaRPr sz="1800"/>
+                      <a:endParaRPr/>
                     </a:p>
                   </a:txBody>
                   <a:tcPr marT="91425" marB="91425" marR="91425" marL="91425" anchor="ctr">
@@ -13573,10 +13633,10 @@
                         <a:buNone/>
                       </a:pPr>
                       <a:r>
-                        <a:rPr lang="en" sz="1800"/>
+                        <a:rPr lang="en"/>
                         <a:t>Part-time (⅓ of weekly work)</a:t>
                       </a:r>
-                      <a:endParaRPr sz="1800"/>
+                      <a:endParaRPr/>
                     </a:p>
                   </a:txBody>
                   <a:tcPr marT="91425" marB="91425" marR="91425" marL="91425" anchor="ctr">
@@ -13622,7 +13682,7 @@
                   </a:tcPr>
                 </a:tc>
               </a:tr>
-              <a:tr h="609600">
+              <a:tr h="548650">
                 <a:tc>
                   <a:txBody>
                     <a:bodyPr/>
@@ -13638,10 +13698,10 @@
                         <a:buNone/>
                       </a:pPr>
                       <a:r>
-                        <a:rPr lang="en" sz="1800"/>
+                        <a:rPr lang="en"/>
                         <a:t>Equal abilities</a:t>
                       </a:r>
-                      <a:endParaRPr sz="1800"/>
+                      <a:endParaRPr/>
                     </a:p>
                   </a:txBody>
                   <a:tcPr marT="91425" marB="91425" marR="91425" marL="91425" anchor="ctr">
@@ -13701,10 +13761,10 @@
                         <a:buNone/>
                       </a:pPr>
                       <a:r>
-                        <a:rPr lang="en" sz="1800"/>
+                        <a:rPr lang="en"/>
                         <a:t>Abilities can vary greatly</a:t>
                       </a:r>
-                      <a:endParaRPr sz="1800"/>
+                      <a:endParaRPr/>
                     </a:p>
                   </a:txBody>
                   <a:tcPr marT="91425" marB="91425" marR="91425" marL="91425" anchor="ctr">
@@ -13750,7 +13810,7 @@
                   </a:tcPr>
                 </a:tc>
               </a:tr>
-              <a:tr h="609600">
+              <a:tr h="548650">
                 <a:tc>
                   <a:txBody>
                     <a:bodyPr/>
@@ -13766,10 +13826,10 @@
                         <a:buNone/>
                       </a:pPr>
                       <a:r>
-                        <a:rPr lang="en" sz="1800"/>
-                        <a:t>Intrinsic motivation</a:t>
+                        <a:rPr lang="en"/>
+                        <a:t>Some extrinsic motivation</a:t>
                       </a:r>
-                      <a:endParaRPr sz="1800"/>
+                      <a:endParaRPr/>
                     </a:p>
                   </a:txBody>
                   <a:tcPr marT="91425" marB="91425" marR="91425" marL="91425" anchor="ctr">
@@ -13829,10 +13889,10 @@
                         <a:buNone/>
                       </a:pPr>
                       <a:r>
-                        <a:rPr lang="en" sz="1800"/>
-                        <a:t>Extrinsic motivation (grades)</a:t>
+                        <a:rPr lang="en"/>
+                        <a:t>Short-term extrinsic motivation (grades)</a:t>
                       </a:r>
-                      <a:endParaRPr sz="1800"/>
+                      <a:endParaRPr/>
                     </a:p>
                   </a:txBody>
                   <a:tcPr marT="91425" marB="91425" marR="91425" marL="91425" anchor="ctr">
@@ -13878,7 +13938,7 @@
                   </a:tcPr>
                 </a:tc>
               </a:tr>
-              <a:tr h="609600">
+              <a:tr h="548650">
                 <a:tc>
                   <a:txBody>
                     <a:bodyPr/>
@@ -13894,14 +13954,14 @@
                         <a:buNone/>
                       </a:pPr>
                       <a:r>
-                        <a:rPr lang="en" sz="1800"/>
+                        <a:rPr lang="en"/>
                         <a:t>Long</a:t>
                       </a:r>
                       <a:r>
-                        <a:rPr lang="en" sz="1800"/>
+                        <a:rPr lang="en"/>
                         <a:t>-term perspective</a:t>
                       </a:r>
-                      <a:endParaRPr sz="1800"/>
+                      <a:endParaRPr/>
                     </a:p>
                   </a:txBody>
                   <a:tcPr marT="91425" marB="91425" marR="91425" marL="91425" anchor="ctr">
@@ -13961,10 +14021,10 @@
                         <a:buNone/>
                       </a:pPr>
                       <a:r>
-                        <a:rPr lang="en" sz="1800"/>
+                        <a:rPr lang="en"/>
                         <a:t>Teams disband after project</a:t>
                       </a:r>
-                      <a:endParaRPr sz="1800"/>
+                      <a:endParaRPr/>
                     </a:p>
                   </a:txBody>
                   <a:tcPr marT="91425" marB="91425" marR="91425" marL="91425" anchor="ctr">
@@ -14010,7 +14070,7 @@
                   </a:tcPr>
                 </a:tc>
               </a:tr>
-              <a:tr h="609600">
+              <a:tr h="548650">
                 <a:tc>
                   <a:txBody>
                     <a:bodyPr/>
@@ -14026,10 +14086,10 @@
                         <a:buNone/>
                       </a:pPr>
                       <a:r>
-                        <a:rPr lang="en" sz="1800"/>
+                        <a:rPr lang="en"/>
                         <a:t>General familiarity</a:t>
                       </a:r>
-                      <a:endParaRPr sz="1800"/>
+                      <a:endParaRPr/>
                     </a:p>
                   </a:txBody>
                   <a:tcPr marT="91425" marB="91425" marR="91425" marL="91425" anchor="ctr">
@@ -14089,10 +14149,10 @@
                         <a:buNone/>
                       </a:pPr>
                       <a:r>
-                        <a:rPr lang="en" sz="1800"/>
+                        <a:rPr lang="en"/>
                         <a:t>May never have met before</a:t>
                       </a:r>
-                      <a:endParaRPr sz="1800"/>
+                      <a:endParaRPr/>
                     </a:p>
                   </a:txBody>
                   <a:tcPr marT="91425" marB="91425" marR="91425" marL="91425" anchor="ctr">
@@ -15401,6 +15461,285 @@
 </file>
 
 <file path=ppt/theme/theme1.xml><?xml version="1.0" encoding="utf-8"?>
+<a:theme xmlns:a="http://schemas.openxmlformats.org/drawingml/2006/main" xmlns:r="http://schemas.openxmlformats.org/officeDocument/2006/relationships">
+  <a:themeElements>
+    <a:clrScheme name="Default">
+      <a:dk1>
+        <a:srgbClr val="000000"/>
+      </a:dk1>
+      <a:lt1>
+        <a:srgbClr val="FFFFFF"/>
+      </a:lt1>
+      <a:dk2>
+        <a:srgbClr val="158158"/>
+      </a:dk2>
+      <a:lt2>
+        <a:srgbClr val="F3F3F3"/>
+      </a:lt2>
+      <a:accent1>
+        <a:srgbClr val="058DC7"/>
+      </a:accent1>
+      <a:accent2>
+        <a:srgbClr val="50B432"/>
+      </a:accent2>
+      <a:accent3>
+        <a:srgbClr val="ED561B"/>
+      </a:accent3>
+      <a:accent4>
+        <a:srgbClr val="EDEF00"/>
+      </a:accent4>
+      <a:accent5>
+        <a:srgbClr val="24CBE5"/>
+      </a:accent5>
+      <a:accent6>
+        <a:srgbClr val="64E572"/>
+      </a:accent6>
+      <a:hlink>
+        <a:srgbClr val="2200CC"/>
+      </a:hlink>
+      <a:folHlink>
+        <a:srgbClr val="551A8B"/>
+      </a:folHlink>
+    </a:clrScheme>
+    <a:fontScheme name="Office">
+      <a:majorFont>
+        <a:latin typeface="Arial"/>
+        <a:ea typeface=""/>
+        <a:cs typeface=""/>
+        <a:font script="Jpan" typeface="ＭＳ Ｐゴシック"/>
+        <a:font script="Hang" typeface="맑은 고딕"/>
+        <a:font script="Hans" typeface="宋体"/>
+        <a:font script="Hant" typeface="新細明體"/>
+        <a:font script="Arab" typeface="Times New Roman"/>
+        <a:font script="Hebr" typeface="Times New Roman"/>
+        <a:font script="Thai" typeface="Angsana New"/>
+        <a:font script="Ethi" typeface="Nyala"/>
+        <a:font script="Beng" typeface="Vrinda"/>
+        <a:font script="Gujr" typeface="Shruti"/>
+        <a:font script="Khmr" typeface="MoolBoran"/>
+        <a:font script="Knda" typeface="Tunga"/>
+        <a:font script="Guru" typeface="Raavi"/>
+        <a:font script="Cans" typeface="Euphemia"/>
+        <a:font script="Cher" typeface="Plantagenet Cherokee"/>
+        <a:font script="Yiii" typeface="Microsoft Yi Baiti"/>
+        <a:font script="Tibt" typeface="Microsoft Himalaya"/>
+        <a:font script="Thaa" typeface="MV Boli"/>
+        <a:font script="Deva" typeface="Mangal"/>
+        <a:font script="Telu" typeface="Gautami"/>
+        <a:font script="Taml" typeface="Latha"/>
+        <a:font script="Syrc" typeface="Estrangelo Edessa"/>
+        <a:font script="Orya" typeface="Kalinga"/>
+        <a:font script="Mlym" typeface="Kartika"/>
+        <a:font script="Laoo" typeface="DokChampa"/>
+        <a:font script="Sinh" typeface="Iskoola Pota"/>
+        <a:font script="Mong" typeface="Mongolian Baiti"/>
+        <a:font script="Viet" typeface="Times New Roman"/>
+        <a:font script="Uigh" typeface="Microsoft Uighur"/>
+        <a:font script="Geor" typeface="Sylfaen"/>
+      </a:majorFont>
+      <a:minorFont>
+        <a:latin typeface="Arial"/>
+        <a:ea typeface=""/>
+        <a:cs typeface=""/>
+        <a:font script="Jpan" typeface="ＭＳ Ｐゴシック"/>
+        <a:font script="Hang" typeface="맑은 고딕"/>
+        <a:font script="Hans" typeface="宋体"/>
+        <a:font script="Hant" typeface="新細明體"/>
+        <a:font script="Arab" typeface="Arial"/>
+        <a:font script="Hebr" typeface="Arial"/>
+        <a:font script="Thai" typeface="Cordia New"/>
+        <a:font script="Ethi" typeface="Nyala"/>
+        <a:font script="Beng" typeface="Vrinda"/>
+        <a:font script="Gujr" typeface="Shruti"/>
+        <a:font script="Khmr" typeface="DaunPenh"/>
+        <a:font script="Knda" typeface="Tunga"/>
+        <a:font script="Guru" typeface="Raavi"/>
+        <a:font script="Cans" typeface="Euphemia"/>
+        <a:font script="Cher" typeface="Plantagenet Cherokee"/>
+        <a:font script="Yiii" typeface="Microsoft Yi Baiti"/>
+        <a:font script="Tibt" typeface="Microsoft Himalaya"/>
+        <a:font script="Thaa" typeface="MV Boli"/>
+        <a:font script="Deva" typeface="Mangal"/>
+        <a:font script="Telu" typeface="Gautami"/>
+        <a:font script="Taml" typeface="Latha"/>
+        <a:font script="Syrc" typeface="Estrangelo Edessa"/>
+        <a:font script="Orya" typeface="Kalinga"/>
+        <a:font script="Mlym" typeface="Kartika"/>
+        <a:font script="Laoo" typeface="DokChampa"/>
+        <a:font script="Sinh" typeface="Iskoola Pota"/>
+        <a:font script="Mong" typeface="Mongolian Baiti"/>
+        <a:font script="Viet" typeface="Arial"/>
+        <a:font script="Uigh" typeface="Microsoft Uighur"/>
+        <a:font script="Geor" typeface="Sylfaen"/>
+      </a:minorFont>
+    </a:fontScheme>
+    <a:fmtScheme name="Office">
+      <a:fillStyleLst>
+        <a:solidFill>
+          <a:schemeClr val="phClr"/>
+        </a:solidFill>
+        <a:gradFill rotWithShape="1">
+          <a:gsLst>
+            <a:gs pos="0">
+              <a:schemeClr val="phClr">
+                <a:tint val="50000"/>
+                <a:satMod val="300000"/>
+              </a:schemeClr>
+            </a:gs>
+            <a:gs pos="35000">
+              <a:schemeClr val="phClr">
+                <a:tint val="37000"/>
+                <a:satMod val="300000"/>
+              </a:schemeClr>
+            </a:gs>
+            <a:gs pos="100000">
+              <a:schemeClr val="phClr">
+                <a:tint val="15000"/>
+                <a:satMod val="350000"/>
+              </a:schemeClr>
+            </a:gs>
+          </a:gsLst>
+          <a:lin ang="16200000" scaled="1"/>
+        </a:gradFill>
+        <a:gradFill rotWithShape="1">
+          <a:gsLst>
+            <a:gs pos="0">
+              <a:schemeClr val="phClr">
+                <a:tint val="100000"/>
+                <a:shade val="100000"/>
+                <a:satMod val="130000"/>
+              </a:schemeClr>
+            </a:gs>
+            <a:gs pos="100000">
+              <a:schemeClr val="phClr">
+                <a:tint val="50000"/>
+                <a:shade val="100000"/>
+                <a:satMod val="350000"/>
+              </a:schemeClr>
+            </a:gs>
+          </a:gsLst>
+          <a:lin ang="16200000" scaled="0"/>
+        </a:gradFill>
+      </a:fillStyleLst>
+      <a:lnStyleLst>
+        <a:ln w="9525" cap="flat" cmpd="sng" algn="ctr">
+          <a:solidFill>
+            <a:schemeClr val="phClr">
+              <a:shade val="95000"/>
+              <a:satMod val="105000"/>
+            </a:schemeClr>
+          </a:solidFill>
+          <a:prstDash val="solid"/>
+        </a:ln>
+        <a:ln w="25400" cap="flat" cmpd="sng" algn="ctr">
+          <a:solidFill>
+            <a:schemeClr val="phClr"/>
+          </a:solidFill>
+          <a:prstDash val="solid"/>
+        </a:ln>
+        <a:ln w="38100" cap="flat" cmpd="sng" algn="ctr">
+          <a:solidFill>
+            <a:schemeClr val="phClr"/>
+          </a:solidFill>
+          <a:prstDash val="solid"/>
+        </a:ln>
+      </a:lnStyleLst>
+      <a:effectStyleLst>
+        <a:effectStyle>
+          <a:effectLst>
+            <a:outerShdw blurRad="40000" dist="20000" dir="5400000" rotWithShape="0">
+              <a:srgbClr val="000000">
+                <a:alpha val="38000"/>
+              </a:srgbClr>
+            </a:outerShdw>
+          </a:effectLst>
+        </a:effectStyle>
+        <a:effectStyle>
+          <a:effectLst>
+            <a:outerShdw blurRad="40000" dist="23000" dir="5400000" rotWithShape="0">
+              <a:srgbClr val="000000">
+                <a:alpha val="35000"/>
+              </a:srgbClr>
+            </a:outerShdw>
+          </a:effectLst>
+        </a:effectStyle>
+        <a:effectStyle>
+          <a:effectLst>
+            <a:outerShdw blurRad="40000" dist="23000" dir="5400000" rotWithShape="0">
+              <a:srgbClr val="000000">
+                <a:alpha val="35000"/>
+              </a:srgbClr>
+            </a:outerShdw>
+          </a:effectLst>
+          <a:scene3d>
+            <a:camera prst="orthographicFront">
+              <a:rot lat="0" lon="0" rev="0"/>
+            </a:camera>
+            <a:lightRig rig="threePt" dir="t">
+              <a:rot lat="0" lon="0" rev="1200000"/>
+            </a:lightRig>
+          </a:scene3d>
+          <a:sp3d>
+            <a:bevelT w="63500" h="25400"/>
+          </a:sp3d>
+        </a:effectStyle>
+      </a:effectStyleLst>
+      <a:bgFillStyleLst>
+        <a:solidFill>
+          <a:schemeClr val="phClr"/>
+        </a:solidFill>
+        <a:gradFill rotWithShape="1">
+          <a:gsLst>
+            <a:gs pos="0">
+              <a:schemeClr val="phClr">
+                <a:tint val="40000"/>
+                <a:satMod val="350000"/>
+              </a:schemeClr>
+            </a:gs>
+            <a:gs pos="40000">
+              <a:schemeClr val="phClr">
+                <a:tint val="45000"/>
+                <a:shade val="99000"/>
+                <a:satMod val="350000"/>
+              </a:schemeClr>
+            </a:gs>
+            <a:gs pos="100000">
+              <a:schemeClr val="phClr">
+                <a:shade val="20000"/>
+                <a:satMod val="255000"/>
+              </a:schemeClr>
+            </a:gs>
+          </a:gsLst>
+          <a:path path="circle">
+            <a:fillToRect l="50000" t="-80000" r="50000" b="180000"/>
+          </a:path>
+        </a:gradFill>
+        <a:gradFill rotWithShape="1">
+          <a:gsLst>
+            <a:gs pos="0">
+              <a:schemeClr val="phClr">
+                <a:tint val="80000"/>
+                <a:satMod val="300000"/>
+              </a:schemeClr>
+            </a:gs>
+            <a:gs pos="100000">
+              <a:schemeClr val="phClr">
+                <a:shade val="30000"/>
+                <a:satMod val="200000"/>
+              </a:schemeClr>
+            </a:gs>
+          </a:gsLst>
+          <a:path path="circle">
+            <a:fillToRect l="50000" t="50000" r="50000" b="50000"/>
+          </a:path>
+        </a:gradFill>
+      </a:bgFillStyleLst>
+    </a:fmtScheme>
+  </a:themeElements>
+</a:theme>
+</file>
+
+<file path=ppt/theme/theme2.xml><?xml version="1.0" encoding="utf-8"?>
 <a:theme xmlns:a="http://schemas.openxmlformats.org/drawingml/2006/main" xmlns:r="http://schemas.openxmlformats.org/officeDocument/2006/relationships" name="COACH Slides Template">
   <a:themeElements>
     <a:clrScheme name="Simple Light">
@@ -15677,283 +16016,4 @@
     </a:fmtScheme>
   </a:themeElements>
 </a:theme>
-</file>
-
-<file path=ppt/theme/theme2.xml><?xml version="1.0" encoding="utf-8"?>
-<a:theme xmlns:a="http://schemas.openxmlformats.org/drawingml/2006/main" xmlns:r="http://schemas.openxmlformats.org/officeDocument/2006/relationships">
-  <a:themeElements>
-    <a:clrScheme name="Default">
-      <a:dk1>
-        <a:srgbClr val="000000"/>
-      </a:dk1>
-      <a:lt1>
-        <a:srgbClr val="FFFFFF"/>
-      </a:lt1>
-      <a:dk2>
-        <a:srgbClr val="158158"/>
-      </a:dk2>
-      <a:lt2>
-        <a:srgbClr val="F3F3F3"/>
-      </a:lt2>
-      <a:accent1>
-        <a:srgbClr val="058DC7"/>
-      </a:accent1>
-      <a:accent2>
-        <a:srgbClr val="50B432"/>
-      </a:accent2>
-      <a:accent3>
-        <a:srgbClr val="ED561B"/>
-      </a:accent3>
-      <a:accent4>
-        <a:srgbClr val="EDEF00"/>
-      </a:accent4>
-      <a:accent5>
-        <a:srgbClr val="24CBE5"/>
-      </a:accent5>
-      <a:accent6>
-        <a:srgbClr val="64E572"/>
-      </a:accent6>
-      <a:hlink>
-        <a:srgbClr val="2200CC"/>
-      </a:hlink>
-      <a:folHlink>
-        <a:srgbClr val="551A8B"/>
-      </a:folHlink>
-    </a:clrScheme>
-    <a:fontScheme name="Office">
-      <a:majorFont>
-        <a:latin typeface="Arial"/>
-        <a:ea typeface=""/>
-        <a:cs typeface=""/>
-        <a:font script="Jpan" typeface="ＭＳ Ｐゴシック"/>
-        <a:font script="Hang" typeface="맑은 고딕"/>
-        <a:font script="Hans" typeface="宋体"/>
-        <a:font script="Hant" typeface="新細明體"/>
-        <a:font script="Arab" typeface="Times New Roman"/>
-        <a:font script="Hebr" typeface="Times New Roman"/>
-        <a:font script="Thai" typeface="Angsana New"/>
-        <a:font script="Ethi" typeface="Nyala"/>
-        <a:font script="Beng" typeface="Vrinda"/>
-        <a:font script="Gujr" typeface="Shruti"/>
-        <a:font script="Khmr" typeface="MoolBoran"/>
-        <a:font script="Knda" typeface="Tunga"/>
-        <a:font script="Guru" typeface="Raavi"/>
-        <a:font script="Cans" typeface="Euphemia"/>
-        <a:font script="Cher" typeface="Plantagenet Cherokee"/>
-        <a:font script="Yiii" typeface="Microsoft Yi Baiti"/>
-        <a:font script="Tibt" typeface="Microsoft Himalaya"/>
-        <a:font script="Thaa" typeface="MV Boli"/>
-        <a:font script="Deva" typeface="Mangal"/>
-        <a:font script="Telu" typeface="Gautami"/>
-        <a:font script="Taml" typeface="Latha"/>
-        <a:font script="Syrc" typeface="Estrangelo Edessa"/>
-        <a:font script="Orya" typeface="Kalinga"/>
-        <a:font script="Mlym" typeface="Kartika"/>
-        <a:font script="Laoo" typeface="DokChampa"/>
-        <a:font script="Sinh" typeface="Iskoola Pota"/>
-        <a:font script="Mong" typeface="Mongolian Baiti"/>
-        <a:font script="Viet" typeface="Times New Roman"/>
-        <a:font script="Uigh" typeface="Microsoft Uighur"/>
-        <a:font script="Geor" typeface="Sylfaen"/>
-      </a:majorFont>
-      <a:minorFont>
-        <a:latin typeface="Arial"/>
-        <a:ea typeface=""/>
-        <a:cs typeface=""/>
-        <a:font script="Jpan" typeface="ＭＳ Ｐゴシック"/>
-        <a:font script="Hang" typeface="맑은 고딕"/>
-        <a:font script="Hans" typeface="宋体"/>
-        <a:font script="Hant" typeface="新細明體"/>
-        <a:font script="Arab" typeface="Arial"/>
-        <a:font script="Hebr" typeface="Arial"/>
-        <a:font script="Thai" typeface="Cordia New"/>
-        <a:font script="Ethi" typeface="Nyala"/>
-        <a:font script="Beng" typeface="Vrinda"/>
-        <a:font script="Gujr" typeface="Shruti"/>
-        <a:font script="Khmr" typeface="DaunPenh"/>
-        <a:font script="Knda" typeface="Tunga"/>
-        <a:font script="Guru" typeface="Raavi"/>
-        <a:font script="Cans" typeface="Euphemia"/>
-        <a:font script="Cher" typeface="Plantagenet Cherokee"/>
-        <a:font script="Yiii" typeface="Microsoft Yi Baiti"/>
-        <a:font script="Tibt" typeface="Microsoft Himalaya"/>
-        <a:font script="Thaa" typeface="MV Boli"/>
-        <a:font script="Deva" typeface="Mangal"/>
-        <a:font script="Telu" typeface="Gautami"/>
-        <a:font script="Taml" typeface="Latha"/>
-        <a:font script="Syrc" typeface="Estrangelo Edessa"/>
-        <a:font script="Orya" typeface="Kalinga"/>
-        <a:font script="Mlym" typeface="Kartika"/>
-        <a:font script="Laoo" typeface="DokChampa"/>
-        <a:font script="Sinh" typeface="Iskoola Pota"/>
-        <a:font script="Mong" typeface="Mongolian Baiti"/>
-        <a:font script="Viet" typeface="Arial"/>
-        <a:font script="Uigh" typeface="Microsoft Uighur"/>
-        <a:font script="Geor" typeface="Sylfaen"/>
-      </a:minorFont>
-    </a:fontScheme>
-    <a:fmtScheme name="Office">
-      <a:fillStyleLst>
-        <a:solidFill>
-          <a:schemeClr val="phClr"/>
-        </a:solidFill>
-        <a:gradFill rotWithShape="1">
-          <a:gsLst>
-            <a:gs pos="0">
-              <a:schemeClr val="phClr">
-                <a:tint val="50000"/>
-                <a:satMod val="300000"/>
-              </a:schemeClr>
-            </a:gs>
-            <a:gs pos="35000">
-              <a:schemeClr val="phClr">
-                <a:tint val="37000"/>
-                <a:satMod val="300000"/>
-              </a:schemeClr>
-            </a:gs>
-            <a:gs pos="100000">
-              <a:schemeClr val="phClr">
-                <a:tint val="15000"/>
-                <a:satMod val="350000"/>
-              </a:schemeClr>
-            </a:gs>
-          </a:gsLst>
-          <a:lin ang="16200000" scaled="1"/>
-        </a:gradFill>
-        <a:gradFill rotWithShape="1">
-          <a:gsLst>
-            <a:gs pos="0">
-              <a:schemeClr val="phClr">
-                <a:tint val="100000"/>
-                <a:shade val="100000"/>
-                <a:satMod val="130000"/>
-              </a:schemeClr>
-            </a:gs>
-            <a:gs pos="100000">
-              <a:schemeClr val="phClr">
-                <a:tint val="50000"/>
-                <a:shade val="100000"/>
-                <a:satMod val="350000"/>
-              </a:schemeClr>
-            </a:gs>
-          </a:gsLst>
-          <a:lin ang="16200000" scaled="0"/>
-        </a:gradFill>
-      </a:fillStyleLst>
-      <a:lnStyleLst>
-        <a:ln w="9525" cap="flat" cmpd="sng" algn="ctr">
-          <a:solidFill>
-            <a:schemeClr val="phClr">
-              <a:shade val="95000"/>
-              <a:satMod val="105000"/>
-            </a:schemeClr>
-          </a:solidFill>
-          <a:prstDash val="solid"/>
-        </a:ln>
-        <a:ln w="25400" cap="flat" cmpd="sng" algn="ctr">
-          <a:solidFill>
-            <a:schemeClr val="phClr"/>
-          </a:solidFill>
-          <a:prstDash val="solid"/>
-        </a:ln>
-        <a:ln w="38100" cap="flat" cmpd="sng" algn="ctr">
-          <a:solidFill>
-            <a:schemeClr val="phClr"/>
-          </a:solidFill>
-          <a:prstDash val="solid"/>
-        </a:ln>
-      </a:lnStyleLst>
-      <a:effectStyleLst>
-        <a:effectStyle>
-          <a:effectLst>
-            <a:outerShdw blurRad="40000" dist="20000" dir="5400000" rotWithShape="0">
-              <a:srgbClr val="000000">
-                <a:alpha val="38000"/>
-              </a:srgbClr>
-            </a:outerShdw>
-          </a:effectLst>
-        </a:effectStyle>
-        <a:effectStyle>
-          <a:effectLst>
-            <a:outerShdw blurRad="40000" dist="23000" dir="5400000" rotWithShape="0">
-              <a:srgbClr val="000000">
-                <a:alpha val="35000"/>
-              </a:srgbClr>
-            </a:outerShdw>
-          </a:effectLst>
-        </a:effectStyle>
-        <a:effectStyle>
-          <a:effectLst>
-            <a:outerShdw blurRad="40000" dist="23000" dir="5400000" rotWithShape="0">
-              <a:srgbClr val="000000">
-                <a:alpha val="35000"/>
-              </a:srgbClr>
-            </a:outerShdw>
-          </a:effectLst>
-          <a:scene3d>
-            <a:camera prst="orthographicFront">
-              <a:rot lat="0" lon="0" rev="0"/>
-            </a:camera>
-            <a:lightRig rig="threePt" dir="t">
-              <a:rot lat="0" lon="0" rev="1200000"/>
-            </a:lightRig>
-          </a:scene3d>
-          <a:sp3d>
-            <a:bevelT w="63500" h="25400"/>
-          </a:sp3d>
-        </a:effectStyle>
-      </a:effectStyleLst>
-      <a:bgFillStyleLst>
-        <a:solidFill>
-          <a:schemeClr val="phClr"/>
-        </a:solidFill>
-        <a:gradFill rotWithShape="1">
-          <a:gsLst>
-            <a:gs pos="0">
-              <a:schemeClr val="phClr">
-                <a:tint val="40000"/>
-                <a:satMod val="350000"/>
-              </a:schemeClr>
-            </a:gs>
-            <a:gs pos="40000">
-              <a:schemeClr val="phClr">
-                <a:tint val="45000"/>
-                <a:shade val="99000"/>
-                <a:satMod val="350000"/>
-              </a:schemeClr>
-            </a:gs>
-            <a:gs pos="100000">
-              <a:schemeClr val="phClr">
-                <a:shade val="20000"/>
-                <a:satMod val="255000"/>
-              </a:schemeClr>
-            </a:gs>
-          </a:gsLst>
-          <a:path path="circle">
-            <a:fillToRect l="50000" t="-80000" r="50000" b="180000"/>
-          </a:path>
-        </a:gradFill>
-        <a:gradFill rotWithShape="1">
-          <a:gsLst>
-            <a:gs pos="0">
-              <a:schemeClr val="phClr">
-                <a:tint val="80000"/>
-                <a:satMod val="300000"/>
-              </a:schemeClr>
-            </a:gs>
-            <a:gs pos="100000">
-              <a:schemeClr val="phClr">
-                <a:shade val="30000"/>
-                <a:satMod val="200000"/>
-              </a:schemeClr>
-            </a:gs>
-          </a:gsLst>
-          <a:path path="circle">
-            <a:fillToRect l="50000" t="50000" r="50000" b="50000"/>
-          </a:path>
-        </a:gradFill>
-      </a:bgFillStyleLst>
-    </a:fmtScheme>
-  </a:themeElements>
-</a:theme>
 </file>
</xml_diff>

<commit_message>
Ready for winter 2025-26
</commit_message>
<xml_diff>
--- a/Lecture Slides/COACH A02 - The AMOS Coach.pptx
+++ b/Lecture Slides/COACH A02 - The AMOS Coach.pptx
@@ -719,7 +719,7 @@
   <p:cSld>
     <p:spTree>
       <p:nvGrpSpPr>
-        <p:cNvPr id="32" name="Shape 32"/>
+        <p:cNvPr id="47" name="Shape 47"/>
         <p:cNvGrpSpPr/>
         <p:nvPr/>
       </p:nvGrpSpPr>
@@ -733,7 +733,7 @@
       </p:grpSpPr>
       <p:sp>
         <p:nvSpPr>
-          <p:cNvPr id="33" name="Google Shape;33;g1af52a771ad_0_0:notes"/>
+          <p:cNvPr id="48" name="Google Shape;48;g1af52a771ad_0_0:notes"/>
           <p:cNvSpPr/>
           <p:nvPr>
             <p:ph idx="2" type="sldImg"/>
@@ -768,7 +768,7 @@
       </p:sp>
       <p:sp>
         <p:nvSpPr>
-          <p:cNvPr id="34" name="Google Shape;34;g1af52a771ad_0_0:notes"/>
+          <p:cNvPr id="49" name="Google Shape;49;g1af52a771ad_0_0:notes"/>
           <p:cNvSpPr txBox="1"/>
           <p:nvPr>
             <p:ph idx="1" type="body"/>
@@ -818,7 +818,7 @@
   <p:cSld>
     <p:spTree>
       <p:nvGrpSpPr>
-        <p:cNvPr id="116" name="Shape 116"/>
+        <p:cNvPr id="131" name="Shape 131"/>
         <p:cNvGrpSpPr/>
         <p:nvPr/>
       </p:nvGrpSpPr>
@@ -832,7 +832,7 @@
       </p:grpSpPr>
       <p:sp>
         <p:nvSpPr>
-          <p:cNvPr id="117" name="Google Shape;117;g120e26980bb_1_0:notes"/>
+          <p:cNvPr id="132" name="Google Shape;132;g120e26980bb_1_0:notes"/>
           <p:cNvSpPr/>
           <p:nvPr>
             <p:ph idx="2" type="sldImg"/>
@@ -867,7 +867,7 @@
       </p:sp>
       <p:sp>
         <p:nvSpPr>
-          <p:cNvPr id="118" name="Google Shape;118;g120e26980bb_1_0:notes"/>
+          <p:cNvPr id="133" name="Google Shape;133;g120e26980bb_1_0:notes"/>
           <p:cNvSpPr txBox="1"/>
           <p:nvPr>
             <p:ph idx="1" type="body"/>
@@ -917,7 +917,7 @@
   <p:cSld>
     <p:spTree>
       <p:nvGrpSpPr>
-        <p:cNvPr id="123" name="Shape 123"/>
+        <p:cNvPr id="138" name="Shape 138"/>
         <p:cNvGrpSpPr/>
         <p:nvPr/>
       </p:nvGrpSpPr>
@@ -931,7 +931,7 @@
       </p:grpSpPr>
       <p:sp>
         <p:nvSpPr>
-          <p:cNvPr id="124" name="Google Shape;124;g1cfd049e22c_0_0:notes"/>
+          <p:cNvPr id="139" name="Google Shape;139;g1cfd049e22c_0_0:notes"/>
           <p:cNvSpPr/>
           <p:nvPr>
             <p:ph idx="2" type="sldImg"/>
@@ -966,7 +966,7 @@
       </p:sp>
       <p:sp>
         <p:nvSpPr>
-          <p:cNvPr id="125" name="Google Shape;125;g1cfd049e22c_0_0:notes"/>
+          <p:cNvPr id="140" name="Google Shape;140;g1cfd049e22c_0_0:notes"/>
           <p:cNvSpPr txBox="1"/>
           <p:nvPr>
             <p:ph idx="1" type="body"/>
@@ -1016,7 +1016,7 @@
   <p:cSld>
     <p:spTree>
       <p:nvGrpSpPr>
-        <p:cNvPr id="130" name="Shape 130"/>
+        <p:cNvPr id="145" name="Shape 145"/>
         <p:cNvGrpSpPr/>
         <p:nvPr/>
       </p:nvGrpSpPr>
@@ -1030,7 +1030,7 @@
       </p:grpSpPr>
       <p:sp>
         <p:nvSpPr>
-          <p:cNvPr id="131" name="Google Shape;131;g120e26980bb_1_6:notes"/>
+          <p:cNvPr id="146" name="Google Shape;146;g120e26980bb_1_6:notes"/>
           <p:cNvSpPr/>
           <p:nvPr>
             <p:ph idx="2" type="sldImg"/>
@@ -1065,7 +1065,7 @@
       </p:sp>
       <p:sp>
         <p:nvSpPr>
-          <p:cNvPr id="132" name="Google Shape;132;g120e26980bb_1_6:notes"/>
+          <p:cNvPr id="147" name="Google Shape;147;g120e26980bb_1_6:notes"/>
           <p:cNvSpPr txBox="1"/>
           <p:nvPr>
             <p:ph idx="1" type="body"/>
@@ -1115,7 +1115,7 @@
   <p:cSld>
     <p:spTree>
       <p:nvGrpSpPr>
-        <p:cNvPr id="137" name="Shape 137"/>
+        <p:cNvPr id="152" name="Shape 152"/>
         <p:cNvGrpSpPr/>
         <p:nvPr/>
       </p:nvGrpSpPr>
@@ -1129,7 +1129,7 @@
       </p:grpSpPr>
       <p:sp>
         <p:nvSpPr>
-          <p:cNvPr id="138" name="Google Shape;138;g120e26980bb_1_12:notes"/>
+          <p:cNvPr id="153" name="Google Shape;153;g120e26980bb_1_12:notes"/>
           <p:cNvSpPr/>
           <p:nvPr>
             <p:ph idx="2" type="sldImg"/>
@@ -1164,7 +1164,7 @@
       </p:sp>
       <p:sp>
         <p:nvSpPr>
-          <p:cNvPr id="139" name="Google Shape;139;g120e26980bb_1_12:notes"/>
+          <p:cNvPr id="154" name="Google Shape;154;g120e26980bb_1_12:notes"/>
           <p:cNvSpPr txBox="1"/>
           <p:nvPr>
             <p:ph idx="1" type="body"/>
@@ -1214,7 +1214,7 @@
   <p:cSld>
     <p:spTree>
       <p:nvGrpSpPr>
-        <p:cNvPr id="142" name="Shape 142"/>
+        <p:cNvPr id="157" name="Shape 157"/>
         <p:cNvGrpSpPr/>
         <p:nvPr/>
       </p:nvGrpSpPr>
@@ -1228,7 +1228,7 @@
       </p:grpSpPr>
       <p:sp>
         <p:nvSpPr>
-          <p:cNvPr id="143" name="Google Shape;143;g120e3cc7253_2_0:notes"/>
+          <p:cNvPr id="158" name="Google Shape;158;g120e3cc7253_2_0:notes"/>
           <p:cNvSpPr/>
           <p:nvPr>
             <p:ph idx="2" type="sldImg"/>
@@ -1263,7 +1263,7 @@
       </p:sp>
       <p:sp>
         <p:nvSpPr>
-          <p:cNvPr id="144" name="Google Shape;144;g120e3cc7253_2_0:notes"/>
+          <p:cNvPr id="159" name="Google Shape;159;g120e3cc7253_2_0:notes"/>
           <p:cNvSpPr txBox="1"/>
           <p:nvPr>
             <p:ph idx="1" type="body"/>
@@ -1313,7 +1313,7 @@
   <p:cSld>
     <p:spTree>
       <p:nvGrpSpPr>
-        <p:cNvPr id="149" name="Shape 149"/>
+        <p:cNvPr id="164" name="Shape 164"/>
         <p:cNvGrpSpPr/>
         <p:nvPr/>
       </p:nvGrpSpPr>
@@ -1327,7 +1327,7 @@
       </p:grpSpPr>
       <p:sp>
         <p:nvSpPr>
-          <p:cNvPr id="150" name="Google Shape;150;gf69d4f396e_0_54:notes"/>
+          <p:cNvPr id="165" name="Google Shape;165;gf69d4f396e_0_54:notes"/>
           <p:cNvSpPr/>
           <p:nvPr>
             <p:ph idx="2" type="sldImg"/>
@@ -1362,7 +1362,7 @@
       </p:sp>
       <p:sp>
         <p:nvSpPr>
-          <p:cNvPr id="151" name="Google Shape;151;gf69d4f396e_0_54:notes"/>
+          <p:cNvPr id="166" name="Google Shape;166;gf69d4f396e_0_54:notes"/>
           <p:cNvSpPr txBox="1"/>
           <p:nvPr>
             <p:ph idx="1" type="body"/>
@@ -1412,7 +1412,7 @@
   <p:cSld>
     <p:spTree>
       <p:nvGrpSpPr>
-        <p:cNvPr id="158" name="Shape 158"/>
+        <p:cNvPr id="173" name="Shape 173"/>
         <p:cNvGrpSpPr/>
         <p:nvPr/>
       </p:nvGrpSpPr>
@@ -1426,7 +1426,7 @@
       </p:grpSpPr>
       <p:sp>
         <p:nvSpPr>
-          <p:cNvPr id="159" name="Google Shape;159;gf69d4f396e_0_48:notes"/>
+          <p:cNvPr id="174" name="Google Shape;174;gf69d4f396e_0_48:notes"/>
           <p:cNvSpPr/>
           <p:nvPr>
             <p:ph idx="2" type="sldImg"/>
@@ -1461,7 +1461,7 @@
       </p:sp>
       <p:sp>
         <p:nvSpPr>
-          <p:cNvPr id="160" name="Google Shape;160;gf69d4f396e_0_48:notes"/>
+          <p:cNvPr id="175" name="Google Shape;175;gf69d4f396e_0_48:notes"/>
           <p:cNvSpPr txBox="1"/>
           <p:nvPr>
             <p:ph idx="1" type="body"/>
@@ -1511,7 +1511,7 @@
   <p:cSld>
     <p:spTree>
       <p:nvGrpSpPr>
-        <p:cNvPr id="165" name="Shape 165"/>
+        <p:cNvPr id="180" name="Shape 180"/>
         <p:cNvGrpSpPr/>
         <p:nvPr/>
       </p:nvGrpSpPr>
@@ -1525,7 +1525,7 @@
       </p:grpSpPr>
       <p:sp>
         <p:nvSpPr>
-          <p:cNvPr id="166" name="Google Shape;166;gf32147b761_0_14:notes"/>
+          <p:cNvPr id="181" name="Google Shape;181;gf32147b761_0_14:notes"/>
           <p:cNvSpPr/>
           <p:nvPr>
             <p:ph idx="2" type="sldImg"/>
@@ -1560,7 +1560,7 @@
       </p:sp>
       <p:sp>
         <p:nvSpPr>
-          <p:cNvPr id="167" name="Google Shape;167;gf32147b761_0_14:notes"/>
+          <p:cNvPr id="182" name="Google Shape;182;gf32147b761_0_14:notes"/>
           <p:cNvSpPr txBox="1"/>
           <p:nvPr>
             <p:ph idx="1" type="body"/>
@@ -1610,7 +1610,7 @@
   <p:cSld>
     <p:spTree>
       <p:nvGrpSpPr>
-        <p:cNvPr id="172" name="Shape 172"/>
+        <p:cNvPr id="187" name="Shape 187"/>
         <p:cNvGrpSpPr/>
         <p:nvPr/>
       </p:nvGrpSpPr>
@@ -1624,7 +1624,7 @@
       </p:grpSpPr>
       <p:sp>
         <p:nvSpPr>
-          <p:cNvPr id="173" name="Google Shape;173;g120e26980bb_1_16:notes"/>
+          <p:cNvPr id="188" name="Google Shape;188;g120e26980bb_1_16:notes"/>
           <p:cNvSpPr/>
           <p:nvPr>
             <p:ph idx="2" type="sldImg"/>
@@ -1659,7 +1659,7 @@
       </p:sp>
       <p:sp>
         <p:nvSpPr>
-          <p:cNvPr id="174" name="Google Shape;174;g120e26980bb_1_16:notes"/>
+          <p:cNvPr id="189" name="Google Shape;189;g120e26980bb_1_16:notes"/>
           <p:cNvSpPr txBox="1"/>
           <p:nvPr>
             <p:ph idx="1" type="body"/>
@@ -1709,7 +1709,7 @@
   <p:cSld>
     <p:spTree>
       <p:nvGrpSpPr>
-        <p:cNvPr id="177" name="Shape 177"/>
+        <p:cNvPr id="192" name="Shape 192"/>
         <p:cNvGrpSpPr/>
         <p:nvPr/>
       </p:nvGrpSpPr>
@@ -1723,7 +1723,7 @@
       </p:grpSpPr>
       <p:sp>
         <p:nvSpPr>
-          <p:cNvPr id="178" name="Google Shape;178;gf32147b761_0_26:notes"/>
+          <p:cNvPr id="193" name="Google Shape;193;gf32147b761_0_26:notes"/>
           <p:cNvSpPr/>
           <p:nvPr>
             <p:ph idx="2" type="sldImg"/>
@@ -1758,7 +1758,7 @@
       </p:sp>
       <p:sp>
         <p:nvSpPr>
-          <p:cNvPr id="179" name="Google Shape;179;gf32147b761_0_26:notes"/>
+          <p:cNvPr id="194" name="Google Shape;194;gf32147b761_0_26:notes"/>
           <p:cNvSpPr txBox="1"/>
           <p:nvPr>
             <p:ph idx="1" type="body"/>
@@ -1808,7 +1808,7 @@
   <p:cSld>
     <p:spTree>
       <p:nvGrpSpPr>
-        <p:cNvPr id="38" name="Shape 38"/>
+        <p:cNvPr id="53" name="Shape 53"/>
         <p:cNvGrpSpPr/>
         <p:nvPr/>
       </p:nvGrpSpPr>
@@ -1822,7 +1822,7 @@
       </p:grpSpPr>
       <p:sp>
         <p:nvSpPr>
-          <p:cNvPr id="39" name="Google Shape;39;gf69d4f396e_0_24:notes"/>
+          <p:cNvPr id="54" name="Google Shape;54;gf69d4f396e_0_24:notes"/>
           <p:cNvSpPr/>
           <p:nvPr>
             <p:ph idx="2" type="sldImg"/>
@@ -1857,7 +1857,7 @@
       </p:sp>
       <p:sp>
         <p:nvSpPr>
-          <p:cNvPr id="40" name="Google Shape;40;gf69d4f396e_0_24:notes"/>
+          <p:cNvPr id="55" name="Google Shape;55;gf69d4f396e_0_24:notes"/>
           <p:cNvSpPr txBox="1"/>
           <p:nvPr>
             <p:ph idx="1" type="body"/>
@@ -1907,7 +1907,7 @@
   <p:cSld>
     <p:spTree>
       <p:nvGrpSpPr>
-        <p:cNvPr id="185" name="Shape 185"/>
+        <p:cNvPr id="200" name="Shape 200"/>
         <p:cNvGrpSpPr/>
         <p:nvPr/>
       </p:nvGrpSpPr>
@@ -1921,7 +1921,7 @@
       </p:grpSpPr>
       <p:sp>
         <p:nvSpPr>
-          <p:cNvPr id="186" name="Google Shape;186;gf32147b761_0_20:notes"/>
+          <p:cNvPr id="201" name="Google Shape;201;gf32147b761_0_20:notes"/>
           <p:cNvSpPr/>
           <p:nvPr>
             <p:ph idx="2" type="sldImg"/>
@@ -1956,7 +1956,7 @@
       </p:sp>
       <p:sp>
         <p:nvSpPr>
-          <p:cNvPr id="187" name="Google Shape;187;gf32147b761_0_20:notes"/>
+          <p:cNvPr id="202" name="Google Shape;202;gf32147b761_0_20:notes"/>
           <p:cNvSpPr txBox="1"/>
           <p:nvPr>
             <p:ph idx="1" type="body"/>
@@ -2006,7 +2006,7 @@
   <p:cSld>
     <p:spTree>
       <p:nvGrpSpPr>
-        <p:cNvPr id="192" name="Shape 192"/>
+        <p:cNvPr id="207" name="Shape 207"/>
         <p:cNvGrpSpPr/>
         <p:nvPr/>
       </p:nvGrpSpPr>
@@ -2020,7 +2020,7 @@
       </p:grpSpPr>
       <p:sp>
         <p:nvSpPr>
-          <p:cNvPr id="193" name="Google Shape;193;gf32147b761_0_45:notes"/>
+          <p:cNvPr id="208" name="Google Shape;208;gf32147b761_0_45:notes"/>
           <p:cNvSpPr/>
           <p:nvPr>
             <p:ph idx="2" type="sldImg"/>
@@ -2055,7 +2055,7 @@
       </p:sp>
       <p:sp>
         <p:nvSpPr>
-          <p:cNvPr id="194" name="Google Shape;194;gf32147b761_0_45:notes"/>
+          <p:cNvPr id="209" name="Google Shape;209;gf32147b761_0_45:notes"/>
           <p:cNvSpPr txBox="1"/>
           <p:nvPr>
             <p:ph idx="1" type="body"/>
@@ -2105,7 +2105,7 @@
   <p:cSld>
     <p:spTree>
       <p:nvGrpSpPr>
-        <p:cNvPr id="199" name="Shape 199"/>
+        <p:cNvPr id="214" name="Shape 214"/>
         <p:cNvGrpSpPr/>
         <p:nvPr/>
       </p:nvGrpSpPr>
@@ -2119,7 +2119,7 @@
       </p:grpSpPr>
       <p:sp>
         <p:nvSpPr>
-          <p:cNvPr id="200" name="Google Shape;200;gf9a4994397_0_1:notes"/>
+          <p:cNvPr id="215" name="Google Shape;215;gf9a4994397_0_1:notes"/>
           <p:cNvSpPr/>
           <p:nvPr>
             <p:ph idx="2" type="sldImg"/>
@@ -2154,7 +2154,7 @@
       </p:sp>
       <p:sp>
         <p:nvSpPr>
-          <p:cNvPr id="201" name="Google Shape;201;gf9a4994397_0_1:notes"/>
+          <p:cNvPr id="216" name="Google Shape;216;gf9a4994397_0_1:notes"/>
           <p:cNvSpPr txBox="1"/>
           <p:nvPr>
             <p:ph idx="1" type="body"/>
@@ -2204,7 +2204,7 @@
   <p:cSld>
     <p:spTree>
       <p:nvGrpSpPr>
-        <p:cNvPr id="204" name="Shape 204"/>
+        <p:cNvPr id="219" name="Shape 219"/>
         <p:cNvGrpSpPr/>
         <p:nvPr/>
       </p:nvGrpSpPr>
@@ -2218,7 +2218,7 @@
       </p:grpSpPr>
       <p:sp>
         <p:nvSpPr>
-          <p:cNvPr id="205" name="Google Shape;205;gf32147b761_0_2:notes"/>
+          <p:cNvPr id="220" name="Google Shape;220;gf32147b761_0_2:notes"/>
           <p:cNvSpPr/>
           <p:nvPr>
             <p:ph idx="2" type="sldImg"/>
@@ -2253,7 +2253,7 @@
       </p:sp>
       <p:sp>
         <p:nvSpPr>
-          <p:cNvPr id="206" name="Google Shape;206;gf32147b761_0_2:notes"/>
+          <p:cNvPr id="221" name="Google Shape;221;gf32147b761_0_2:notes"/>
           <p:cNvSpPr txBox="1"/>
           <p:nvPr>
             <p:ph idx="1" type="body"/>
@@ -2303,7 +2303,7 @@
   <p:cSld>
     <p:spTree>
       <p:nvGrpSpPr>
-        <p:cNvPr id="211" name="Shape 211"/>
+        <p:cNvPr id="226" name="Shape 226"/>
         <p:cNvGrpSpPr/>
         <p:nvPr/>
       </p:nvGrpSpPr>
@@ -2317,7 +2317,7 @@
       </p:grpSpPr>
       <p:sp>
         <p:nvSpPr>
-          <p:cNvPr id="212" name="Google Shape;212;gf32147b761_0_8:notes"/>
+          <p:cNvPr id="227" name="Google Shape;227;gf32147b761_0_8:notes"/>
           <p:cNvSpPr/>
           <p:nvPr>
             <p:ph idx="2" type="sldImg"/>
@@ -2352,7 +2352,7 @@
       </p:sp>
       <p:sp>
         <p:nvSpPr>
-          <p:cNvPr id="213" name="Google Shape;213;gf32147b761_0_8:notes"/>
+          <p:cNvPr id="228" name="Google Shape;228;gf32147b761_0_8:notes"/>
           <p:cNvSpPr txBox="1"/>
           <p:nvPr>
             <p:ph idx="1" type="body"/>
@@ -2402,7 +2402,7 @@
   <p:cSld>
     <p:spTree>
       <p:nvGrpSpPr>
-        <p:cNvPr id="218" name="Shape 218"/>
+        <p:cNvPr id="233" name="Shape 233"/>
         <p:cNvGrpSpPr/>
         <p:nvPr/>
       </p:nvGrpSpPr>
@@ -2416,7 +2416,7 @@
       </p:grpSpPr>
       <p:sp>
         <p:nvSpPr>
-          <p:cNvPr id="219" name="Google Shape;219;gf32147b761_0_51:notes"/>
+          <p:cNvPr id="234" name="Google Shape;234;gf32147b761_0_51:notes"/>
           <p:cNvSpPr/>
           <p:nvPr>
             <p:ph idx="2" type="sldImg"/>
@@ -2451,7 +2451,7 @@
       </p:sp>
       <p:sp>
         <p:nvSpPr>
-          <p:cNvPr id="220" name="Google Shape;220;gf32147b761_0_51:notes"/>
+          <p:cNvPr id="235" name="Google Shape;235;gf32147b761_0_51:notes"/>
           <p:cNvSpPr txBox="1"/>
           <p:nvPr>
             <p:ph idx="1" type="body"/>
@@ -2501,7 +2501,7 @@
   <p:cSld>
     <p:spTree>
       <p:nvGrpSpPr>
-        <p:cNvPr id="225" name="Shape 225"/>
+        <p:cNvPr id="240" name="Shape 240"/>
         <p:cNvGrpSpPr/>
         <p:nvPr/>
       </p:nvGrpSpPr>
@@ -2515,7 +2515,7 @@
       </p:grpSpPr>
       <p:sp>
         <p:nvSpPr>
-          <p:cNvPr id="226" name="Google Shape;226;gf32147b761_0_59:notes"/>
+          <p:cNvPr id="241" name="Google Shape;241;gf32147b761_0_59:notes"/>
           <p:cNvSpPr/>
           <p:nvPr>
             <p:ph idx="2" type="sldImg"/>
@@ -2550,7 +2550,7 @@
       </p:sp>
       <p:sp>
         <p:nvSpPr>
-          <p:cNvPr id="227" name="Google Shape;227;gf32147b761_0_59:notes"/>
+          <p:cNvPr id="242" name="Google Shape;242;gf32147b761_0_59:notes"/>
           <p:cNvSpPr txBox="1"/>
           <p:nvPr>
             <p:ph idx="1" type="body"/>
@@ -2600,7 +2600,7 @@
   <p:cSld>
     <p:spTree>
       <p:nvGrpSpPr>
-        <p:cNvPr id="232" name="Shape 232"/>
+        <p:cNvPr id="247" name="Shape 247"/>
         <p:cNvGrpSpPr/>
         <p:nvPr/>
       </p:nvGrpSpPr>
@@ -2614,7 +2614,7 @@
       </p:grpSpPr>
       <p:sp>
         <p:nvSpPr>
-          <p:cNvPr id="233" name="Google Shape;233;gf9a4994397_0_12:notes"/>
+          <p:cNvPr id="248" name="Google Shape;248;gf9a4994397_0_12:notes"/>
           <p:cNvSpPr/>
           <p:nvPr>
             <p:ph idx="2" type="sldImg"/>
@@ -2649,7 +2649,7 @@
       </p:sp>
       <p:sp>
         <p:nvSpPr>
-          <p:cNvPr id="234" name="Google Shape;234;gf9a4994397_0_12:notes"/>
+          <p:cNvPr id="249" name="Google Shape;249;gf9a4994397_0_12:notes"/>
           <p:cNvSpPr txBox="1"/>
           <p:nvPr>
             <p:ph idx="1" type="body"/>
@@ -2699,7 +2699,7 @@
   <p:cSld>
     <p:spTree>
       <p:nvGrpSpPr>
-        <p:cNvPr id="239" name="Shape 239"/>
+        <p:cNvPr id="254" name="Shape 254"/>
         <p:cNvGrpSpPr/>
         <p:nvPr/>
       </p:nvGrpSpPr>
@@ -2713,7 +2713,7 @@
       </p:grpSpPr>
       <p:sp>
         <p:nvSpPr>
-          <p:cNvPr id="240" name="Google Shape;240;gf159243bbb_1_55:notes"/>
+          <p:cNvPr id="255" name="Google Shape;255;gf159243bbb_1_55:notes"/>
           <p:cNvSpPr/>
           <p:nvPr>
             <p:ph idx="2" type="sldImg"/>
@@ -2748,7 +2748,7 @@
       </p:sp>
       <p:sp>
         <p:nvSpPr>
-          <p:cNvPr id="241" name="Google Shape;241;gf159243bbb_1_55:notes"/>
+          <p:cNvPr id="256" name="Google Shape;256;gf159243bbb_1_55:notes"/>
           <p:cNvSpPr txBox="1"/>
           <p:nvPr>
             <p:ph idx="1" type="body"/>
@@ -2798,7 +2798,7 @@
   <p:cSld>
     <p:spTree>
       <p:nvGrpSpPr>
-        <p:cNvPr id="245" name="Shape 245"/>
+        <p:cNvPr id="260" name="Shape 260"/>
         <p:cNvGrpSpPr/>
         <p:nvPr/>
       </p:nvGrpSpPr>
@@ -2812,7 +2812,7 @@
       </p:grpSpPr>
       <p:sp>
         <p:nvSpPr>
-          <p:cNvPr id="246" name="Google Shape;246;gf159243bbb_1_61:notes"/>
+          <p:cNvPr id="261" name="Google Shape;261;gf159243bbb_1_61:notes"/>
           <p:cNvSpPr/>
           <p:nvPr>
             <p:ph idx="2" type="sldImg"/>
@@ -2847,7 +2847,7 @@
       </p:sp>
       <p:sp>
         <p:nvSpPr>
-          <p:cNvPr id="247" name="Google Shape;247;gf159243bbb_1_61:notes"/>
+          <p:cNvPr id="262" name="Google Shape;262;gf159243bbb_1_61:notes"/>
           <p:cNvSpPr txBox="1"/>
           <p:nvPr>
             <p:ph idx="1" type="body"/>
@@ -2897,7 +2897,7 @@
   <p:cSld>
     <p:spTree>
       <p:nvGrpSpPr>
-        <p:cNvPr id="45" name="Shape 45"/>
+        <p:cNvPr id="60" name="Shape 60"/>
         <p:cNvGrpSpPr/>
         <p:nvPr/>
       </p:nvGrpSpPr>
@@ -2911,7 +2911,7 @@
       </p:grpSpPr>
       <p:sp>
         <p:nvSpPr>
-          <p:cNvPr id="46" name="Google Shape;46;gf32147b761_0_32:notes"/>
+          <p:cNvPr id="61" name="Google Shape;61;gf32147b761_0_32:notes"/>
           <p:cNvSpPr/>
           <p:nvPr>
             <p:ph idx="2" type="sldImg"/>
@@ -2946,7 +2946,7 @@
       </p:sp>
       <p:sp>
         <p:nvSpPr>
-          <p:cNvPr id="47" name="Google Shape;47;gf32147b761_0_32:notes"/>
+          <p:cNvPr id="62" name="Google Shape;62;gf32147b761_0_32:notes"/>
           <p:cNvSpPr txBox="1"/>
           <p:nvPr>
             <p:ph idx="1" type="body"/>
@@ -2996,7 +2996,7 @@
   <p:cSld>
     <p:spTree>
       <p:nvGrpSpPr>
-        <p:cNvPr id="50" name="Shape 50"/>
+        <p:cNvPr id="65" name="Shape 65"/>
         <p:cNvGrpSpPr/>
         <p:nvPr/>
       </p:nvGrpSpPr>
@@ -3010,7 +3010,7 @@
       </p:grpSpPr>
       <p:sp>
         <p:nvSpPr>
-          <p:cNvPr id="51" name="Google Shape;51;g14164c4a43e_0_22:notes"/>
+          <p:cNvPr id="66" name="Google Shape;66;g14164c4a43e_0_22:notes"/>
           <p:cNvSpPr/>
           <p:nvPr>
             <p:ph idx="2" type="sldImg"/>
@@ -3045,7 +3045,7 @@
       </p:sp>
       <p:sp>
         <p:nvSpPr>
-          <p:cNvPr id="52" name="Google Shape;52;g14164c4a43e_0_22:notes"/>
+          <p:cNvPr id="67" name="Google Shape;67;g14164c4a43e_0_22:notes"/>
           <p:cNvSpPr txBox="1"/>
           <p:nvPr>
             <p:ph idx="1" type="body"/>
@@ -3095,7 +3095,7 @@
   <p:cSld>
     <p:spTree>
       <p:nvGrpSpPr>
-        <p:cNvPr id="58" name="Shape 58"/>
+        <p:cNvPr id="73" name="Shape 73"/>
         <p:cNvGrpSpPr/>
         <p:nvPr/>
       </p:nvGrpSpPr>
@@ -3109,7 +3109,7 @@
       </p:grpSpPr>
       <p:sp>
         <p:nvSpPr>
-          <p:cNvPr id="59" name="Google Shape;59;g14164c4a43e_0_51:notes"/>
+          <p:cNvPr id="74" name="Google Shape;74;g14164c4a43e_0_51:notes"/>
           <p:cNvSpPr/>
           <p:nvPr>
             <p:ph idx="2" type="sldImg"/>
@@ -3144,7 +3144,7 @@
       </p:sp>
       <p:sp>
         <p:nvSpPr>
-          <p:cNvPr id="60" name="Google Shape;60;g14164c4a43e_0_51:notes"/>
+          <p:cNvPr id="75" name="Google Shape;75;g14164c4a43e_0_51:notes"/>
           <p:cNvSpPr txBox="1"/>
           <p:nvPr>
             <p:ph idx="1" type="body"/>
@@ -3194,7 +3194,7 @@
   <p:cSld>
     <p:spTree>
       <p:nvGrpSpPr>
-        <p:cNvPr id="66" name="Shape 66"/>
+        <p:cNvPr id="81" name="Shape 81"/>
         <p:cNvGrpSpPr/>
         <p:nvPr/>
       </p:nvGrpSpPr>
@@ -3208,7 +3208,7 @@
       </p:grpSpPr>
       <p:sp>
         <p:nvSpPr>
-          <p:cNvPr id="67" name="Google Shape;67;gf99f70e0fc_0_17:notes"/>
+          <p:cNvPr id="82" name="Google Shape;82;gf99f70e0fc_0_17:notes"/>
           <p:cNvSpPr/>
           <p:nvPr>
             <p:ph idx="2" type="sldImg"/>
@@ -3243,7 +3243,7 @@
       </p:sp>
       <p:sp>
         <p:nvSpPr>
-          <p:cNvPr id="68" name="Google Shape;68;gf99f70e0fc_0_17:notes"/>
+          <p:cNvPr id="83" name="Google Shape;83;gf99f70e0fc_0_17:notes"/>
           <p:cNvSpPr txBox="1"/>
           <p:nvPr>
             <p:ph idx="1" type="body"/>
@@ -3293,7 +3293,7 @@
   <p:cSld>
     <p:spTree>
       <p:nvGrpSpPr>
-        <p:cNvPr id="73" name="Shape 73"/>
+        <p:cNvPr id="88" name="Shape 88"/>
         <p:cNvGrpSpPr/>
         <p:nvPr/>
       </p:nvGrpSpPr>
@@ -3307,7 +3307,7 @@
       </p:grpSpPr>
       <p:sp>
         <p:nvSpPr>
-          <p:cNvPr id="74" name="Google Shape;74;gf99f70e0fc_0_31:notes"/>
+          <p:cNvPr id="89" name="Google Shape;89;gf99f70e0fc_0_31:notes"/>
           <p:cNvSpPr/>
           <p:nvPr>
             <p:ph idx="2" type="sldImg"/>
@@ -3342,7 +3342,7 @@
       </p:sp>
       <p:sp>
         <p:nvSpPr>
-          <p:cNvPr id="75" name="Google Shape;75;gf99f70e0fc_0_31:notes"/>
+          <p:cNvPr id="90" name="Google Shape;90;gf99f70e0fc_0_31:notes"/>
           <p:cNvSpPr txBox="1"/>
           <p:nvPr>
             <p:ph idx="1" type="body"/>
@@ -3392,7 +3392,7 @@
   <p:cSld>
     <p:spTree>
       <p:nvGrpSpPr>
-        <p:cNvPr id="104" name="Shape 104"/>
+        <p:cNvPr id="119" name="Shape 119"/>
         <p:cNvGrpSpPr/>
         <p:nvPr/>
       </p:nvGrpSpPr>
@@ -3406,7 +3406,7 @@
       </p:grpSpPr>
       <p:sp>
         <p:nvSpPr>
-          <p:cNvPr id="105" name="Google Shape;105;gf99f70e0fc_0_0:notes"/>
+          <p:cNvPr id="120" name="Google Shape;120;gf99f70e0fc_0_0:notes"/>
           <p:cNvSpPr/>
           <p:nvPr>
             <p:ph idx="2" type="sldImg"/>
@@ -3441,7 +3441,7 @@
       </p:sp>
       <p:sp>
         <p:nvSpPr>
-          <p:cNvPr id="106" name="Google Shape;106;gf99f70e0fc_0_0:notes"/>
+          <p:cNvPr id="121" name="Google Shape;121;gf99f70e0fc_0_0:notes"/>
           <p:cNvSpPr txBox="1"/>
           <p:nvPr>
             <p:ph idx="1" type="body"/>
@@ -3491,7 +3491,7 @@
   <p:cSld>
     <p:spTree>
       <p:nvGrpSpPr>
-        <p:cNvPr id="109" name="Shape 109"/>
+        <p:cNvPr id="124" name="Shape 124"/>
         <p:cNvGrpSpPr/>
         <p:nvPr/>
       </p:nvGrpSpPr>
@@ -3505,7 +3505,7 @@
       </p:grpSpPr>
       <p:sp>
         <p:nvSpPr>
-          <p:cNvPr id="110" name="Google Shape;110;gf9a4994397_0_6:notes"/>
+          <p:cNvPr id="125" name="Google Shape;125;gf9a4994397_0_6:notes"/>
           <p:cNvSpPr/>
           <p:nvPr>
             <p:ph idx="2" type="sldImg"/>
@@ -3540,7 +3540,7 @@
       </p:sp>
       <p:sp>
         <p:nvSpPr>
-          <p:cNvPr id="111" name="Google Shape;111;gf9a4994397_0_6:notes"/>
+          <p:cNvPr id="126" name="Google Shape;126;gf9a4994397_0_6:notes"/>
           <p:cNvSpPr txBox="1"/>
           <p:nvPr>
             <p:ph idx="1" type="body"/>
@@ -3887,49 +3887,150 @@
           <a:p/>
         </p:txBody>
       </p:sp>
-      <p:sp>
-        <p:nvSpPr>
+      <p:grpSp>
+        <p:nvGrpSpPr>
           <p:cNvPr id="12" name="Google Shape;12;p2"/>
-          <p:cNvSpPr/>
+          <p:cNvGrpSpPr/>
           <p:nvPr/>
-        </p:nvSpPr>
-        <p:spPr>
+        </p:nvGrpSpPr>
+        <p:grpSpPr>
           <a:xfrm>
             <a:off x="0" y="2388810"/>
             <a:ext cx="9144000" cy="183000"/>
-          </a:xfrm>
-          <a:prstGeom prst="rect">
-            <a:avLst/>
-          </a:prstGeom>
-          <a:solidFill>
-            <a:schemeClr val="accent6"/>
-          </a:solidFill>
-          <a:ln>
-            <a:noFill/>
-          </a:ln>
-        </p:spPr>
-        <p:txBody>
-          <a:bodyPr anchorCtr="0" anchor="ctr" bIns="91425" lIns="91425" spcFirstLastPara="1" rIns="91425" wrap="square" tIns="91425">
-            <a:noAutofit/>
-          </a:bodyPr>
-          <a:lstStyle/>
-          <a:p>
-            <a:pPr indent="0" lvl="0" marL="0" rtl="0" algn="l">
-              <a:spcBef>
-                <a:spcPts val="0"/>
-              </a:spcBef>
-              <a:spcAft>
-                <a:spcPts val="0"/>
-              </a:spcAft>
-              <a:buNone/>
-            </a:pPr>
-            <a:r>
-              <a:t/>
-            </a:r>
-            <a:endParaRPr/>
-          </a:p>
-        </p:txBody>
-      </p:sp>
+            <a:chOff x="0" y="2388810"/>
+            <a:chExt cx="9144000" cy="183000"/>
+          </a:xfrm>
+        </p:grpSpPr>
+        <p:sp>
+          <p:nvSpPr>
+            <p:cNvPr id="13" name="Google Shape;13;p2"/>
+            <p:cNvSpPr/>
+            <p:nvPr/>
+          </p:nvSpPr>
+          <p:spPr>
+            <a:xfrm>
+              <a:off x="0" y="2388810"/>
+              <a:ext cx="914400" cy="183000"/>
+            </a:xfrm>
+            <a:prstGeom prst="rect">
+              <a:avLst/>
+            </a:prstGeom>
+            <a:solidFill>
+              <a:schemeClr val="accent2"/>
+            </a:solidFill>
+            <a:ln>
+              <a:noFill/>
+            </a:ln>
+          </p:spPr>
+          <p:txBody>
+            <a:bodyPr anchorCtr="0" anchor="ctr" bIns="91425" lIns="91425" spcFirstLastPara="1" rIns="91425" wrap="square" tIns="91425">
+              <a:noAutofit/>
+            </a:bodyPr>
+            <a:lstStyle/>
+            <a:p>
+              <a:pPr indent="0" lvl="0" marL="0" rtl="0" algn="l">
+                <a:spcBef>
+                  <a:spcPts val="0"/>
+                </a:spcBef>
+                <a:spcAft>
+                  <a:spcPts val="0"/>
+                </a:spcAft>
+                <a:buNone/>
+              </a:pPr>
+              <a:r>
+                <a:t/>
+              </a:r>
+              <a:endParaRPr/>
+            </a:p>
+          </p:txBody>
+        </p:sp>
+        <p:sp>
+          <p:nvSpPr>
+            <p:cNvPr id="14" name="Google Shape;14;p2"/>
+            <p:cNvSpPr/>
+            <p:nvPr/>
+          </p:nvSpPr>
+          <p:spPr>
+            <a:xfrm>
+              <a:off x="914400" y="2388810"/>
+              <a:ext cx="1828800" cy="183000"/>
+            </a:xfrm>
+            <a:prstGeom prst="rect">
+              <a:avLst/>
+            </a:prstGeom>
+            <a:solidFill>
+              <a:schemeClr val="accent3"/>
+            </a:solidFill>
+            <a:ln>
+              <a:noFill/>
+            </a:ln>
+          </p:spPr>
+          <p:txBody>
+            <a:bodyPr anchorCtr="0" anchor="ctr" bIns="91425" lIns="91425" spcFirstLastPara="1" rIns="91425" wrap="square" tIns="91425">
+              <a:noAutofit/>
+            </a:bodyPr>
+            <a:lstStyle/>
+            <a:p>
+              <a:pPr indent="0" lvl="0" marL="0" rtl="0" algn="l">
+                <a:spcBef>
+                  <a:spcPts val="0"/>
+                </a:spcBef>
+                <a:spcAft>
+                  <a:spcPts val="0"/>
+                </a:spcAft>
+                <a:buNone/>
+              </a:pPr>
+              <a:r>
+                <a:t/>
+              </a:r>
+              <a:endParaRPr/>
+            </a:p>
+          </p:txBody>
+        </p:sp>
+        <p:sp>
+          <p:nvSpPr>
+            <p:cNvPr id="15" name="Google Shape;15;p2"/>
+            <p:cNvSpPr/>
+            <p:nvPr/>
+          </p:nvSpPr>
+          <p:spPr>
+            <a:xfrm>
+              <a:off x="2743200" y="2388810"/>
+              <a:ext cx="6400800" cy="183000"/>
+            </a:xfrm>
+            <a:prstGeom prst="rect">
+              <a:avLst/>
+            </a:prstGeom>
+            <a:solidFill>
+              <a:schemeClr val="accent4"/>
+            </a:solidFill>
+            <a:ln>
+              <a:noFill/>
+            </a:ln>
+          </p:spPr>
+          <p:txBody>
+            <a:bodyPr anchorCtr="0" anchor="ctr" bIns="91425" lIns="91425" spcFirstLastPara="1" rIns="91425" wrap="square" tIns="91425">
+              <a:noAutofit/>
+            </a:bodyPr>
+            <a:lstStyle/>
+            <a:p>
+              <a:pPr indent="0" lvl="0" marL="0" rtl="0" algn="l">
+                <a:spcBef>
+                  <a:spcPts val="0"/>
+                </a:spcBef>
+                <a:spcAft>
+                  <a:spcPts val="0"/>
+                </a:spcAft>
+                <a:buNone/>
+              </a:pPr>
+              <a:r>
+                <a:t/>
+              </a:r>
+              <a:endParaRPr/>
+            </a:p>
+          </p:txBody>
+        </p:sp>
+      </p:grpSp>
     </p:spTree>
   </p:cSld>
   <p:clrMapOvr>
@@ -3941,199 +4042,6 @@
 <file path=ppt/slideLayouts/slideLayout2.xml><?xml version="1.0" encoding="utf-8"?>
 <p:sldLayout xmlns:a="http://schemas.openxmlformats.org/drawingml/2006/main" xmlns:r="http://schemas.openxmlformats.org/officeDocument/2006/relationships" xmlns:mc="http://schemas.openxmlformats.org/markup-compatibility/2006" xmlns:mv="urn:schemas-microsoft-com:mac:vml" xmlns:p="http://schemas.openxmlformats.org/presentationml/2006/main" xmlns:c="http://schemas.openxmlformats.org/drawingml/2006/chart" xmlns:dgm="http://schemas.openxmlformats.org/drawingml/2006/diagram" xmlns:o="urn:schemas-microsoft-com:office:office" xmlns:v="urn:schemas-microsoft-com:vml" xmlns:pvml="urn:schemas-microsoft-com:office:powerpoint" xmlns:com="http://schemas.openxmlformats.org/drawingml/2006/compatibility" xmlns:p14="http://schemas.microsoft.com/office/powerpoint/2010/main" xmlns:p15="http://schemas.microsoft.com/office/powerpoint/2012/main" xmlns:ahyp="http://schemas.microsoft.com/office/drawing/2018/hyperlinkcolor" matchingName="Section header" type="secHead">
   <p:cSld name="SECTION_HEADER">
-    <p:spTree>
-      <p:nvGrpSpPr>
-        <p:cNvPr id="13" name="Shape 13"/>
-        <p:cNvGrpSpPr/>
-        <p:nvPr/>
-      </p:nvGrpSpPr>
-      <p:grpSpPr>
-        <a:xfrm>
-          <a:off x="0" y="0"/>
-          <a:ext cx="0" cy="0"/>
-          <a:chOff x="0" y="0"/>
-          <a:chExt cx="0" cy="0"/>
-        </a:xfrm>
-      </p:grpSpPr>
-      <p:sp>
-        <p:nvSpPr>
-          <p:cNvPr id="14" name="Google Shape;14;p3"/>
-          <p:cNvSpPr txBox="1"/>
-          <p:nvPr>
-            <p:ph type="title"/>
-          </p:nvPr>
-        </p:nvSpPr>
-        <p:spPr>
-          <a:xfrm>
-            <a:off x="0" y="-7"/>
-            <a:ext cx="9144000" cy="2386500"/>
-          </a:xfrm>
-          <a:prstGeom prst="rect">
-            <a:avLst/>
-          </a:prstGeom>
-        </p:spPr>
-        <p:txBody>
-          <a:bodyPr anchorCtr="0" anchor="b" bIns="274300" lIns="91425" spcFirstLastPara="1" rIns="91425" wrap="square" tIns="91425">
-            <a:noAutofit/>
-          </a:bodyPr>
-          <a:lstStyle>
-            <a:lvl1pPr lvl="0" algn="ctr">
-              <a:spcBef>
-                <a:spcPts val="0"/>
-              </a:spcBef>
-              <a:spcAft>
-                <a:spcPts val="0"/>
-              </a:spcAft>
-              <a:buSzPts val="3000"/>
-              <a:buNone/>
-              <a:defRPr sz="3000"/>
-            </a:lvl1pPr>
-            <a:lvl2pPr lvl="1" algn="ctr">
-              <a:spcBef>
-                <a:spcPts val="0"/>
-              </a:spcBef>
-              <a:spcAft>
-                <a:spcPts val="0"/>
-              </a:spcAft>
-              <a:buSzPts val="3600"/>
-              <a:buNone/>
-              <a:defRPr sz="3600"/>
-            </a:lvl2pPr>
-            <a:lvl3pPr lvl="2" algn="ctr">
-              <a:spcBef>
-                <a:spcPts val="0"/>
-              </a:spcBef>
-              <a:spcAft>
-                <a:spcPts val="0"/>
-              </a:spcAft>
-              <a:buSzPts val="3600"/>
-              <a:buNone/>
-              <a:defRPr sz="3600"/>
-            </a:lvl3pPr>
-            <a:lvl4pPr lvl="3" algn="ctr">
-              <a:spcBef>
-                <a:spcPts val="0"/>
-              </a:spcBef>
-              <a:spcAft>
-                <a:spcPts val="0"/>
-              </a:spcAft>
-              <a:buSzPts val="3600"/>
-              <a:buNone/>
-              <a:defRPr sz="3600"/>
-            </a:lvl4pPr>
-            <a:lvl5pPr lvl="4" algn="ctr">
-              <a:spcBef>
-                <a:spcPts val="0"/>
-              </a:spcBef>
-              <a:spcAft>
-                <a:spcPts val="0"/>
-              </a:spcAft>
-              <a:buSzPts val="3600"/>
-              <a:buNone/>
-              <a:defRPr sz="3600"/>
-            </a:lvl5pPr>
-            <a:lvl6pPr lvl="5" algn="ctr">
-              <a:spcBef>
-                <a:spcPts val="0"/>
-              </a:spcBef>
-              <a:spcAft>
-                <a:spcPts val="0"/>
-              </a:spcAft>
-              <a:buSzPts val="3600"/>
-              <a:buNone/>
-              <a:defRPr sz="3600"/>
-            </a:lvl6pPr>
-            <a:lvl7pPr lvl="6" algn="ctr">
-              <a:spcBef>
-                <a:spcPts val="0"/>
-              </a:spcBef>
-              <a:spcAft>
-                <a:spcPts val="0"/>
-              </a:spcAft>
-              <a:buSzPts val="3600"/>
-              <a:buNone/>
-              <a:defRPr sz="3600"/>
-            </a:lvl7pPr>
-            <a:lvl8pPr lvl="7" algn="ctr">
-              <a:spcBef>
-                <a:spcPts val="0"/>
-              </a:spcBef>
-              <a:spcAft>
-                <a:spcPts val="0"/>
-              </a:spcAft>
-              <a:buSzPts val="3600"/>
-              <a:buNone/>
-              <a:defRPr sz="3600"/>
-            </a:lvl8pPr>
-            <a:lvl9pPr lvl="8" algn="ctr">
-              <a:spcBef>
-                <a:spcPts val="0"/>
-              </a:spcBef>
-              <a:spcAft>
-                <a:spcPts val="0"/>
-              </a:spcAft>
-              <a:buSzPts val="3600"/>
-              <a:buNone/>
-              <a:defRPr sz="3600"/>
-            </a:lvl9pPr>
-          </a:lstStyle>
-          <a:p/>
-        </p:txBody>
-      </p:sp>
-      <p:sp>
-        <p:nvSpPr>
-          <p:cNvPr id="15" name="Google Shape;15;p3"/>
-          <p:cNvSpPr/>
-          <p:nvPr/>
-        </p:nvSpPr>
-        <p:spPr>
-          <a:xfrm>
-            <a:off x="0" y="2386584"/>
-            <a:ext cx="9144000" cy="91500"/>
-          </a:xfrm>
-          <a:prstGeom prst="rect">
-            <a:avLst/>
-          </a:prstGeom>
-          <a:solidFill>
-            <a:schemeClr val="accent6"/>
-          </a:solidFill>
-          <a:ln>
-            <a:noFill/>
-          </a:ln>
-        </p:spPr>
-        <p:txBody>
-          <a:bodyPr anchorCtr="0" anchor="ctr" bIns="91425" lIns="91425" spcFirstLastPara="1" rIns="91425" wrap="square" tIns="91425">
-            <a:noAutofit/>
-          </a:bodyPr>
-          <a:lstStyle/>
-          <a:p>
-            <a:pPr indent="0" lvl="0" marL="0" rtl="0" algn="l">
-              <a:spcBef>
-                <a:spcPts val="0"/>
-              </a:spcBef>
-              <a:spcAft>
-                <a:spcPts val="0"/>
-              </a:spcAft>
-              <a:buNone/>
-            </a:pPr>
-            <a:r>
-              <a:t/>
-            </a:r>
-            <a:endParaRPr/>
-          </a:p>
-        </p:txBody>
-      </p:sp>
-    </p:spTree>
-  </p:cSld>
-  <p:clrMapOvr>
-    <a:masterClrMapping/>
-  </p:clrMapOvr>
-</p:sldLayout>
-</file>
-
-<file path=ppt/slideLayouts/slideLayout3.xml><?xml version="1.0" encoding="utf-8"?>
-<p:sldLayout xmlns:a="http://schemas.openxmlformats.org/drawingml/2006/main" xmlns:r="http://schemas.openxmlformats.org/officeDocument/2006/relationships" xmlns:mc="http://schemas.openxmlformats.org/markup-compatibility/2006" xmlns:mv="urn:schemas-microsoft-com:mac:vml" xmlns:p="http://schemas.openxmlformats.org/presentationml/2006/main" xmlns:c="http://schemas.openxmlformats.org/drawingml/2006/chart" xmlns:dgm="http://schemas.openxmlformats.org/drawingml/2006/diagram" xmlns:o="urn:schemas-microsoft-com:office:office" xmlns:v="urn:schemas-microsoft-com:vml" xmlns:pvml="urn:schemas-microsoft-com:office:powerpoint" xmlns:com="http://schemas.openxmlformats.org/drawingml/2006/compatibility" xmlns:p14="http://schemas.microsoft.com/office/powerpoint/2010/main" xmlns:p15="http://schemas.microsoft.com/office/powerpoint/2012/main" xmlns:ahyp="http://schemas.microsoft.com/office/drawing/2018/hyperlinkcolor" matchingName="Title and body" type="tx">
-  <p:cSld name="TITLE_AND_BODY">
     <p:spTree>
       <p:nvGrpSpPr>
         <p:cNvPr id="16" name="Shape 16"/>
@@ -4150,7 +4058,301 @@
       </p:grpSpPr>
       <p:sp>
         <p:nvSpPr>
-          <p:cNvPr id="17" name="Google Shape;17;p4"/>
+          <p:cNvPr id="17" name="Google Shape;17;p3"/>
+          <p:cNvSpPr txBox="1"/>
+          <p:nvPr>
+            <p:ph type="title"/>
+          </p:nvPr>
+        </p:nvSpPr>
+        <p:spPr>
+          <a:xfrm>
+            <a:off x="0" y="-7"/>
+            <a:ext cx="9144000" cy="2386500"/>
+          </a:xfrm>
+          <a:prstGeom prst="rect">
+            <a:avLst/>
+          </a:prstGeom>
+        </p:spPr>
+        <p:txBody>
+          <a:bodyPr anchorCtr="0" anchor="b" bIns="274300" lIns="91425" spcFirstLastPara="1" rIns="91425" wrap="square" tIns="91425">
+            <a:noAutofit/>
+          </a:bodyPr>
+          <a:lstStyle>
+            <a:lvl1pPr lvl="0" algn="ctr">
+              <a:spcBef>
+                <a:spcPts val="0"/>
+              </a:spcBef>
+              <a:spcAft>
+                <a:spcPts val="0"/>
+              </a:spcAft>
+              <a:buSzPts val="3000"/>
+              <a:buNone/>
+              <a:defRPr sz="3000"/>
+            </a:lvl1pPr>
+            <a:lvl2pPr lvl="1" algn="ctr">
+              <a:spcBef>
+                <a:spcPts val="0"/>
+              </a:spcBef>
+              <a:spcAft>
+                <a:spcPts val="0"/>
+              </a:spcAft>
+              <a:buSzPts val="3600"/>
+              <a:buNone/>
+              <a:defRPr sz="3600"/>
+            </a:lvl2pPr>
+            <a:lvl3pPr lvl="2" algn="ctr">
+              <a:spcBef>
+                <a:spcPts val="0"/>
+              </a:spcBef>
+              <a:spcAft>
+                <a:spcPts val="0"/>
+              </a:spcAft>
+              <a:buSzPts val="3600"/>
+              <a:buNone/>
+              <a:defRPr sz="3600"/>
+            </a:lvl3pPr>
+            <a:lvl4pPr lvl="3" algn="ctr">
+              <a:spcBef>
+                <a:spcPts val="0"/>
+              </a:spcBef>
+              <a:spcAft>
+                <a:spcPts val="0"/>
+              </a:spcAft>
+              <a:buSzPts val="3600"/>
+              <a:buNone/>
+              <a:defRPr sz="3600"/>
+            </a:lvl4pPr>
+            <a:lvl5pPr lvl="4" algn="ctr">
+              <a:spcBef>
+                <a:spcPts val="0"/>
+              </a:spcBef>
+              <a:spcAft>
+                <a:spcPts val="0"/>
+              </a:spcAft>
+              <a:buSzPts val="3600"/>
+              <a:buNone/>
+              <a:defRPr sz="3600"/>
+            </a:lvl5pPr>
+            <a:lvl6pPr lvl="5" algn="ctr">
+              <a:spcBef>
+                <a:spcPts val="0"/>
+              </a:spcBef>
+              <a:spcAft>
+                <a:spcPts val="0"/>
+              </a:spcAft>
+              <a:buSzPts val="3600"/>
+              <a:buNone/>
+              <a:defRPr sz="3600"/>
+            </a:lvl6pPr>
+            <a:lvl7pPr lvl="6" algn="ctr">
+              <a:spcBef>
+                <a:spcPts val="0"/>
+              </a:spcBef>
+              <a:spcAft>
+                <a:spcPts val="0"/>
+              </a:spcAft>
+              <a:buSzPts val="3600"/>
+              <a:buNone/>
+              <a:defRPr sz="3600"/>
+            </a:lvl7pPr>
+            <a:lvl8pPr lvl="7" algn="ctr">
+              <a:spcBef>
+                <a:spcPts val="0"/>
+              </a:spcBef>
+              <a:spcAft>
+                <a:spcPts val="0"/>
+              </a:spcAft>
+              <a:buSzPts val="3600"/>
+              <a:buNone/>
+              <a:defRPr sz="3600"/>
+            </a:lvl8pPr>
+            <a:lvl9pPr lvl="8" algn="ctr">
+              <a:spcBef>
+                <a:spcPts val="0"/>
+              </a:spcBef>
+              <a:spcAft>
+                <a:spcPts val="0"/>
+              </a:spcAft>
+              <a:buSzPts val="3600"/>
+              <a:buNone/>
+              <a:defRPr sz="3600"/>
+            </a:lvl9pPr>
+          </a:lstStyle>
+          <a:p/>
+        </p:txBody>
+      </p:sp>
+      <p:grpSp>
+        <p:nvGrpSpPr>
+          <p:cNvPr id="18" name="Google Shape;18;p3"/>
+          <p:cNvGrpSpPr/>
+          <p:nvPr/>
+        </p:nvGrpSpPr>
+        <p:grpSpPr>
+          <a:xfrm>
+            <a:off x="0" y="2432304"/>
+            <a:ext cx="9144000" cy="91500"/>
+            <a:chOff x="0" y="2386584"/>
+            <a:chExt cx="9144000" cy="91500"/>
+          </a:xfrm>
+        </p:grpSpPr>
+        <p:sp>
+          <p:nvSpPr>
+            <p:cNvPr id="19" name="Google Shape;19;p3"/>
+            <p:cNvSpPr/>
+            <p:nvPr/>
+          </p:nvSpPr>
+          <p:spPr>
+            <a:xfrm>
+              <a:off x="0" y="2386584"/>
+              <a:ext cx="914400" cy="91500"/>
+            </a:xfrm>
+            <a:prstGeom prst="rect">
+              <a:avLst/>
+            </a:prstGeom>
+            <a:solidFill>
+              <a:schemeClr val="accent2"/>
+            </a:solidFill>
+            <a:ln>
+              <a:noFill/>
+            </a:ln>
+          </p:spPr>
+          <p:txBody>
+            <a:bodyPr anchorCtr="0" anchor="ctr" bIns="91425" lIns="91425" spcFirstLastPara="1" rIns="91425" wrap="square" tIns="91425">
+              <a:noAutofit/>
+            </a:bodyPr>
+            <a:lstStyle/>
+            <a:p>
+              <a:pPr indent="0" lvl="0" marL="0" rtl="0" algn="l">
+                <a:spcBef>
+                  <a:spcPts val="0"/>
+                </a:spcBef>
+                <a:spcAft>
+                  <a:spcPts val="0"/>
+                </a:spcAft>
+                <a:buNone/>
+              </a:pPr>
+              <a:r>
+                <a:t/>
+              </a:r>
+              <a:endParaRPr/>
+            </a:p>
+          </p:txBody>
+        </p:sp>
+        <p:sp>
+          <p:nvSpPr>
+            <p:cNvPr id="20" name="Google Shape;20;p3"/>
+            <p:cNvSpPr/>
+            <p:nvPr/>
+          </p:nvSpPr>
+          <p:spPr>
+            <a:xfrm>
+              <a:off x="914400" y="2386584"/>
+              <a:ext cx="1828800" cy="91500"/>
+            </a:xfrm>
+            <a:prstGeom prst="rect">
+              <a:avLst/>
+            </a:prstGeom>
+            <a:solidFill>
+              <a:schemeClr val="accent3"/>
+            </a:solidFill>
+            <a:ln>
+              <a:noFill/>
+            </a:ln>
+          </p:spPr>
+          <p:txBody>
+            <a:bodyPr anchorCtr="0" anchor="ctr" bIns="91425" lIns="91425" spcFirstLastPara="1" rIns="91425" wrap="square" tIns="91425">
+              <a:noAutofit/>
+            </a:bodyPr>
+            <a:lstStyle/>
+            <a:p>
+              <a:pPr indent="0" lvl="0" marL="0" rtl="0" algn="l">
+                <a:spcBef>
+                  <a:spcPts val="0"/>
+                </a:spcBef>
+                <a:spcAft>
+                  <a:spcPts val="0"/>
+                </a:spcAft>
+                <a:buNone/>
+              </a:pPr>
+              <a:r>
+                <a:t/>
+              </a:r>
+              <a:endParaRPr/>
+            </a:p>
+          </p:txBody>
+        </p:sp>
+        <p:sp>
+          <p:nvSpPr>
+            <p:cNvPr id="21" name="Google Shape;21;p3"/>
+            <p:cNvSpPr/>
+            <p:nvPr/>
+          </p:nvSpPr>
+          <p:spPr>
+            <a:xfrm>
+              <a:off x="2743200" y="2386584"/>
+              <a:ext cx="6400800" cy="91500"/>
+            </a:xfrm>
+            <a:prstGeom prst="rect">
+              <a:avLst/>
+            </a:prstGeom>
+            <a:solidFill>
+              <a:schemeClr val="accent4"/>
+            </a:solidFill>
+            <a:ln>
+              <a:noFill/>
+            </a:ln>
+          </p:spPr>
+          <p:txBody>
+            <a:bodyPr anchorCtr="0" anchor="ctr" bIns="91425" lIns="91425" spcFirstLastPara="1" rIns="91425" wrap="square" tIns="91425">
+              <a:noAutofit/>
+            </a:bodyPr>
+            <a:lstStyle/>
+            <a:p>
+              <a:pPr indent="0" lvl="0" marL="0" rtl="0" algn="l">
+                <a:spcBef>
+                  <a:spcPts val="0"/>
+                </a:spcBef>
+                <a:spcAft>
+                  <a:spcPts val="0"/>
+                </a:spcAft>
+                <a:buNone/>
+              </a:pPr>
+              <a:r>
+                <a:t/>
+              </a:r>
+              <a:endParaRPr/>
+            </a:p>
+          </p:txBody>
+        </p:sp>
+      </p:grpSp>
+    </p:spTree>
+  </p:cSld>
+  <p:clrMapOvr>
+    <a:masterClrMapping/>
+  </p:clrMapOvr>
+</p:sldLayout>
+</file>
+
+<file path=ppt/slideLayouts/slideLayout3.xml><?xml version="1.0" encoding="utf-8"?>
+<p:sldLayout xmlns:a="http://schemas.openxmlformats.org/drawingml/2006/main" xmlns:r="http://schemas.openxmlformats.org/officeDocument/2006/relationships" xmlns:mc="http://schemas.openxmlformats.org/markup-compatibility/2006" xmlns:mv="urn:schemas-microsoft-com:mac:vml" xmlns:p="http://schemas.openxmlformats.org/presentationml/2006/main" xmlns:c="http://schemas.openxmlformats.org/drawingml/2006/chart" xmlns:dgm="http://schemas.openxmlformats.org/drawingml/2006/diagram" xmlns:o="urn:schemas-microsoft-com:office:office" xmlns:v="urn:schemas-microsoft-com:vml" xmlns:pvml="urn:schemas-microsoft-com:office:powerpoint" xmlns:com="http://schemas.openxmlformats.org/drawingml/2006/compatibility" xmlns:p14="http://schemas.microsoft.com/office/powerpoint/2010/main" xmlns:p15="http://schemas.microsoft.com/office/powerpoint/2012/main" xmlns:ahyp="http://schemas.microsoft.com/office/drawing/2018/hyperlinkcolor" matchingName="Title and body" type="tx">
+  <p:cSld name="TITLE_AND_BODY">
+    <p:spTree>
+      <p:nvGrpSpPr>
+        <p:cNvPr id="22" name="Shape 22"/>
+        <p:cNvGrpSpPr/>
+        <p:nvPr/>
+      </p:nvGrpSpPr>
+      <p:grpSpPr>
+        <a:xfrm>
+          <a:off x="0" y="0"/>
+          <a:ext cx="0" cy="0"/>
+          <a:chOff x="0" y="0"/>
+          <a:chExt cx="0" cy="0"/>
+        </a:xfrm>
+      </p:grpSpPr>
+      <p:sp>
+        <p:nvSpPr>
+          <p:cNvPr id="23" name="Google Shape;23;p4"/>
           <p:cNvSpPr txBox="1"/>
           <p:nvPr>
             <p:ph type="title"/>
@@ -4275,7 +4477,7 @@
       </p:sp>
       <p:sp>
         <p:nvSpPr>
-          <p:cNvPr id="18" name="Google Shape;18;p4"/>
+          <p:cNvPr id="24" name="Google Shape;24;p4"/>
           <p:cNvSpPr txBox="1"/>
           <p:nvPr>
             <p:ph idx="1" type="body"/>
@@ -4400,7 +4602,7 @@
       </p:sp>
       <p:sp>
         <p:nvSpPr>
-          <p:cNvPr id="19" name="Google Shape;19;p4"/>
+          <p:cNvPr id="25" name="Google Shape;25;p4"/>
           <p:cNvSpPr txBox="1"/>
           <p:nvPr>
             <p:ph idx="12" type="sldNum"/>
@@ -4420,7 +4622,7 @@
             <a:noAutofit/>
           </a:bodyPr>
           <a:lstStyle>
-            <a:lvl1pPr lvl="0">
+            <a:lvl1pPr lvl="0" rtl="0">
               <a:buNone/>
               <a:defRPr>
                 <a:solidFill>
@@ -4428,7 +4630,7 @@
                 </a:solidFill>
               </a:defRPr>
             </a:lvl1pPr>
-            <a:lvl2pPr lvl="1">
+            <a:lvl2pPr lvl="1" rtl="0">
               <a:buNone/>
               <a:defRPr>
                 <a:solidFill>
@@ -4436,7 +4638,7 @@
                 </a:solidFill>
               </a:defRPr>
             </a:lvl2pPr>
-            <a:lvl3pPr lvl="2">
+            <a:lvl3pPr lvl="2" rtl="0">
               <a:buNone/>
               <a:defRPr>
                 <a:solidFill>
@@ -4444,7 +4646,7 @@
                 </a:solidFill>
               </a:defRPr>
             </a:lvl3pPr>
-            <a:lvl4pPr lvl="3">
+            <a:lvl4pPr lvl="3" rtl="0">
               <a:buNone/>
               <a:defRPr>
                 <a:solidFill>
@@ -4452,7 +4654,7 @@
                 </a:solidFill>
               </a:defRPr>
             </a:lvl4pPr>
-            <a:lvl5pPr lvl="4">
+            <a:lvl5pPr lvl="4" rtl="0">
               <a:buNone/>
               <a:defRPr>
                 <a:solidFill>
@@ -4460,7 +4662,7 @@
                 </a:solidFill>
               </a:defRPr>
             </a:lvl5pPr>
-            <a:lvl6pPr lvl="5">
+            <a:lvl6pPr lvl="5" rtl="0">
               <a:buNone/>
               <a:defRPr>
                 <a:solidFill>
@@ -4468,7 +4670,7 @@
                 </a:solidFill>
               </a:defRPr>
             </a:lvl6pPr>
-            <a:lvl7pPr lvl="6">
+            <a:lvl7pPr lvl="6" rtl="0">
               <a:buNone/>
               <a:defRPr>
                 <a:solidFill>
@@ -4476,7 +4678,7 @@
                 </a:solidFill>
               </a:defRPr>
             </a:lvl7pPr>
-            <a:lvl8pPr lvl="7">
+            <a:lvl8pPr lvl="7" rtl="0">
               <a:buNone/>
               <a:defRPr>
                 <a:solidFill>
@@ -4484,7 +4686,7 @@
                 </a:solidFill>
               </a:defRPr>
             </a:lvl8pPr>
-            <a:lvl9pPr lvl="8">
+            <a:lvl9pPr lvl="8" rtl="0">
               <a:buNone/>
               <a:defRPr>
                 <a:solidFill>
@@ -4526,7 +4728,7 @@
                 </a:solidFill>
                 <a:hlinkClick r:id="rId2"/>
               </a:rPr>
-              <a:t>https://profriehle.com</a:t>
+              <a:t>https://oss.cs.fau.de</a:t>
             </a:r>
             <a:r>
               <a:rPr b="0" lang="en" sz="900">
@@ -4536,53 +4738,158 @@
               </a:rPr>
               <a:t> </a:t>
             </a:r>
-            <a:endParaRPr/>
+            <a:endParaRPr b="0" sz="900">
+              <a:solidFill>
+                <a:schemeClr val="dk2"/>
+              </a:solidFill>
+            </a:endParaRPr>
           </a:p>
         </p:txBody>
       </p:sp>
-      <p:sp>
-        <p:nvSpPr>
-          <p:cNvPr id="20" name="Google Shape;20;p4"/>
-          <p:cNvSpPr/>
+      <p:grpSp>
+        <p:nvGrpSpPr>
+          <p:cNvPr id="26" name="Google Shape;26;p4"/>
+          <p:cNvGrpSpPr/>
           <p:nvPr/>
-        </p:nvSpPr>
-        <p:spPr>
+        </p:nvGrpSpPr>
+        <p:grpSpPr>
           <a:xfrm>
             <a:off x="0" y="685800"/>
             <a:ext cx="9144000" cy="91500"/>
-          </a:xfrm>
-          <a:prstGeom prst="rect">
-            <a:avLst/>
-          </a:prstGeom>
-          <a:solidFill>
-            <a:schemeClr val="accent6"/>
-          </a:solidFill>
-          <a:ln>
-            <a:noFill/>
-          </a:ln>
-        </p:spPr>
-        <p:txBody>
-          <a:bodyPr anchorCtr="0" anchor="ctr" bIns="91425" lIns="91425" spcFirstLastPara="1" rIns="91425" wrap="square" tIns="91425">
-            <a:noAutofit/>
-          </a:bodyPr>
-          <a:lstStyle/>
-          <a:p>
-            <a:pPr indent="0" lvl="0" marL="0" rtl="0" algn="l">
-              <a:spcBef>
-                <a:spcPts val="0"/>
-              </a:spcBef>
-              <a:spcAft>
-                <a:spcPts val="0"/>
-              </a:spcAft>
-              <a:buNone/>
-            </a:pPr>
-            <a:r>
-              <a:t/>
-            </a:r>
-            <a:endParaRPr/>
-          </a:p>
-        </p:txBody>
-      </p:sp>
+            <a:chOff x="0" y="2386584"/>
+            <a:chExt cx="9144000" cy="91500"/>
+          </a:xfrm>
+        </p:grpSpPr>
+        <p:sp>
+          <p:nvSpPr>
+            <p:cNvPr id="27" name="Google Shape;27;p4"/>
+            <p:cNvSpPr/>
+            <p:nvPr/>
+          </p:nvSpPr>
+          <p:spPr>
+            <a:xfrm>
+              <a:off x="0" y="2386584"/>
+              <a:ext cx="914400" cy="91500"/>
+            </a:xfrm>
+            <a:prstGeom prst="rect">
+              <a:avLst/>
+            </a:prstGeom>
+            <a:solidFill>
+              <a:schemeClr val="accent2"/>
+            </a:solidFill>
+            <a:ln>
+              <a:noFill/>
+            </a:ln>
+          </p:spPr>
+          <p:txBody>
+            <a:bodyPr anchorCtr="0" anchor="ctr" bIns="91425" lIns="91425" spcFirstLastPara="1" rIns="91425" wrap="square" tIns="91425">
+              <a:noAutofit/>
+            </a:bodyPr>
+            <a:lstStyle/>
+            <a:p>
+              <a:pPr indent="0" lvl="0" marL="0" rtl="0" algn="l">
+                <a:spcBef>
+                  <a:spcPts val="0"/>
+                </a:spcBef>
+                <a:spcAft>
+                  <a:spcPts val="0"/>
+                </a:spcAft>
+                <a:buNone/>
+              </a:pPr>
+              <a:r>
+                <a:t/>
+              </a:r>
+              <a:endParaRPr/>
+            </a:p>
+          </p:txBody>
+        </p:sp>
+        <p:sp>
+          <p:nvSpPr>
+            <p:cNvPr id="28" name="Google Shape;28;p4"/>
+            <p:cNvSpPr/>
+            <p:nvPr/>
+          </p:nvSpPr>
+          <p:spPr>
+            <a:xfrm>
+              <a:off x="914400" y="2386584"/>
+              <a:ext cx="1828800" cy="91500"/>
+            </a:xfrm>
+            <a:prstGeom prst="rect">
+              <a:avLst/>
+            </a:prstGeom>
+            <a:solidFill>
+              <a:schemeClr val="accent3"/>
+            </a:solidFill>
+            <a:ln>
+              <a:noFill/>
+            </a:ln>
+          </p:spPr>
+          <p:txBody>
+            <a:bodyPr anchorCtr="0" anchor="ctr" bIns="91425" lIns="91425" spcFirstLastPara="1" rIns="91425" wrap="square" tIns="91425">
+              <a:noAutofit/>
+            </a:bodyPr>
+            <a:lstStyle/>
+            <a:p>
+              <a:pPr indent="0" lvl="0" marL="0" rtl="0" algn="l">
+                <a:spcBef>
+                  <a:spcPts val="0"/>
+                </a:spcBef>
+                <a:spcAft>
+                  <a:spcPts val="0"/>
+                </a:spcAft>
+                <a:buNone/>
+              </a:pPr>
+              <a:r>
+                <a:t/>
+              </a:r>
+              <a:endParaRPr/>
+            </a:p>
+          </p:txBody>
+        </p:sp>
+        <p:sp>
+          <p:nvSpPr>
+            <p:cNvPr id="29" name="Google Shape;29;p4"/>
+            <p:cNvSpPr/>
+            <p:nvPr/>
+          </p:nvSpPr>
+          <p:spPr>
+            <a:xfrm>
+              <a:off x="2743200" y="2386584"/>
+              <a:ext cx="6400800" cy="91500"/>
+            </a:xfrm>
+            <a:prstGeom prst="rect">
+              <a:avLst/>
+            </a:prstGeom>
+            <a:solidFill>
+              <a:schemeClr val="accent4"/>
+            </a:solidFill>
+            <a:ln>
+              <a:noFill/>
+            </a:ln>
+          </p:spPr>
+          <p:txBody>
+            <a:bodyPr anchorCtr="0" anchor="ctr" bIns="91425" lIns="91425" spcFirstLastPara="1" rIns="91425" wrap="square" tIns="91425">
+              <a:noAutofit/>
+            </a:bodyPr>
+            <a:lstStyle/>
+            <a:p>
+              <a:pPr indent="0" lvl="0" marL="0" rtl="0" algn="l">
+                <a:spcBef>
+                  <a:spcPts val="0"/>
+                </a:spcBef>
+                <a:spcAft>
+                  <a:spcPts val="0"/>
+                </a:spcAft>
+                <a:buNone/>
+              </a:pPr>
+              <a:r>
+                <a:t/>
+              </a:r>
+              <a:endParaRPr/>
+            </a:p>
+          </p:txBody>
+        </p:sp>
+      </p:grpSp>
     </p:spTree>
   </p:cSld>
   <p:clrMapOvr>
@@ -4596,7 +4903,7 @@
   <p:cSld name="TITLE_AND_TWO_COLUMNS">
     <p:spTree>
       <p:nvGrpSpPr>
-        <p:cNvPr id="21" name="Shape 21"/>
+        <p:cNvPr id="30" name="Shape 30"/>
         <p:cNvGrpSpPr/>
         <p:nvPr/>
       </p:nvGrpSpPr>
@@ -4610,7 +4917,7 @@
       </p:grpSpPr>
       <p:sp>
         <p:nvSpPr>
-          <p:cNvPr id="22" name="Google Shape;22;p5"/>
+          <p:cNvPr id="31" name="Google Shape;31;p5"/>
           <p:cNvSpPr txBox="1"/>
           <p:nvPr>
             <p:ph type="title"/>
@@ -4738,7 +5045,7 @@
       </p:sp>
       <p:sp>
         <p:nvSpPr>
-          <p:cNvPr id="23" name="Google Shape;23;p5"/>
+          <p:cNvPr id="32" name="Google Shape;32;p5"/>
           <p:cNvSpPr txBox="1"/>
           <p:nvPr>
             <p:ph idx="1" type="body"/>
@@ -4863,7 +5170,7 @@
       </p:sp>
       <p:sp>
         <p:nvSpPr>
-          <p:cNvPr id="24" name="Google Shape;24;p5"/>
+          <p:cNvPr id="33" name="Google Shape;33;p5"/>
           <p:cNvSpPr txBox="1"/>
           <p:nvPr>
             <p:ph idx="2" type="body"/>
@@ -4988,7 +5295,7 @@
       </p:sp>
       <p:sp>
         <p:nvSpPr>
-          <p:cNvPr id="25" name="Google Shape;25;p5"/>
+          <p:cNvPr id="34" name="Google Shape;34;p5"/>
           <p:cNvSpPr txBox="1"/>
           <p:nvPr>
             <p:ph idx="12" type="sldNum"/>
@@ -5105,6 +5412,11 @@
               <a:spcAft>
                 <a:spcPts val="0"/>
               </a:spcAft>
+              <a:buClr>
+                <a:schemeClr val="dk1"/>
+              </a:buClr>
+              <a:buSzPts val="1100"/>
+              <a:buFont typeface="Arial"/>
               <a:buNone/>
             </a:pPr>
             <a:r>
@@ -5114,63 +5426,160 @@
                 </a:solidFill>
                 <a:hlinkClick r:id="rId2"/>
               </a:rPr>
-              <a:t>https://profriehle.com</a:t>
-            </a:r>
-            <a:r>
-              <a:rPr b="0" lang="en" sz="900">
-                <a:solidFill>
-                  <a:schemeClr val="dk2"/>
-                </a:solidFill>
-              </a:rPr>
-              <a:t> </a:t>
-            </a:r>
-            <a:endParaRPr/>
+              <a:t>https://oss.cs.fau.de</a:t>
+            </a:r>
+            <a:endParaRPr>
+              <a:solidFill>
+                <a:schemeClr val="dk2"/>
+              </a:solidFill>
+            </a:endParaRPr>
           </a:p>
         </p:txBody>
       </p:sp>
-      <p:sp>
-        <p:nvSpPr>
-          <p:cNvPr id="26" name="Google Shape;26;p5"/>
-          <p:cNvSpPr/>
+      <p:grpSp>
+        <p:nvGrpSpPr>
+          <p:cNvPr id="35" name="Google Shape;35;p5"/>
+          <p:cNvGrpSpPr/>
           <p:nvPr/>
-        </p:nvSpPr>
-        <p:spPr>
+        </p:nvGrpSpPr>
+        <p:grpSpPr>
           <a:xfrm>
             <a:off x="0" y="685800"/>
             <a:ext cx="9144000" cy="91500"/>
-          </a:xfrm>
-          <a:prstGeom prst="rect">
-            <a:avLst/>
-          </a:prstGeom>
-          <a:solidFill>
-            <a:schemeClr val="accent6"/>
-          </a:solidFill>
-          <a:ln>
-            <a:noFill/>
-          </a:ln>
-        </p:spPr>
-        <p:txBody>
-          <a:bodyPr anchorCtr="0" anchor="ctr" bIns="91425" lIns="91425" spcFirstLastPara="1" rIns="91425" wrap="square" tIns="91425">
-            <a:noAutofit/>
-          </a:bodyPr>
-          <a:lstStyle/>
-          <a:p>
-            <a:pPr indent="0" lvl="0" marL="0" rtl="0" algn="l">
-              <a:spcBef>
-                <a:spcPts val="0"/>
-              </a:spcBef>
-              <a:spcAft>
-                <a:spcPts val="0"/>
-              </a:spcAft>
-              <a:buNone/>
-            </a:pPr>
-            <a:r>
-              <a:t/>
-            </a:r>
-            <a:endParaRPr/>
-          </a:p>
-        </p:txBody>
-      </p:sp>
+            <a:chOff x="0" y="2386584"/>
+            <a:chExt cx="9144000" cy="91500"/>
+          </a:xfrm>
+        </p:grpSpPr>
+        <p:sp>
+          <p:nvSpPr>
+            <p:cNvPr id="36" name="Google Shape;36;p5"/>
+            <p:cNvSpPr/>
+            <p:nvPr/>
+          </p:nvSpPr>
+          <p:spPr>
+            <a:xfrm>
+              <a:off x="0" y="2386584"/>
+              <a:ext cx="914400" cy="91500"/>
+            </a:xfrm>
+            <a:prstGeom prst="rect">
+              <a:avLst/>
+            </a:prstGeom>
+            <a:solidFill>
+              <a:schemeClr val="accent2"/>
+            </a:solidFill>
+            <a:ln>
+              <a:noFill/>
+            </a:ln>
+          </p:spPr>
+          <p:txBody>
+            <a:bodyPr anchorCtr="0" anchor="ctr" bIns="91425" lIns="91425" spcFirstLastPara="1" rIns="91425" wrap="square" tIns="91425">
+              <a:noAutofit/>
+            </a:bodyPr>
+            <a:lstStyle/>
+            <a:p>
+              <a:pPr indent="0" lvl="0" marL="0" rtl="0" algn="l">
+                <a:spcBef>
+                  <a:spcPts val="0"/>
+                </a:spcBef>
+                <a:spcAft>
+                  <a:spcPts val="0"/>
+                </a:spcAft>
+                <a:buNone/>
+              </a:pPr>
+              <a:r>
+                <a:t/>
+              </a:r>
+              <a:endParaRPr/>
+            </a:p>
+          </p:txBody>
+        </p:sp>
+        <p:sp>
+          <p:nvSpPr>
+            <p:cNvPr id="37" name="Google Shape;37;p5"/>
+            <p:cNvSpPr/>
+            <p:nvPr/>
+          </p:nvSpPr>
+          <p:spPr>
+            <a:xfrm>
+              <a:off x="914400" y="2386584"/>
+              <a:ext cx="1828800" cy="91500"/>
+            </a:xfrm>
+            <a:prstGeom prst="rect">
+              <a:avLst/>
+            </a:prstGeom>
+            <a:solidFill>
+              <a:schemeClr val="accent3"/>
+            </a:solidFill>
+            <a:ln>
+              <a:noFill/>
+            </a:ln>
+          </p:spPr>
+          <p:txBody>
+            <a:bodyPr anchorCtr="0" anchor="ctr" bIns="91425" lIns="91425" spcFirstLastPara="1" rIns="91425" wrap="square" tIns="91425">
+              <a:noAutofit/>
+            </a:bodyPr>
+            <a:lstStyle/>
+            <a:p>
+              <a:pPr indent="0" lvl="0" marL="0" rtl="0" algn="l">
+                <a:spcBef>
+                  <a:spcPts val="0"/>
+                </a:spcBef>
+                <a:spcAft>
+                  <a:spcPts val="0"/>
+                </a:spcAft>
+                <a:buNone/>
+              </a:pPr>
+              <a:r>
+                <a:t/>
+              </a:r>
+              <a:endParaRPr/>
+            </a:p>
+          </p:txBody>
+        </p:sp>
+        <p:sp>
+          <p:nvSpPr>
+            <p:cNvPr id="38" name="Google Shape;38;p5"/>
+            <p:cNvSpPr/>
+            <p:nvPr/>
+          </p:nvSpPr>
+          <p:spPr>
+            <a:xfrm>
+              <a:off x="2743200" y="2386584"/>
+              <a:ext cx="6400800" cy="91500"/>
+            </a:xfrm>
+            <a:prstGeom prst="rect">
+              <a:avLst/>
+            </a:prstGeom>
+            <a:solidFill>
+              <a:schemeClr val="accent4"/>
+            </a:solidFill>
+            <a:ln>
+              <a:noFill/>
+            </a:ln>
+          </p:spPr>
+          <p:txBody>
+            <a:bodyPr anchorCtr="0" anchor="ctr" bIns="91425" lIns="91425" spcFirstLastPara="1" rIns="91425" wrap="square" tIns="91425">
+              <a:noAutofit/>
+            </a:bodyPr>
+            <a:lstStyle/>
+            <a:p>
+              <a:pPr indent="0" lvl="0" marL="0" rtl="0" algn="l">
+                <a:spcBef>
+                  <a:spcPts val="0"/>
+                </a:spcBef>
+                <a:spcAft>
+                  <a:spcPts val="0"/>
+                </a:spcAft>
+                <a:buNone/>
+              </a:pPr>
+              <a:r>
+                <a:t/>
+              </a:r>
+              <a:endParaRPr/>
+            </a:p>
+          </p:txBody>
+        </p:sp>
+      </p:grpSp>
     </p:spTree>
   </p:cSld>
   <p:clrMapOvr>
@@ -5184,7 +5593,7 @@
   <p:cSld name="TITLE_ONLY">
     <p:spTree>
       <p:nvGrpSpPr>
-        <p:cNvPr id="27" name="Shape 27"/>
+        <p:cNvPr id="39" name="Shape 39"/>
         <p:cNvGrpSpPr/>
         <p:nvPr/>
       </p:nvGrpSpPr>
@@ -5198,7 +5607,7 @@
       </p:grpSpPr>
       <p:sp>
         <p:nvSpPr>
-          <p:cNvPr id="28" name="Google Shape;28;p6"/>
+          <p:cNvPr id="40" name="Google Shape;40;p6"/>
           <p:cNvSpPr txBox="1"/>
           <p:nvPr>
             <p:ph type="title"/>
@@ -5323,7 +5732,7 @@
       </p:sp>
       <p:sp>
         <p:nvSpPr>
-          <p:cNvPr id="29" name="Google Shape;29;p6"/>
+          <p:cNvPr id="41" name="Google Shape;41;p6"/>
           <p:cNvSpPr txBox="1"/>
           <p:nvPr>
             <p:ph idx="12" type="sldNum"/>
@@ -5449,7 +5858,7 @@
                 </a:solidFill>
                 <a:hlinkClick r:id="rId2"/>
               </a:rPr>
-              <a:t>https://profriehle.com</a:t>
+              <a:t>https://oss.cs.fau.de</a:t>
             </a:r>
             <a:r>
               <a:rPr b="0" lang="en" sz="900">
@@ -5459,53 +5868,158 @@
               </a:rPr>
               <a:t> </a:t>
             </a:r>
-            <a:endParaRPr/>
+            <a:endParaRPr>
+              <a:solidFill>
+                <a:schemeClr val="dk2"/>
+              </a:solidFill>
+            </a:endParaRPr>
           </a:p>
         </p:txBody>
       </p:sp>
-      <p:sp>
-        <p:nvSpPr>
-          <p:cNvPr id="30" name="Google Shape;30;p6"/>
-          <p:cNvSpPr/>
+      <p:grpSp>
+        <p:nvGrpSpPr>
+          <p:cNvPr id="42" name="Google Shape;42;p6"/>
+          <p:cNvGrpSpPr/>
           <p:nvPr/>
-        </p:nvSpPr>
-        <p:spPr>
+        </p:nvGrpSpPr>
+        <p:grpSpPr>
           <a:xfrm>
             <a:off x="0" y="685800"/>
             <a:ext cx="9144000" cy="91500"/>
-          </a:xfrm>
-          <a:prstGeom prst="rect">
-            <a:avLst/>
-          </a:prstGeom>
-          <a:solidFill>
-            <a:schemeClr val="accent6"/>
-          </a:solidFill>
-          <a:ln>
-            <a:noFill/>
-          </a:ln>
-        </p:spPr>
-        <p:txBody>
-          <a:bodyPr anchorCtr="0" anchor="ctr" bIns="91425" lIns="91425" spcFirstLastPara="1" rIns="91425" wrap="square" tIns="91425">
-            <a:noAutofit/>
-          </a:bodyPr>
-          <a:lstStyle/>
-          <a:p>
-            <a:pPr indent="0" lvl="0" marL="0" rtl="0" algn="l">
-              <a:spcBef>
-                <a:spcPts val="0"/>
-              </a:spcBef>
-              <a:spcAft>
-                <a:spcPts val="0"/>
-              </a:spcAft>
-              <a:buNone/>
-            </a:pPr>
-            <a:r>
-              <a:t/>
-            </a:r>
-            <a:endParaRPr/>
-          </a:p>
-        </p:txBody>
-      </p:sp>
+            <a:chOff x="0" y="2386584"/>
+            <a:chExt cx="9144000" cy="91500"/>
+          </a:xfrm>
+        </p:grpSpPr>
+        <p:sp>
+          <p:nvSpPr>
+            <p:cNvPr id="43" name="Google Shape;43;p6"/>
+            <p:cNvSpPr/>
+            <p:nvPr/>
+          </p:nvSpPr>
+          <p:spPr>
+            <a:xfrm>
+              <a:off x="0" y="2386584"/>
+              <a:ext cx="914400" cy="91500"/>
+            </a:xfrm>
+            <a:prstGeom prst="rect">
+              <a:avLst/>
+            </a:prstGeom>
+            <a:solidFill>
+              <a:schemeClr val="accent2"/>
+            </a:solidFill>
+            <a:ln>
+              <a:noFill/>
+            </a:ln>
+          </p:spPr>
+          <p:txBody>
+            <a:bodyPr anchorCtr="0" anchor="ctr" bIns="91425" lIns="91425" spcFirstLastPara="1" rIns="91425" wrap="square" tIns="91425">
+              <a:noAutofit/>
+            </a:bodyPr>
+            <a:lstStyle/>
+            <a:p>
+              <a:pPr indent="0" lvl="0" marL="0" rtl="0" algn="l">
+                <a:spcBef>
+                  <a:spcPts val="0"/>
+                </a:spcBef>
+                <a:spcAft>
+                  <a:spcPts val="0"/>
+                </a:spcAft>
+                <a:buNone/>
+              </a:pPr>
+              <a:r>
+                <a:t/>
+              </a:r>
+              <a:endParaRPr/>
+            </a:p>
+          </p:txBody>
+        </p:sp>
+        <p:sp>
+          <p:nvSpPr>
+            <p:cNvPr id="44" name="Google Shape;44;p6"/>
+            <p:cNvSpPr/>
+            <p:nvPr/>
+          </p:nvSpPr>
+          <p:spPr>
+            <a:xfrm>
+              <a:off x="914400" y="2386584"/>
+              <a:ext cx="1828800" cy="91500"/>
+            </a:xfrm>
+            <a:prstGeom prst="rect">
+              <a:avLst/>
+            </a:prstGeom>
+            <a:solidFill>
+              <a:schemeClr val="accent3"/>
+            </a:solidFill>
+            <a:ln>
+              <a:noFill/>
+            </a:ln>
+          </p:spPr>
+          <p:txBody>
+            <a:bodyPr anchorCtr="0" anchor="ctr" bIns="91425" lIns="91425" spcFirstLastPara="1" rIns="91425" wrap="square" tIns="91425">
+              <a:noAutofit/>
+            </a:bodyPr>
+            <a:lstStyle/>
+            <a:p>
+              <a:pPr indent="0" lvl="0" marL="0" rtl="0" algn="l">
+                <a:spcBef>
+                  <a:spcPts val="0"/>
+                </a:spcBef>
+                <a:spcAft>
+                  <a:spcPts val="0"/>
+                </a:spcAft>
+                <a:buNone/>
+              </a:pPr>
+              <a:r>
+                <a:t/>
+              </a:r>
+              <a:endParaRPr/>
+            </a:p>
+          </p:txBody>
+        </p:sp>
+        <p:sp>
+          <p:nvSpPr>
+            <p:cNvPr id="45" name="Google Shape;45;p6"/>
+            <p:cNvSpPr/>
+            <p:nvPr/>
+          </p:nvSpPr>
+          <p:spPr>
+            <a:xfrm>
+              <a:off x="2743200" y="2386584"/>
+              <a:ext cx="6400800" cy="91500"/>
+            </a:xfrm>
+            <a:prstGeom prst="rect">
+              <a:avLst/>
+            </a:prstGeom>
+            <a:solidFill>
+              <a:schemeClr val="accent4"/>
+            </a:solidFill>
+            <a:ln>
+              <a:noFill/>
+            </a:ln>
+          </p:spPr>
+          <p:txBody>
+            <a:bodyPr anchorCtr="0" anchor="ctr" bIns="91425" lIns="91425" spcFirstLastPara="1" rIns="91425" wrap="square" tIns="91425">
+              <a:noAutofit/>
+            </a:bodyPr>
+            <a:lstStyle/>
+            <a:p>
+              <a:pPr indent="0" lvl="0" marL="0" rtl="0" algn="l">
+                <a:spcBef>
+                  <a:spcPts val="0"/>
+                </a:spcBef>
+                <a:spcAft>
+                  <a:spcPts val="0"/>
+                </a:spcAft>
+                <a:buNone/>
+              </a:pPr>
+              <a:r>
+                <a:t/>
+              </a:r>
+              <a:endParaRPr/>
+            </a:p>
+          </p:txBody>
+        </p:sp>
+      </p:grpSp>
     </p:spTree>
   </p:cSld>
   <p:clrMapOvr>
@@ -5519,7 +6033,7 @@
   <p:cSld name="BLANK">
     <p:spTree>
       <p:nvGrpSpPr>
-        <p:cNvPr id="31" name="Shape 31"/>
+        <p:cNvPr id="46" name="Shape 46"/>
         <p:cNvGrpSpPr/>
         <p:nvPr/>
       </p:nvGrpSpPr>
@@ -6106,7 +6620,7 @@
                 </a:solidFill>
                 <a:hlinkClick r:id="rId1"/>
               </a:rPr>
-              <a:t>https://profriehle.com</a:t>
+              <a:t>https://oss.cs.fau.de</a:t>
             </a:r>
             <a:r>
               <a:rPr b="0" lang="en" sz="900"/>
@@ -6825,7 +7339,7 @@
   <p:cSld>
     <p:spTree>
       <p:nvGrpSpPr>
-        <p:cNvPr id="35" name="Shape 35"/>
+        <p:cNvPr id="50" name="Shape 50"/>
         <p:cNvGrpSpPr/>
         <p:nvPr/>
       </p:nvGrpSpPr>
@@ -6839,7 +7353,7 @@
       </p:grpSpPr>
       <p:sp>
         <p:nvSpPr>
-          <p:cNvPr id="36" name="Google Shape;36;p8"/>
+          <p:cNvPr id="51" name="Google Shape;51;p8"/>
           <p:cNvSpPr txBox="1"/>
           <p:nvPr>
             <p:ph type="ctrTitle"/>
@@ -6879,7 +7393,7 @@
       </p:sp>
       <p:sp>
         <p:nvSpPr>
-          <p:cNvPr id="37" name="Google Shape;37;p8"/>
+          <p:cNvPr id="52" name="Google Shape;52;p8"/>
           <p:cNvSpPr txBox="1"/>
           <p:nvPr>
             <p:ph idx="1" type="subTitle"/>
@@ -7001,7 +7515,7 @@
   <p:cSld>
     <p:spTree>
       <p:nvGrpSpPr>
-        <p:cNvPr id="119" name="Shape 119"/>
+        <p:cNvPr id="134" name="Shape 134"/>
         <p:cNvGrpSpPr/>
         <p:nvPr/>
       </p:nvGrpSpPr>
@@ -7015,7 +7529,7 @@
       </p:grpSpPr>
       <p:sp>
         <p:nvSpPr>
-          <p:cNvPr id="120" name="Google Shape;120;p17"/>
+          <p:cNvPr id="135" name="Google Shape;135;p17"/>
           <p:cNvSpPr txBox="1"/>
           <p:nvPr>
             <p:ph type="title"/>
@@ -7055,7 +7569,7 @@
       </p:sp>
       <p:sp>
         <p:nvSpPr>
-          <p:cNvPr id="121" name="Google Shape;121;p17"/>
+          <p:cNvPr id="136" name="Google Shape;136;p17"/>
           <p:cNvSpPr txBox="1"/>
           <p:nvPr>
             <p:ph idx="12" type="sldNum"/>
@@ -7108,7 +7622,7 @@
                 </a:solidFill>
                 <a:hlinkClick r:id="rId3"/>
               </a:rPr>
-              <a:t>https://profriehle.com</a:t>
+              <a:t>https://oss.cs.fau.de</a:t>
             </a:r>
             <a:r>
               <a:rPr b="0" lang="en" sz="900">
@@ -7118,13 +7632,17 @@
               </a:rPr>
               <a:t> </a:t>
             </a:r>
-            <a:endParaRPr/>
+            <a:endParaRPr b="0" sz="900">
+              <a:solidFill>
+                <a:schemeClr val="dk2"/>
+              </a:solidFill>
+            </a:endParaRPr>
           </a:p>
         </p:txBody>
       </p:sp>
       <p:sp>
         <p:nvSpPr>
-          <p:cNvPr id="122" name="Google Shape;122;p17"/>
+          <p:cNvPr id="137" name="Google Shape;137;p17"/>
           <p:cNvSpPr txBox="1"/>
           <p:nvPr>
             <p:ph idx="1" type="body"/>
@@ -7327,7 +7845,7 @@
   <p:cSld>
     <p:spTree>
       <p:nvGrpSpPr>
-        <p:cNvPr id="126" name="Shape 126"/>
+        <p:cNvPr id="141" name="Shape 141"/>
         <p:cNvGrpSpPr/>
         <p:nvPr/>
       </p:nvGrpSpPr>
@@ -7341,7 +7859,7 @@
       </p:grpSpPr>
       <p:sp>
         <p:nvSpPr>
-          <p:cNvPr id="127" name="Google Shape;127;p18"/>
+          <p:cNvPr id="142" name="Google Shape;142;p18"/>
           <p:cNvSpPr txBox="1"/>
           <p:nvPr>
             <p:ph type="title"/>
@@ -7381,7 +7899,7 @@
       </p:sp>
       <p:sp>
         <p:nvSpPr>
-          <p:cNvPr id="128" name="Google Shape;128;p18"/>
+          <p:cNvPr id="143" name="Google Shape;143;p18"/>
           <p:cNvSpPr txBox="1"/>
           <p:nvPr>
             <p:ph idx="1" type="body"/>
@@ -7471,7 +7989,7 @@
       </p:sp>
       <p:sp>
         <p:nvSpPr>
-          <p:cNvPr id="129" name="Google Shape;129;p18"/>
+          <p:cNvPr id="144" name="Google Shape;144;p18"/>
           <p:cNvSpPr txBox="1"/>
           <p:nvPr>
             <p:ph idx="12" type="sldNum"/>
@@ -7524,7 +8042,7 @@
                 </a:solidFill>
                 <a:hlinkClick r:id="rId3"/>
               </a:rPr>
-              <a:t>https://profriehle.com</a:t>
+              <a:t>https://oss.cs.fau.de</a:t>
             </a:r>
             <a:r>
               <a:rPr b="0" lang="en" sz="900">
@@ -7534,7 +8052,11 @@
               </a:rPr>
               <a:t> </a:t>
             </a:r>
-            <a:endParaRPr/>
+            <a:endParaRPr b="0" sz="900">
+              <a:solidFill>
+                <a:schemeClr val="dk2"/>
+              </a:solidFill>
+            </a:endParaRPr>
           </a:p>
         </p:txBody>
       </p:sp>
@@ -7551,7 +8073,7 @@
   <p:cSld>
     <p:spTree>
       <p:nvGrpSpPr>
-        <p:cNvPr id="133" name="Shape 133"/>
+        <p:cNvPr id="148" name="Shape 148"/>
         <p:cNvGrpSpPr/>
         <p:nvPr/>
       </p:nvGrpSpPr>
@@ -7565,7 +8087,7 @@
       </p:grpSpPr>
       <p:sp>
         <p:nvSpPr>
-          <p:cNvPr id="134" name="Google Shape;134;p19"/>
+          <p:cNvPr id="149" name="Google Shape;149;p19"/>
           <p:cNvSpPr txBox="1"/>
           <p:nvPr>
             <p:ph type="title"/>
@@ -7605,7 +8127,7 @@
       </p:sp>
       <p:sp>
         <p:nvSpPr>
-          <p:cNvPr id="135" name="Google Shape;135;p19"/>
+          <p:cNvPr id="150" name="Google Shape;150;p19"/>
           <p:cNvSpPr txBox="1"/>
           <p:nvPr>
             <p:ph idx="12" type="sldNum"/>
@@ -7658,7 +8180,7 @@
                 </a:solidFill>
                 <a:hlinkClick r:id="rId3"/>
               </a:rPr>
-              <a:t>https://profriehle.com</a:t>
+              <a:t>https://oss.cs.fau.de</a:t>
             </a:r>
             <a:r>
               <a:rPr b="0" lang="en" sz="900">
@@ -7668,13 +8190,17 @@
               </a:rPr>
               <a:t> </a:t>
             </a:r>
-            <a:endParaRPr/>
+            <a:endParaRPr b="0" sz="900">
+              <a:solidFill>
+                <a:schemeClr val="dk2"/>
+              </a:solidFill>
+            </a:endParaRPr>
           </a:p>
         </p:txBody>
       </p:sp>
       <p:sp>
         <p:nvSpPr>
-          <p:cNvPr id="136" name="Google Shape;136;p19"/>
+          <p:cNvPr id="151" name="Google Shape;151;p19"/>
           <p:cNvSpPr txBox="1"/>
           <p:nvPr>
             <p:ph idx="1" type="body"/>
@@ -7776,7 +8302,7 @@
   <p:cSld>
     <p:spTree>
       <p:nvGrpSpPr>
-        <p:cNvPr id="140" name="Shape 140"/>
+        <p:cNvPr id="155" name="Shape 155"/>
         <p:cNvGrpSpPr/>
         <p:nvPr/>
       </p:nvGrpSpPr>
@@ -7790,7 +8316,7 @@
       </p:grpSpPr>
       <p:sp>
         <p:nvSpPr>
-          <p:cNvPr id="141" name="Google Shape;141;p20"/>
+          <p:cNvPr id="156" name="Google Shape;156;p20"/>
           <p:cNvSpPr txBox="1"/>
           <p:nvPr>
             <p:ph type="title"/>
@@ -7841,7 +8367,7 @@
   <p:cSld>
     <p:spTree>
       <p:nvGrpSpPr>
-        <p:cNvPr id="145" name="Shape 145"/>
+        <p:cNvPr id="160" name="Shape 160"/>
         <p:cNvGrpSpPr/>
         <p:nvPr/>
       </p:nvGrpSpPr>
@@ -7855,7 +8381,7 @@
       </p:grpSpPr>
       <p:sp>
         <p:nvSpPr>
-          <p:cNvPr id="146" name="Google Shape;146;p21"/>
+          <p:cNvPr id="161" name="Google Shape;161;p21"/>
           <p:cNvSpPr txBox="1"/>
           <p:nvPr>
             <p:ph type="title"/>
@@ -7895,7 +8421,7 @@
       </p:sp>
       <p:sp>
         <p:nvSpPr>
-          <p:cNvPr id="147" name="Google Shape;147;p21"/>
+          <p:cNvPr id="162" name="Google Shape;162;p21"/>
           <p:cNvSpPr txBox="1"/>
           <p:nvPr>
             <p:ph idx="12" type="sldNum"/>
@@ -7948,7 +8474,7 @@
                 </a:solidFill>
                 <a:hlinkClick r:id="rId3"/>
               </a:rPr>
-              <a:t>https://profriehle.com</a:t>
+              <a:t>https://oss.cs.fau.de</a:t>
             </a:r>
             <a:r>
               <a:rPr b="0" lang="en" sz="900">
@@ -7958,13 +8484,17 @@
               </a:rPr>
               <a:t> </a:t>
             </a:r>
-            <a:endParaRPr/>
+            <a:endParaRPr>
+              <a:solidFill>
+                <a:schemeClr val="dk2"/>
+              </a:solidFill>
+            </a:endParaRPr>
           </a:p>
         </p:txBody>
       </p:sp>
       <p:graphicFrame>
         <p:nvGraphicFramePr>
-          <p:cNvPr id="148" name="Google Shape;148;p21"/>
+          <p:cNvPr id="163" name="Google Shape;163;p21"/>
           <p:cNvGraphicFramePr/>
           <p:nvPr/>
         </p:nvGraphicFramePr>
@@ -7977,7 +8507,7 @@
             <a:tbl>
               <a:tblPr>
                 <a:noFill/>
-                <a:tableStyleId>{1D9A6649-6DDC-42E8-95EF-7BACF0D9B409}</a:tableStyleId>
+                <a:tableStyleId>{BD4B883E-F3D4-4459-97C0-A1F011C835CA}</a:tableStyleId>
               </a:tblPr>
               <a:tblGrid>
                 <a:gridCol w="1524625"/>
@@ -8906,7 +9436,7 @@
   <p:cSld>
     <p:spTree>
       <p:nvGrpSpPr>
-        <p:cNvPr id="152" name="Shape 152"/>
+        <p:cNvPr id="167" name="Shape 167"/>
         <p:cNvGrpSpPr/>
         <p:nvPr/>
       </p:nvGrpSpPr>
@@ -8920,7 +9450,7 @@
       </p:grpSpPr>
       <p:sp>
         <p:nvSpPr>
-          <p:cNvPr id="153" name="Google Shape;153;p22"/>
+          <p:cNvPr id="168" name="Google Shape;168;p22"/>
           <p:cNvSpPr txBox="1"/>
           <p:nvPr>
             <p:ph type="title"/>
@@ -8960,7 +9490,7 @@
       </p:sp>
       <p:sp>
         <p:nvSpPr>
-          <p:cNvPr id="154" name="Google Shape;154;p22"/>
+          <p:cNvPr id="169" name="Google Shape;169;p22"/>
           <p:cNvSpPr txBox="1"/>
           <p:nvPr>
             <p:ph idx="12" type="sldNum"/>
@@ -9013,7 +9543,7 @@
                 </a:solidFill>
                 <a:hlinkClick r:id="rId3"/>
               </a:rPr>
-              <a:t>https://profriehle.com</a:t>
+              <a:t>https://oss.cs.fau.de</a:t>
             </a:r>
             <a:r>
               <a:rPr b="0" lang="en" sz="900">
@@ -9023,13 +9553,17 @@
               </a:rPr>
               <a:t> </a:t>
             </a:r>
-            <a:endParaRPr/>
+            <a:endParaRPr>
+              <a:solidFill>
+                <a:schemeClr val="dk2"/>
+              </a:solidFill>
+            </a:endParaRPr>
           </a:p>
         </p:txBody>
       </p:sp>
       <p:pic>
         <p:nvPicPr>
-          <p:cNvPr id="155" name="Google Shape;155;p22"/>
+          <p:cNvPr id="170" name="Google Shape;170;p22"/>
           <p:cNvPicPr preferRelativeResize="0"/>
           <p:nvPr/>
         </p:nvPicPr>
@@ -9057,7 +9591,7 @@
       </p:pic>
       <p:sp>
         <p:nvSpPr>
-          <p:cNvPr id="156" name="Google Shape;156;p22"/>
+          <p:cNvPr id="171" name="Google Shape;171;p22"/>
           <p:cNvSpPr txBox="1"/>
           <p:nvPr/>
         </p:nvSpPr>
@@ -9151,7 +9685,7 @@
       </p:sp>
       <p:sp>
         <p:nvSpPr>
-          <p:cNvPr id="157" name="Google Shape;157;p22"/>
+          <p:cNvPr id="172" name="Google Shape;172;p22"/>
           <p:cNvSpPr txBox="1"/>
           <p:nvPr/>
         </p:nvSpPr>
@@ -9230,7 +9764,7 @@
   <p:cSld>
     <p:spTree>
       <p:nvGrpSpPr>
-        <p:cNvPr id="161" name="Shape 161"/>
+        <p:cNvPr id="176" name="Shape 176"/>
         <p:cNvGrpSpPr/>
         <p:nvPr/>
       </p:nvGrpSpPr>
@@ -9244,7 +9778,7 @@
       </p:grpSpPr>
       <p:sp>
         <p:nvSpPr>
-          <p:cNvPr id="162" name="Google Shape;162;p23"/>
+          <p:cNvPr id="177" name="Google Shape;177;p23"/>
           <p:cNvSpPr txBox="1"/>
           <p:nvPr>
             <p:ph type="title"/>
@@ -9284,7 +9818,7 @@
       </p:sp>
       <p:sp>
         <p:nvSpPr>
-          <p:cNvPr id="163" name="Google Shape;163;p23"/>
+          <p:cNvPr id="178" name="Google Shape;178;p23"/>
           <p:cNvSpPr txBox="1"/>
           <p:nvPr>
             <p:ph idx="12" type="sldNum"/>
@@ -9337,7 +9871,7 @@
                 </a:solidFill>
                 <a:hlinkClick r:id="rId3"/>
               </a:rPr>
-              <a:t>https://profriehle.com</a:t>
+              <a:t>https://oss.cs.fau.de</a:t>
             </a:r>
             <a:r>
               <a:rPr b="0" lang="en" sz="900">
@@ -9347,13 +9881,17 @@
               </a:rPr>
               <a:t> </a:t>
             </a:r>
-            <a:endParaRPr/>
+            <a:endParaRPr b="0" sz="900">
+              <a:solidFill>
+                <a:schemeClr val="dk2"/>
+              </a:solidFill>
+            </a:endParaRPr>
           </a:p>
         </p:txBody>
       </p:sp>
       <p:sp>
         <p:nvSpPr>
-          <p:cNvPr id="164" name="Google Shape;164;p23"/>
+          <p:cNvPr id="179" name="Google Shape;179;p23"/>
           <p:cNvSpPr txBox="1"/>
           <p:nvPr>
             <p:ph idx="1" type="body"/>
@@ -9488,7 +10026,7 @@
   <p:cSld>
     <p:spTree>
       <p:nvGrpSpPr>
-        <p:cNvPr id="168" name="Shape 168"/>
+        <p:cNvPr id="183" name="Shape 183"/>
         <p:cNvGrpSpPr/>
         <p:nvPr/>
       </p:nvGrpSpPr>
@@ -9502,7 +10040,7 @@
       </p:grpSpPr>
       <p:sp>
         <p:nvSpPr>
-          <p:cNvPr id="169" name="Google Shape;169;p24"/>
+          <p:cNvPr id="184" name="Google Shape;184;p24"/>
           <p:cNvSpPr txBox="1"/>
           <p:nvPr>
             <p:ph type="title"/>
@@ -9542,7 +10080,7 @@
       </p:sp>
       <p:sp>
         <p:nvSpPr>
-          <p:cNvPr id="170" name="Google Shape;170;p24"/>
+          <p:cNvPr id="185" name="Google Shape;185;p24"/>
           <p:cNvSpPr txBox="1"/>
           <p:nvPr>
             <p:ph idx="1" type="body"/>
@@ -9732,7 +10270,7 @@
       </p:sp>
       <p:sp>
         <p:nvSpPr>
-          <p:cNvPr id="171" name="Google Shape;171;p24"/>
+          <p:cNvPr id="186" name="Google Shape;186;p24"/>
           <p:cNvSpPr txBox="1"/>
           <p:nvPr>
             <p:ph idx="12" type="sldNum"/>
@@ -9785,7 +10323,7 @@
                 </a:solidFill>
                 <a:hlinkClick r:id="rId3"/>
               </a:rPr>
-              <a:t>https://profriehle.com</a:t>
+              <a:t>https://oss.cs.fau.de</a:t>
             </a:r>
             <a:r>
               <a:rPr b="0" lang="en" sz="900">
@@ -9795,7 +10333,11 @@
               </a:rPr>
               <a:t> </a:t>
             </a:r>
-            <a:endParaRPr/>
+            <a:endParaRPr b="0" sz="900">
+              <a:solidFill>
+                <a:schemeClr val="dk2"/>
+              </a:solidFill>
+            </a:endParaRPr>
           </a:p>
         </p:txBody>
       </p:sp>
@@ -9812,7 +10354,7 @@
   <p:cSld>
     <p:spTree>
       <p:nvGrpSpPr>
-        <p:cNvPr id="175" name="Shape 175"/>
+        <p:cNvPr id="190" name="Shape 190"/>
         <p:cNvGrpSpPr/>
         <p:nvPr/>
       </p:nvGrpSpPr>
@@ -9826,7 +10368,7 @@
       </p:grpSpPr>
       <p:sp>
         <p:nvSpPr>
-          <p:cNvPr id="176" name="Google Shape;176;p25"/>
+          <p:cNvPr id="191" name="Google Shape;191;p25"/>
           <p:cNvSpPr txBox="1"/>
           <p:nvPr>
             <p:ph type="title"/>
@@ -9881,7 +10423,7 @@
   <p:cSld>
     <p:spTree>
       <p:nvGrpSpPr>
-        <p:cNvPr id="180" name="Shape 180"/>
+        <p:cNvPr id="195" name="Shape 195"/>
         <p:cNvGrpSpPr/>
         <p:nvPr/>
       </p:nvGrpSpPr>
@@ -9895,7 +10437,7 @@
       </p:grpSpPr>
       <p:sp>
         <p:nvSpPr>
-          <p:cNvPr id="181" name="Google Shape;181;p26"/>
+          <p:cNvPr id="196" name="Google Shape;196;p26"/>
           <p:cNvSpPr txBox="1"/>
           <p:nvPr>
             <p:ph type="title"/>
@@ -9935,7 +10477,7 @@
       </p:sp>
       <p:sp>
         <p:nvSpPr>
-          <p:cNvPr id="182" name="Google Shape;182;p26"/>
+          <p:cNvPr id="197" name="Google Shape;197;p26"/>
           <p:cNvSpPr txBox="1"/>
           <p:nvPr>
             <p:ph idx="1" type="body"/>
@@ -10000,7 +10542,7 @@
       </p:sp>
       <p:sp>
         <p:nvSpPr>
-          <p:cNvPr id="183" name="Google Shape;183;p26"/>
+          <p:cNvPr id="198" name="Google Shape;198;p26"/>
           <p:cNvSpPr txBox="1"/>
           <p:nvPr>
             <p:ph idx="12" type="sldNum"/>
@@ -10053,7 +10595,7 @@
                 </a:solidFill>
                 <a:hlinkClick r:id="rId4"/>
               </a:rPr>
-              <a:t>https://profriehle.com</a:t>
+              <a:t>https://oss.cs.fau.de</a:t>
             </a:r>
             <a:r>
               <a:rPr b="0" lang="en" sz="900">
@@ -10063,13 +10605,17 @@
               </a:rPr>
               <a:t> </a:t>
             </a:r>
-            <a:endParaRPr/>
+            <a:endParaRPr b="0" sz="900">
+              <a:solidFill>
+                <a:schemeClr val="dk2"/>
+              </a:solidFill>
+            </a:endParaRPr>
           </a:p>
         </p:txBody>
       </p:sp>
       <p:pic>
         <p:nvPicPr>
-          <p:cNvPr id="184" name="Google Shape;184;p26"/>
+          <p:cNvPr id="199" name="Google Shape;199;p26"/>
           <p:cNvPicPr preferRelativeResize="0"/>
           <p:nvPr/>
         </p:nvPicPr>
@@ -10114,7 +10660,7 @@
   <p:cSld>
     <p:spTree>
       <p:nvGrpSpPr>
-        <p:cNvPr id="41" name="Shape 41"/>
+        <p:cNvPr id="56" name="Shape 56"/>
         <p:cNvGrpSpPr/>
         <p:nvPr/>
       </p:nvGrpSpPr>
@@ -10128,7 +10674,7 @@
       </p:grpSpPr>
       <p:sp>
         <p:nvSpPr>
-          <p:cNvPr id="42" name="Google Shape;42;p9"/>
+          <p:cNvPr id="57" name="Google Shape;57;p9"/>
           <p:cNvSpPr txBox="1"/>
           <p:nvPr>
             <p:ph idx="1" type="body"/>
@@ -10267,7 +10813,7 @@
       </p:sp>
       <p:sp>
         <p:nvSpPr>
-          <p:cNvPr id="43" name="Google Shape;43;p9"/>
+          <p:cNvPr id="58" name="Google Shape;58;p9"/>
           <p:cNvSpPr txBox="1"/>
           <p:nvPr>
             <p:ph type="title"/>
@@ -10307,7 +10853,7 @@
       </p:sp>
       <p:sp>
         <p:nvSpPr>
-          <p:cNvPr id="44" name="Google Shape;44;p9"/>
+          <p:cNvPr id="59" name="Google Shape;59;p9"/>
           <p:cNvSpPr txBox="1"/>
           <p:nvPr>
             <p:ph idx="12" type="sldNum"/>
@@ -10360,7 +10906,7 @@
                 </a:solidFill>
                 <a:hlinkClick r:id="rId3"/>
               </a:rPr>
-              <a:t>https://profriehle.com</a:t>
+              <a:t>https://oss.cs.fau.de</a:t>
             </a:r>
             <a:r>
               <a:rPr b="0" lang="en" sz="900">
@@ -10370,7 +10916,11 @@
               </a:rPr>
               <a:t> </a:t>
             </a:r>
-            <a:endParaRPr/>
+            <a:endParaRPr b="0" sz="900">
+              <a:solidFill>
+                <a:schemeClr val="dk2"/>
+              </a:solidFill>
+            </a:endParaRPr>
           </a:p>
         </p:txBody>
       </p:sp>
@@ -10387,7 +10937,7 @@
   <p:cSld>
     <p:spTree>
       <p:nvGrpSpPr>
-        <p:cNvPr id="188" name="Shape 188"/>
+        <p:cNvPr id="203" name="Shape 203"/>
         <p:cNvGrpSpPr/>
         <p:nvPr/>
       </p:nvGrpSpPr>
@@ -10401,7 +10951,7 @@
       </p:grpSpPr>
       <p:sp>
         <p:nvSpPr>
-          <p:cNvPr id="189" name="Google Shape;189;p27"/>
+          <p:cNvPr id="204" name="Google Shape;204;p27"/>
           <p:cNvSpPr txBox="1"/>
           <p:nvPr>
             <p:ph type="title"/>
@@ -10441,7 +10991,7 @@
       </p:sp>
       <p:sp>
         <p:nvSpPr>
-          <p:cNvPr id="190" name="Google Shape;190;p27"/>
+          <p:cNvPr id="205" name="Google Shape;205;p27"/>
           <p:cNvSpPr txBox="1"/>
           <p:nvPr>
             <p:ph idx="1" type="body"/>
@@ -10584,7 +11134,7 @@
       </p:sp>
       <p:sp>
         <p:nvSpPr>
-          <p:cNvPr id="191" name="Google Shape;191;p27"/>
+          <p:cNvPr id="206" name="Google Shape;206;p27"/>
           <p:cNvSpPr txBox="1"/>
           <p:nvPr>
             <p:ph idx="12" type="sldNum"/>
@@ -10637,7 +11187,7 @@
                 </a:solidFill>
                 <a:hlinkClick r:id="rId3"/>
               </a:rPr>
-              <a:t>https://profriehle.com</a:t>
+              <a:t>https://oss.cs.fau.de</a:t>
             </a:r>
             <a:r>
               <a:rPr b="0" lang="en" sz="900">
@@ -10647,7 +11197,11 @@
               </a:rPr>
               <a:t> </a:t>
             </a:r>
-            <a:endParaRPr/>
+            <a:endParaRPr b="0" sz="900">
+              <a:solidFill>
+                <a:schemeClr val="dk2"/>
+              </a:solidFill>
+            </a:endParaRPr>
           </a:p>
         </p:txBody>
       </p:sp>
@@ -10664,7 +11218,7 @@
   <p:cSld>
     <p:spTree>
       <p:nvGrpSpPr>
-        <p:cNvPr id="195" name="Shape 195"/>
+        <p:cNvPr id="210" name="Shape 210"/>
         <p:cNvGrpSpPr/>
         <p:nvPr/>
       </p:nvGrpSpPr>
@@ -10678,7 +11232,7 @@
       </p:grpSpPr>
       <p:sp>
         <p:nvSpPr>
-          <p:cNvPr id="196" name="Google Shape;196;p28"/>
+          <p:cNvPr id="211" name="Google Shape;211;p28"/>
           <p:cNvSpPr txBox="1"/>
           <p:nvPr>
             <p:ph idx="1" type="body"/>
@@ -10839,7 +11393,7 @@
       </p:sp>
       <p:sp>
         <p:nvSpPr>
-          <p:cNvPr id="197" name="Google Shape;197;p28"/>
+          <p:cNvPr id="212" name="Google Shape;212;p28"/>
           <p:cNvSpPr txBox="1"/>
           <p:nvPr>
             <p:ph type="title"/>
@@ -10879,7 +11433,7 @@
       </p:sp>
       <p:sp>
         <p:nvSpPr>
-          <p:cNvPr id="198" name="Google Shape;198;p28"/>
+          <p:cNvPr id="213" name="Google Shape;213;p28"/>
           <p:cNvSpPr txBox="1"/>
           <p:nvPr>
             <p:ph idx="12" type="sldNum"/>
@@ -10932,7 +11486,7 @@
                 </a:solidFill>
                 <a:hlinkClick r:id="rId3"/>
               </a:rPr>
-              <a:t>https://profriehle.com</a:t>
+              <a:t>https://oss.cs.fau.de</a:t>
             </a:r>
             <a:r>
               <a:rPr b="0" lang="en" sz="900">
@@ -10942,7 +11496,11 @@
               </a:rPr>
               <a:t> </a:t>
             </a:r>
-            <a:endParaRPr/>
+            <a:endParaRPr b="0" sz="900">
+              <a:solidFill>
+                <a:schemeClr val="dk2"/>
+              </a:solidFill>
+            </a:endParaRPr>
           </a:p>
         </p:txBody>
       </p:sp>
@@ -10959,7 +11517,7 @@
   <p:cSld>
     <p:spTree>
       <p:nvGrpSpPr>
-        <p:cNvPr id="202" name="Shape 202"/>
+        <p:cNvPr id="217" name="Shape 217"/>
         <p:cNvGrpSpPr/>
         <p:nvPr/>
       </p:nvGrpSpPr>
@@ -10973,7 +11531,7 @@
       </p:grpSpPr>
       <p:sp>
         <p:nvSpPr>
-          <p:cNvPr id="203" name="Google Shape;203;p29"/>
+          <p:cNvPr id="218" name="Google Shape;218;p29"/>
           <p:cNvSpPr txBox="1"/>
           <p:nvPr>
             <p:ph type="title"/>
@@ -11028,7 +11586,7 @@
   <p:cSld>
     <p:spTree>
       <p:nvGrpSpPr>
-        <p:cNvPr id="207" name="Shape 207"/>
+        <p:cNvPr id="222" name="Shape 222"/>
         <p:cNvGrpSpPr/>
         <p:nvPr/>
       </p:nvGrpSpPr>
@@ -11042,7 +11600,7 @@
       </p:grpSpPr>
       <p:sp>
         <p:nvSpPr>
-          <p:cNvPr id="208" name="Google Shape;208;p30"/>
+          <p:cNvPr id="223" name="Google Shape;223;p30"/>
           <p:cNvSpPr txBox="1"/>
           <p:nvPr>
             <p:ph type="title"/>
@@ -11082,7 +11640,7 @@
       </p:sp>
       <p:sp>
         <p:nvSpPr>
-          <p:cNvPr id="209" name="Google Shape;209;p30"/>
+          <p:cNvPr id="224" name="Google Shape;224;p30"/>
           <p:cNvSpPr txBox="1"/>
           <p:nvPr>
             <p:ph idx="12" type="sldNum"/>
@@ -11135,7 +11693,7 @@
                 </a:solidFill>
                 <a:hlinkClick r:id="rId3"/>
               </a:rPr>
-              <a:t>https://profriehle.com</a:t>
+              <a:t>https://oss.cs.fau.de</a:t>
             </a:r>
             <a:r>
               <a:rPr b="0" lang="en" sz="900">
@@ -11145,13 +11703,17 @@
               </a:rPr>
               <a:t> </a:t>
             </a:r>
-            <a:endParaRPr/>
+            <a:endParaRPr b="0" sz="900">
+              <a:solidFill>
+                <a:schemeClr val="dk2"/>
+              </a:solidFill>
+            </a:endParaRPr>
           </a:p>
         </p:txBody>
       </p:sp>
       <p:sp>
         <p:nvSpPr>
-          <p:cNvPr id="210" name="Google Shape;210;p30"/>
+          <p:cNvPr id="225" name="Google Shape;225;p30"/>
           <p:cNvSpPr txBox="1"/>
           <p:nvPr>
             <p:ph idx="1" type="body"/>
@@ -11266,7 +11828,7 @@
   <p:cSld>
     <p:spTree>
       <p:nvGrpSpPr>
-        <p:cNvPr id="214" name="Shape 214"/>
+        <p:cNvPr id="229" name="Shape 229"/>
         <p:cNvGrpSpPr/>
         <p:nvPr/>
       </p:nvGrpSpPr>
@@ -11280,7 +11842,7 @@
       </p:grpSpPr>
       <p:sp>
         <p:nvSpPr>
-          <p:cNvPr id="215" name="Google Shape;215;p31"/>
+          <p:cNvPr id="230" name="Google Shape;230;p31"/>
           <p:cNvSpPr txBox="1"/>
           <p:nvPr>
             <p:ph type="title"/>
@@ -11320,7 +11882,7 @@
       </p:sp>
       <p:sp>
         <p:nvSpPr>
-          <p:cNvPr id="216" name="Google Shape;216;p31"/>
+          <p:cNvPr id="231" name="Google Shape;231;p31"/>
           <p:cNvSpPr txBox="1"/>
           <p:nvPr>
             <p:ph idx="1" type="body"/>
@@ -11460,7 +12022,7 @@
       </p:sp>
       <p:sp>
         <p:nvSpPr>
-          <p:cNvPr id="217" name="Google Shape;217;p31"/>
+          <p:cNvPr id="232" name="Google Shape;232;p31"/>
           <p:cNvSpPr txBox="1"/>
           <p:nvPr>
             <p:ph idx="12" type="sldNum"/>
@@ -11513,7 +12075,7 @@
                 </a:solidFill>
                 <a:hlinkClick r:id="rId3"/>
               </a:rPr>
-              <a:t>https://profriehle.com</a:t>
+              <a:t>https://oss.cs.fau.de</a:t>
             </a:r>
             <a:r>
               <a:rPr b="0" lang="en" sz="900">
@@ -11523,7 +12085,11 @@
               </a:rPr>
               <a:t> </a:t>
             </a:r>
-            <a:endParaRPr/>
+            <a:endParaRPr b="0" sz="900">
+              <a:solidFill>
+                <a:schemeClr val="dk2"/>
+              </a:solidFill>
+            </a:endParaRPr>
           </a:p>
         </p:txBody>
       </p:sp>
@@ -11540,7 +12106,7 @@
   <p:cSld>
     <p:spTree>
       <p:nvGrpSpPr>
-        <p:cNvPr id="221" name="Shape 221"/>
+        <p:cNvPr id="236" name="Shape 236"/>
         <p:cNvGrpSpPr/>
         <p:nvPr/>
       </p:nvGrpSpPr>
@@ -11554,7 +12120,7 @@
       </p:grpSpPr>
       <p:sp>
         <p:nvSpPr>
-          <p:cNvPr id="222" name="Google Shape;222;p32"/>
+          <p:cNvPr id="237" name="Google Shape;237;p32"/>
           <p:cNvSpPr txBox="1"/>
           <p:nvPr>
             <p:ph type="title"/>
@@ -11594,7 +12160,7 @@
       </p:sp>
       <p:sp>
         <p:nvSpPr>
-          <p:cNvPr id="223" name="Google Shape;223;p32"/>
+          <p:cNvPr id="238" name="Google Shape;238;p32"/>
           <p:cNvSpPr txBox="1"/>
           <p:nvPr>
             <p:ph idx="1" type="body"/>
@@ -11694,7 +12260,7 @@
       </p:sp>
       <p:sp>
         <p:nvSpPr>
-          <p:cNvPr id="224" name="Google Shape;224;p32"/>
+          <p:cNvPr id="239" name="Google Shape;239;p32"/>
           <p:cNvSpPr txBox="1"/>
           <p:nvPr>
             <p:ph idx="12" type="sldNum"/>
@@ -11747,7 +12313,7 @@
                 </a:solidFill>
                 <a:hlinkClick r:id="rId3"/>
               </a:rPr>
-              <a:t>https://profriehle.com</a:t>
+              <a:t>https://oss.cs.fau.de</a:t>
             </a:r>
             <a:r>
               <a:rPr b="0" lang="en" sz="900">
@@ -11757,7 +12323,11 @@
               </a:rPr>
               <a:t> </a:t>
             </a:r>
-            <a:endParaRPr/>
+            <a:endParaRPr b="0" sz="900">
+              <a:solidFill>
+                <a:schemeClr val="dk2"/>
+              </a:solidFill>
+            </a:endParaRPr>
           </a:p>
         </p:txBody>
       </p:sp>
@@ -11774,7 +12344,7 @@
   <p:cSld>
     <p:spTree>
       <p:nvGrpSpPr>
-        <p:cNvPr id="228" name="Shape 228"/>
+        <p:cNvPr id="243" name="Shape 243"/>
         <p:cNvGrpSpPr/>
         <p:nvPr/>
       </p:nvGrpSpPr>
@@ -11788,7 +12358,7 @@
       </p:grpSpPr>
       <p:sp>
         <p:nvSpPr>
-          <p:cNvPr id="229" name="Google Shape;229;p33"/>
+          <p:cNvPr id="244" name="Google Shape;244;p33"/>
           <p:cNvSpPr txBox="1"/>
           <p:nvPr>
             <p:ph idx="1" type="body"/>
@@ -11942,7 +12512,7 @@
       </p:sp>
       <p:sp>
         <p:nvSpPr>
-          <p:cNvPr id="230" name="Google Shape;230;p33"/>
+          <p:cNvPr id="245" name="Google Shape;245;p33"/>
           <p:cNvSpPr txBox="1"/>
           <p:nvPr>
             <p:ph type="title"/>
@@ -11982,7 +12552,7 @@
       </p:sp>
       <p:sp>
         <p:nvSpPr>
-          <p:cNvPr id="231" name="Google Shape;231;p33"/>
+          <p:cNvPr id="246" name="Google Shape;246;p33"/>
           <p:cNvSpPr txBox="1"/>
           <p:nvPr>
             <p:ph idx="12" type="sldNum"/>
@@ -12035,7 +12605,7 @@
                 </a:solidFill>
                 <a:hlinkClick r:id="rId6"/>
               </a:rPr>
-              <a:t>https://profriehle.com</a:t>
+              <a:t>https://oss.cs.fau.de</a:t>
             </a:r>
             <a:r>
               <a:rPr b="0" lang="en" sz="900">
@@ -12045,7 +12615,11 @@
               </a:rPr>
               <a:t> </a:t>
             </a:r>
-            <a:endParaRPr/>
+            <a:endParaRPr b="0" sz="900">
+              <a:solidFill>
+                <a:schemeClr val="dk2"/>
+              </a:solidFill>
+            </a:endParaRPr>
           </a:p>
         </p:txBody>
       </p:sp>
@@ -12062,7 +12636,7 @@
   <p:cSld>
     <p:spTree>
       <p:nvGrpSpPr>
-        <p:cNvPr id="235" name="Shape 235"/>
+        <p:cNvPr id="250" name="Shape 250"/>
         <p:cNvGrpSpPr/>
         <p:nvPr/>
       </p:nvGrpSpPr>
@@ -12076,7 +12650,7 @@
       </p:grpSpPr>
       <p:sp>
         <p:nvSpPr>
-          <p:cNvPr id="236" name="Google Shape;236;p34"/>
+          <p:cNvPr id="251" name="Google Shape;251;p34"/>
           <p:cNvSpPr txBox="1"/>
           <p:nvPr>
             <p:ph type="title"/>
@@ -12116,7 +12690,7 @@
       </p:sp>
       <p:sp>
         <p:nvSpPr>
-          <p:cNvPr id="237" name="Google Shape;237;p34"/>
+          <p:cNvPr id="252" name="Google Shape;252;p34"/>
           <p:cNvSpPr txBox="1"/>
           <p:nvPr>
             <p:ph idx="1" type="body"/>
@@ -12240,7 +12814,7 @@
       </p:sp>
       <p:sp>
         <p:nvSpPr>
-          <p:cNvPr id="238" name="Google Shape;238;p34"/>
+          <p:cNvPr id="253" name="Google Shape;253;p34"/>
           <p:cNvSpPr txBox="1"/>
           <p:nvPr>
             <p:ph idx="12" type="sldNum"/>
@@ -12293,7 +12867,7 @@
                 </a:solidFill>
                 <a:hlinkClick r:id="rId3"/>
               </a:rPr>
-              <a:t>https://profriehle.com</a:t>
+              <a:t>https://oss.cs.fau.de</a:t>
             </a:r>
             <a:r>
               <a:rPr b="0" lang="en" sz="900">
@@ -12303,7 +12877,11 @@
               </a:rPr>
               <a:t> </a:t>
             </a:r>
-            <a:endParaRPr/>
+            <a:endParaRPr b="0" sz="900">
+              <a:solidFill>
+                <a:schemeClr val="dk2"/>
+              </a:solidFill>
+            </a:endParaRPr>
           </a:p>
         </p:txBody>
       </p:sp>
@@ -12320,7 +12898,7 @@
   <p:cSld>
     <p:spTree>
       <p:nvGrpSpPr>
-        <p:cNvPr id="242" name="Shape 242"/>
+        <p:cNvPr id="257" name="Shape 257"/>
         <p:cNvGrpSpPr/>
         <p:nvPr/>
       </p:nvGrpSpPr>
@@ -12334,7 +12912,7 @@
       </p:grpSpPr>
       <p:sp>
         <p:nvSpPr>
-          <p:cNvPr id="243" name="Google Shape;243;p35"/>
+          <p:cNvPr id="258" name="Google Shape;258;p35"/>
           <p:cNvSpPr txBox="1"/>
           <p:nvPr>
             <p:ph type="ctrTitle"/>
@@ -12374,7 +12952,7 @@
       </p:sp>
       <p:sp>
         <p:nvSpPr>
-          <p:cNvPr id="244" name="Google Shape;244;p35"/>
+          <p:cNvPr id="259" name="Google Shape;259;p35"/>
           <p:cNvSpPr txBox="1"/>
           <p:nvPr>
             <p:ph idx="1" type="subTitle"/>
@@ -12504,7 +13082,7 @@
   <p:cSld>
     <p:spTree>
       <p:nvGrpSpPr>
-        <p:cNvPr id="248" name="Shape 248"/>
+        <p:cNvPr id="263" name="Shape 263"/>
         <p:cNvGrpSpPr/>
         <p:nvPr/>
       </p:nvGrpSpPr>
@@ -12518,7 +13096,7 @@
       </p:grpSpPr>
       <p:sp>
         <p:nvSpPr>
-          <p:cNvPr id="249" name="Google Shape;249;p36"/>
+          <p:cNvPr id="264" name="Google Shape;264;p36"/>
           <p:cNvSpPr txBox="1"/>
           <p:nvPr>
             <p:ph type="title"/>
@@ -12558,7 +13136,7 @@
       </p:sp>
       <p:sp>
         <p:nvSpPr>
-          <p:cNvPr id="250" name="Google Shape;250;p36"/>
+          <p:cNvPr id="265" name="Google Shape;265;p36"/>
           <p:cNvSpPr txBox="1"/>
           <p:nvPr>
             <p:ph idx="12" type="sldNum"/>
@@ -12611,7 +13189,7 @@
                 </a:solidFill>
                 <a:hlinkClick r:id="rId3"/>
               </a:rPr>
-              <a:t>https://profriehle.com</a:t>
+              <a:t>https://oss.cs.fau.de</a:t>
             </a:r>
             <a:r>
               <a:rPr b="0" lang="en" sz="900">
@@ -12621,13 +13199,17 @@
               </a:rPr>
               <a:t> </a:t>
             </a:r>
-            <a:endParaRPr/>
+            <a:endParaRPr b="0" sz="900">
+              <a:solidFill>
+                <a:schemeClr val="dk2"/>
+              </a:solidFill>
+            </a:endParaRPr>
           </a:p>
         </p:txBody>
       </p:sp>
       <p:sp>
         <p:nvSpPr>
-          <p:cNvPr id="251" name="Google Shape;251;p36"/>
+          <p:cNvPr id="266" name="Google Shape;266;p36"/>
           <p:cNvSpPr txBox="1"/>
           <p:nvPr>
             <p:ph idx="1" type="body"/>
@@ -12756,7 +13338,7 @@
   <p:cSld>
     <p:spTree>
       <p:nvGrpSpPr>
-        <p:cNvPr id="48" name="Shape 48"/>
+        <p:cNvPr id="63" name="Shape 63"/>
         <p:cNvGrpSpPr/>
         <p:nvPr/>
       </p:nvGrpSpPr>
@@ -12770,7 +13352,7 @@
       </p:grpSpPr>
       <p:sp>
         <p:nvSpPr>
-          <p:cNvPr id="49" name="Google Shape;49;p10"/>
+          <p:cNvPr id="64" name="Google Shape;64;p10"/>
           <p:cNvSpPr txBox="1"/>
           <p:nvPr>
             <p:ph type="title"/>
@@ -12821,7 +13403,7 @@
   <p:cSld>
     <p:spTree>
       <p:nvGrpSpPr>
-        <p:cNvPr id="53" name="Shape 53"/>
+        <p:cNvPr id="68" name="Shape 68"/>
         <p:cNvGrpSpPr/>
         <p:nvPr/>
       </p:nvGrpSpPr>
@@ -12835,7 +13417,7 @@
       </p:grpSpPr>
       <p:sp>
         <p:nvSpPr>
-          <p:cNvPr id="54" name="Google Shape;54;p11"/>
+          <p:cNvPr id="69" name="Google Shape;69;p11"/>
           <p:cNvSpPr txBox="1"/>
           <p:nvPr>
             <p:ph type="title"/>
@@ -12879,7 +13461,7 @@
       </p:sp>
       <p:sp>
         <p:nvSpPr>
-          <p:cNvPr id="55" name="Google Shape;55;p11"/>
+          <p:cNvPr id="70" name="Google Shape;70;p11"/>
           <p:cNvSpPr txBox="1"/>
           <p:nvPr>
             <p:ph idx="12" type="sldNum"/>
@@ -12932,7 +13514,7 @@
                 </a:solidFill>
                 <a:hlinkClick r:id="rId3"/>
               </a:rPr>
-              <a:t>https://profriehle.com</a:t>
+              <a:t>https://oss.cs.fau.de</a:t>
             </a:r>
             <a:r>
               <a:rPr b="0" lang="en" sz="900">
@@ -12942,13 +13524,17 @@
               </a:rPr>
               <a:t> </a:t>
             </a:r>
-            <a:endParaRPr/>
+            <a:endParaRPr b="0" sz="900">
+              <a:solidFill>
+                <a:schemeClr val="dk2"/>
+              </a:solidFill>
+            </a:endParaRPr>
           </a:p>
         </p:txBody>
       </p:sp>
       <p:sp>
         <p:nvSpPr>
-          <p:cNvPr id="56" name="Google Shape;56;p11"/>
+          <p:cNvPr id="71" name="Google Shape;71;p11"/>
           <p:cNvSpPr txBox="1"/>
           <p:nvPr/>
         </p:nvSpPr>
@@ -12994,7 +13580,7 @@
       </p:sp>
       <p:pic>
         <p:nvPicPr>
-          <p:cNvPr id="57" name="Google Shape;57;p11"/>
+          <p:cNvPr id="72" name="Google Shape;72;p11"/>
           <p:cNvPicPr preferRelativeResize="0"/>
           <p:nvPr/>
         </p:nvPicPr>
@@ -13009,7 +13595,7 @@
         <p:spPr>
           <a:xfrm>
             <a:off x="274320" y="914400"/>
-            <a:ext cx="8595360" cy="3504997"/>
+            <a:ext cx="8595360" cy="3495446"/>
           </a:xfrm>
           <a:prstGeom prst="rect">
             <a:avLst/>
@@ -13033,7 +13619,7 @@
   <p:cSld>
     <p:spTree>
       <p:nvGrpSpPr>
-        <p:cNvPr id="61" name="Shape 61"/>
+        <p:cNvPr id="76" name="Shape 76"/>
         <p:cNvGrpSpPr/>
         <p:nvPr/>
       </p:nvGrpSpPr>
@@ -13047,7 +13633,7 @@
       </p:grpSpPr>
       <p:sp>
         <p:nvSpPr>
-          <p:cNvPr id="62" name="Google Shape;62;p12"/>
+          <p:cNvPr id="77" name="Google Shape;77;p12"/>
           <p:cNvSpPr txBox="1"/>
           <p:nvPr>
             <p:ph type="title"/>
@@ -13087,7 +13673,7 @@
       </p:sp>
       <p:sp>
         <p:nvSpPr>
-          <p:cNvPr id="63" name="Google Shape;63;p12"/>
+          <p:cNvPr id="78" name="Google Shape;78;p12"/>
           <p:cNvSpPr txBox="1"/>
           <p:nvPr>
             <p:ph idx="12" type="sldNum"/>
@@ -13140,7 +13726,7 @@
                 </a:solidFill>
                 <a:hlinkClick r:id="rId3"/>
               </a:rPr>
-              <a:t>https://profriehle.com</a:t>
+              <a:t>https://oss.cs.fau.de</a:t>
             </a:r>
             <a:r>
               <a:rPr b="0" lang="en" sz="900">
@@ -13150,13 +13736,17 @@
               </a:rPr>
               <a:t> </a:t>
             </a:r>
-            <a:endParaRPr/>
+            <a:endParaRPr>
+              <a:solidFill>
+                <a:schemeClr val="dk2"/>
+              </a:solidFill>
+            </a:endParaRPr>
           </a:p>
         </p:txBody>
       </p:sp>
       <p:sp>
         <p:nvSpPr>
-          <p:cNvPr id="64" name="Google Shape;64;p12"/>
+          <p:cNvPr id="79" name="Google Shape;79;p12"/>
           <p:cNvSpPr txBox="1"/>
           <p:nvPr/>
         </p:nvSpPr>
@@ -13202,7 +13792,7 @@
       </p:sp>
       <p:pic>
         <p:nvPicPr>
-          <p:cNvPr id="65" name="Google Shape;65;p12"/>
+          <p:cNvPr id="80" name="Google Shape;80;p12"/>
           <p:cNvPicPr preferRelativeResize="0"/>
           <p:nvPr/>
         </p:nvPicPr>
@@ -13241,7 +13831,7 @@
   <p:cSld>
     <p:spTree>
       <p:nvGrpSpPr>
-        <p:cNvPr id="69" name="Shape 69"/>
+        <p:cNvPr id="84" name="Shape 84"/>
         <p:cNvGrpSpPr/>
         <p:nvPr/>
       </p:nvGrpSpPr>
@@ -13255,7 +13845,7 @@
       </p:grpSpPr>
       <p:sp>
         <p:nvSpPr>
-          <p:cNvPr id="70" name="Google Shape;70;p13"/>
+          <p:cNvPr id="85" name="Google Shape;85;p13"/>
           <p:cNvSpPr txBox="1"/>
           <p:nvPr>
             <p:ph type="title"/>
@@ -13295,7 +13885,7 @@
       </p:sp>
       <p:sp>
         <p:nvSpPr>
-          <p:cNvPr id="71" name="Google Shape;71;p13"/>
+          <p:cNvPr id="86" name="Google Shape;86;p13"/>
           <p:cNvSpPr txBox="1"/>
           <p:nvPr>
             <p:ph idx="12" type="sldNum"/>
@@ -13348,7 +13938,7 @@
                 </a:solidFill>
                 <a:hlinkClick r:id="rId3"/>
               </a:rPr>
-              <a:t>https://profriehle.com</a:t>
+              <a:t>https://oss.cs.fau.de</a:t>
             </a:r>
             <a:r>
               <a:rPr b="0" lang="en" sz="900">
@@ -13358,13 +13948,17 @@
               </a:rPr>
               <a:t> </a:t>
             </a:r>
-            <a:endParaRPr/>
+            <a:endParaRPr>
+              <a:solidFill>
+                <a:schemeClr val="dk2"/>
+              </a:solidFill>
+            </a:endParaRPr>
           </a:p>
         </p:txBody>
       </p:sp>
       <p:graphicFrame>
         <p:nvGraphicFramePr>
-          <p:cNvPr id="72" name="Google Shape;72;p13"/>
+          <p:cNvPr id="87" name="Google Shape;87;p13"/>
           <p:cNvGraphicFramePr/>
           <p:nvPr/>
         </p:nvGraphicFramePr>
@@ -13377,7 +13971,7 @@
             <a:tbl>
               <a:tblPr>
                 <a:noFill/>
-                <a:tableStyleId>{1D9A6649-6DDC-42E8-95EF-7BACF0D9B409}</a:tableStyleId>
+                <a:tableStyleId>{BD4B883E-F3D4-4459-97C0-A1F011C835CA}</a:tableStyleId>
               </a:tblPr>
               <a:tblGrid>
                 <a:gridCol w="4297675"/>
@@ -14188,7 +14782,7 @@
   <p:cSld>
     <p:spTree>
       <p:nvGrpSpPr>
-        <p:cNvPr id="76" name="Shape 76"/>
+        <p:cNvPr id="91" name="Shape 91"/>
         <p:cNvGrpSpPr/>
         <p:nvPr/>
       </p:nvGrpSpPr>
@@ -14202,7 +14796,7 @@
       </p:grpSpPr>
       <p:sp>
         <p:nvSpPr>
-          <p:cNvPr id="77" name="Google Shape;77;p14"/>
+          <p:cNvPr id="92" name="Google Shape;92;p14"/>
           <p:cNvSpPr txBox="1"/>
           <p:nvPr>
             <p:ph type="title"/>
@@ -14242,7 +14836,7 @@
       </p:sp>
       <p:sp>
         <p:nvSpPr>
-          <p:cNvPr id="78" name="Google Shape;78;p14"/>
+          <p:cNvPr id="93" name="Google Shape;93;p14"/>
           <p:cNvSpPr txBox="1"/>
           <p:nvPr>
             <p:ph idx="12" type="sldNum"/>
@@ -14295,7 +14889,7 @@
                 </a:solidFill>
                 <a:hlinkClick r:id="rId3"/>
               </a:rPr>
-              <a:t>https://profriehle.com</a:t>
+              <a:t>https://oss.cs.fau.de</a:t>
             </a:r>
             <a:r>
               <a:rPr b="0" lang="en" sz="900">
@@ -14305,13 +14899,17 @@
               </a:rPr>
               <a:t> </a:t>
             </a:r>
-            <a:endParaRPr/>
+            <a:endParaRPr>
+              <a:solidFill>
+                <a:schemeClr val="dk2"/>
+              </a:solidFill>
+            </a:endParaRPr>
           </a:p>
         </p:txBody>
       </p:sp>
       <p:grpSp>
         <p:nvGrpSpPr>
-          <p:cNvPr id="79" name="Google Shape;79;p14"/>
+          <p:cNvPr id="94" name="Google Shape;94;p14"/>
           <p:cNvGrpSpPr/>
           <p:nvPr/>
         </p:nvGrpSpPr>
@@ -14325,7 +14923,7 @@
         </p:grpSpPr>
         <p:sp>
           <p:nvSpPr>
-            <p:cNvPr id="80" name="Google Shape;80;p14"/>
+            <p:cNvPr id="95" name="Google Shape;95;p14"/>
             <p:cNvSpPr txBox="1"/>
             <p:nvPr/>
           </p:nvSpPr>
@@ -14367,7 +14965,7 @@
         </p:sp>
         <p:sp>
           <p:nvSpPr>
-            <p:cNvPr id="81" name="Google Shape;81;p14"/>
+            <p:cNvPr id="96" name="Google Shape;96;p14"/>
             <p:cNvSpPr txBox="1"/>
             <p:nvPr/>
           </p:nvSpPr>
@@ -14409,7 +15007,7 @@
         </p:sp>
         <p:cxnSp>
           <p:nvCxnSpPr>
-            <p:cNvPr id="82" name="Google Shape;82;p14"/>
+            <p:cNvPr id="97" name="Google Shape;97;p14"/>
             <p:cNvCxnSpPr/>
             <p:nvPr/>
           </p:nvCxnSpPr>
@@ -14436,7 +15034,7 @@
       </p:grpSp>
       <p:grpSp>
         <p:nvGrpSpPr>
-          <p:cNvPr id="83" name="Google Shape;83;p14"/>
+          <p:cNvPr id="98" name="Google Shape;98;p14"/>
           <p:cNvGrpSpPr/>
           <p:nvPr/>
         </p:nvGrpSpPr>
@@ -14450,7 +15048,7 @@
         </p:grpSpPr>
         <p:sp>
           <p:nvSpPr>
-            <p:cNvPr id="84" name="Google Shape;84;p14"/>
+            <p:cNvPr id="99" name="Google Shape;99;p14"/>
             <p:cNvSpPr txBox="1"/>
             <p:nvPr/>
           </p:nvSpPr>
@@ -14496,7 +15094,7 @@
         </p:sp>
         <p:sp>
           <p:nvSpPr>
-            <p:cNvPr id="85" name="Google Shape;85;p14"/>
+            <p:cNvPr id="100" name="Google Shape;100;p14"/>
             <p:cNvSpPr txBox="1"/>
             <p:nvPr/>
           </p:nvSpPr>
@@ -14538,7 +15136,7 @@
         </p:sp>
         <p:cxnSp>
           <p:nvCxnSpPr>
-            <p:cNvPr id="86" name="Google Shape;86;p14"/>
+            <p:cNvPr id="101" name="Google Shape;101;p14"/>
             <p:cNvCxnSpPr/>
             <p:nvPr/>
           </p:nvCxnSpPr>
@@ -14565,7 +15163,7 @@
       </p:grpSp>
       <p:grpSp>
         <p:nvGrpSpPr>
-          <p:cNvPr id="87" name="Google Shape;87;p14"/>
+          <p:cNvPr id="102" name="Google Shape;102;p14"/>
           <p:cNvGrpSpPr/>
           <p:nvPr/>
         </p:nvGrpSpPr>
@@ -14579,7 +15177,7 @@
         </p:grpSpPr>
         <p:sp>
           <p:nvSpPr>
-            <p:cNvPr id="88" name="Google Shape;88;p14"/>
+            <p:cNvPr id="103" name="Google Shape;103;p14"/>
             <p:cNvSpPr txBox="1"/>
             <p:nvPr/>
           </p:nvSpPr>
@@ -14625,7 +15223,7 @@
         </p:sp>
         <p:sp>
           <p:nvSpPr>
-            <p:cNvPr id="89" name="Google Shape;89;p14"/>
+            <p:cNvPr id="104" name="Google Shape;104;p14"/>
             <p:cNvSpPr txBox="1"/>
             <p:nvPr/>
           </p:nvSpPr>
@@ -14667,7 +15265,7 @@
         </p:sp>
         <p:cxnSp>
           <p:nvCxnSpPr>
-            <p:cNvPr id="90" name="Google Shape;90;p14"/>
+            <p:cNvPr id="105" name="Google Shape;105;p14"/>
             <p:cNvCxnSpPr/>
             <p:nvPr/>
           </p:nvCxnSpPr>
@@ -14694,7 +15292,7 @@
       </p:grpSp>
       <p:grpSp>
         <p:nvGrpSpPr>
-          <p:cNvPr id="91" name="Google Shape;91;p14"/>
+          <p:cNvPr id="106" name="Google Shape;106;p14"/>
           <p:cNvGrpSpPr/>
           <p:nvPr/>
         </p:nvGrpSpPr>
@@ -14708,7 +15306,7 @@
         </p:grpSpPr>
         <p:sp>
           <p:nvSpPr>
-            <p:cNvPr id="92" name="Google Shape;92;p14"/>
+            <p:cNvPr id="107" name="Google Shape;107;p14"/>
             <p:cNvSpPr txBox="1"/>
             <p:nvPr/>
           </p:nvSpPr>
@@ -14750,7 +15348,7 @@
         </p:sp>
         <p:sp>
           <p:nvSpPr>
-            <p:cNvPr id="93" name="Google Shape;93;p14"/>
+            <p:cNvPr id="108" name="Google Shape;108;p14"/>
             <p:cNvSpPr txBox="1"/>
             <p:nvPr/>
           </p:nvSpPr>
@@ -14796,7 +15394,7 @@
         </p:sp>
         <p:cxnSp>
           <p:nvCxnSpPr>
-            <p:cNvPr id="94" name="Google Shape;94;p14"/>
+            <p:cNvPr id="109" name="Google Shape;109;p14"/>
             <p:cNvCxnSpPr/>
             <p:nvPr/>
           </p:nvCxnSpPr>
@@ -14823,10 +15421,10 @@
       </p:grpSp>
       <p:cxnSp>
         <p:nvCxnSpPr>
-          <p:cNvPr id="95" name="Google Shape;95;p14"/>
+          <p:cNvPr id="110" name="Google Shape;110;p14"/>
           <p:cNvCxnSpPr>
-            <a:stCxn id="81" idx="3"/>
-            <a:endCxn id="85" idx="2"/>
+            <a:stCxn id="96" idx="3"/>
+            <a:endCxn id="100" idx="2"/>
           </p:cNvCxnSpPr>
           <p:nvPr/>
         </p:nvCxnSpPr>
@@ -14852,10 +15450,10 @@
       </p:cxnSp>
       <p:cxnSp>
         <p:nvCxnSpPr>
-          <p:cNvPr id="96" name="Google Shape;96;p14"/>
+          <p:cNvPr id="111" name="Google Shape;111;p14"/>
           <p:cNvCxnSpPr>
-            <a:stCxn id="85" idx="3"/>
-            <a:endCxn id="89" idx="2"/>
+            <a:stCxn id="100" idx="3"/>
+            <a:endCxn id="104" idx="2"/>
           </p:cNvCxnSpPr>
           <p:nvPr/>
         </p:nvCxnSpPr>
@@ -14881,10 +15479,10 @@
       </p:cxnSp>
       <p:cxnSp>
         <p:nvCxnSpPr>
-          <p:cNvPr id="97" name="Google Shape;97;p14"/>
+          <p:cNvPr id="112" name="Google Shape;112;p14"/>
           <p:cNvCxnSpPr>
-            <a:stCxn id="89" idx="3"/>
-            <a:endCxn id="93" idx="2"/>
+            <a:stCxn id="104" idx="3"/>
+            <a:endCxn id="108" idx="2"/>
           </p:cNvCxnSpPr>
           <p:nvPr/>
         </p:nvCxnSpPr>
@@ -14910,10 +15508,10 @@
       </p:cxnSp>
       <p:cxnSp>
         <p:nvCxnSpPr>
-          <p:cNvPr id="98" name="Google Shape;98;p14"/>
+          <p:cNvPr id="113" name="Google Shape;113;p14"/>
           <p:cNvCxnSpPr>
-            <a:stCxn id="80" idx="0"/>
-            <a:endCxn id="84" idx="1"/>
+            <a:stCxn id="95" idx="0"/>
+            <a:endCxn id="99" idx="1"/>
           </p:cNvCxnSpPr>
           <p:nvPr/>
         </p:nvCxnSpPr>
@@ -14939,10 +15537,10 @@
       </p:cxnSp>
       <p:cxnSp>
         <p:nvCxnSpPr>
-          <p:cNvPr id="99" name="Google Shape;99;p14"/>
+          <p:cNvPr id="114" name="Google Shape;114;p14"/>
           <p:cNvCxnSpPr>
-            <a:stCxn id="84" idx="0"/>
-            <a:endCxn id="88" idx="1"/>
+            <a:stCxn id="99" idx="0"/>
+            <a:endCxn id="103" idx="1"/>
           </p:cNvCxnSpPr>
           <p:nvPr/>
         </p:nvCxnSpPr>
@@ -14968,10 +15566,10 @@
       </p:cxnSp>
       <p:cxnSp>
         <p:nvCxnSpPr>
-          <p:cNvPr id="100" name="Google Shape;100;p14"/>
+          <p:cNvPr id="115" name="Google Shape;115;p14"/>
           <p:cNvCxnSpPr>
-            <a:stCxn id="88" idx="0"/>
-            <a:endCxn id="92" idx="1"/>
+            <a:stCxn id="103" idx="0"/>
+            <a:endCxn id="107" idx="1"/>
           </p:cNvCxnSpPr>
           <p:nvPr/>
         </p:nvCxnSpPr>
@@ -14997,7 +15595,7 @@
       </p:cxnSp>
       <p:sp>
         <p:nvSpPr>
-          <p:cNvPr id="101" name="Google Shape;101;p14"/>
+          <p:cNvPr id="116" name="Google Shape;116;p14"/>
           <p:cNvSpPr txBox="1"/>
           <p:nvPr/>
         </p:nvSpPr>
@@ -15039,7 +15637,7 @@
       </p:sp>
       <p:sp>
         <p:nvSpPr>
-          <p:cNvPr id="102" name="Google Shape;102;p14"/>
+          <p:cNvPr id="117" name="Google Shape;117;p14"/>
           <p:cNvSpPr txBox="1"/>
           <p:nvPr/>
         </p:nvSpPr>
@@ -15081,7 +15679,7 @@
       </p:sp>
       <p:sp>
         <p:nvSpPr>
-          <p:cNvPr id="103" name="Google Shape;103;p14"/>
+          <p:cNvPr id="118" name="Google Shape;118;p14"/>
           <p:cNvSpPr txBox="1"/>
           <p:nvPr/>
         </p:nvSpPr>
@@ -15134,7 +15732,7 @@
   <p:cSld>
     <p:spTree>
       <p:nvGrpSpPr>
-        <p:cNvPr id="107" name="Shape 107"/>
+        <p:cNvPr id="122" name="Shape 122"/>
         <p:cNvGrpSpPr/>
         <p:nvPr/>
       </p:nvGrpSpPr>
@@ -15148,7 +15746,7 @@
       </p:grpSpPr>
       <p:sp>
         <p:nvSpPr>
-          <p:cNvPr id="108" name="Google Shape;108;p15"/>
+          <p:cNvPr id="123" name="Google Shape;123;p15"/>
           <p:cNvSpPr txBox="1"/>
           <p:nvPr>
             <p:ph type="title"/>
@@ -15203,7 +15801,7 @@
   <p:cSld>
     <p:spTree>
       <p:nvGrpSpPr>
-        <p:cNvPr id="112" name="Shape 112"/>
+        <p:cNvPr id="127" name="Shape 127"/>
         <p:cNvGrpSpPr/>
         <p:nvPr/>
       </p:nvGrpSpPr>
@@ -15217,7 +15815,7 @@
       </p:grpSpPr>
       <p:sp>
         <p:nvSpPr>
-          <p:cNvPr id="113" name="Google Shape;113;p16"/>
+          <p:cNvPr id="128" name="Google Shape;128;p16"/>
           <p:cNvSpPr txBox="1"/>
           <p:nvPr>
             <p:ph type="title"/>
@@ -15257,7 +15855,7 @@
       </p:sp>
       <p:sp>
         <p:nvSpPr>
-          <p:cNvPr id="114" name="Google Shape;114;p16"/>
+          <p:cNvPr id="129" name="Google Shape;129;p16"/>
           <p:cNvSpPr txBox="1"/>
           <p:nvPr>
             <p:ph idx="12" type="sldNum"/>
@@ -15310,7 +15908,7 @@
                 </a:solidFill>
                 <a:hlinkClick r:id="rId3"/>
               </a:rPr>
-              <a:t>https://profriehle.com</a:t>
+              <a:t>https://oss.cs.fau.de</a:t>
             </a:r>
             <a:r>
               <a:rPr b="0" lang="en" sz="900">
@@ -15320,13 +15918,17 @@
               </a:rPr>
               <a:t> </a:t>
             </a:r>
-            <a:endParaRPr/>
+            <a:endParaRPr b="0" sz="900">
+              <a:solidFill>
+                <a:schemeClr val="dk2"/>
+              </a:solidFill>
+            </a:endParaRPr>
           </a:p>
         </p:txBody>
       </p:sp>
       <p:sp>
         <p:nvSpPr>
-          <p:cNvPr id="115" name="Google Shape;115;p16"/>
+          <p:cNvPr id="130" name="Google Shape;130;p16"/>
           <p:cNvSpPr txBox="1"/>
           <p:nvPr>
             <p:ph idx="1" type="body"/>
@@ -15422,285 +16024,6 @@
 </file>
 
 <file path=ppt/theme/theme1.xml><?xml version="1.0" encoding="utf-8"?>
-<a:theme xmlns:a="http://schemas.openxmlformats.org/drawingml/2006/main" xmlns:r="http://schemas.openxmlformats.org/officeDocument/2006/relationships" name="COACH Slides Template">
-  <a:themeElements>
-    <a:clrScheme name="Simple Light">
-      <a:dk1>
-        <a:srgbClr val="000000"/>
-      </a:dk1>
-      <a:lt1>
-        <a:srgbClr val="FFFFFF"/>
-      </a:lt1>
-      <a:dk2>
-        <a:srgbClr val="404040"/>
-      </a:dk2>
-      <a:lt2>
-        <a:srgbClr val="808080"/>
-      </a:lt2>
-      <a:accent1>
-        <a:srgbClr val="D0D0D0"/>
-      </a:accent1>
-      <a:accent2>
-        <a:srgbClr val="4169E1"/>
-      </a:accent2>
-      <a:accent3>
-        <a:srgbClr val="D50D01"/>
-      </a:accent3>
-      <a:accent4>
-        <a:srgbClr val="FEB612"/>
-      </a:accent4>
-      <a:accent5>
-        <a:srgbClr val="4CAF50"/>
-      </a:accent5>
-      <a:accent6>
-        <a:srgbClr val="8E44AD"/>
-      </a:accent6>
-      <a:hlink>
-        <a:srgbClr val="34A3C5"/>
-      </a:hlink>
-      <a:folHlink>
-        <a:srgbClr val="0097A7"/>
-      </a:folHlink>
-    </a:clrScheme>
-    <a:fontScheme name="Office">
-      <a:majorFont>
-        <a:latin typeface="Arial"/>
-        <a:ea typeface=""/>
-        <a:cs typeface=""/>
-        <a:font script="Jpan" typeface="ＭＳ Ｐゴシック"/>
-        <a:font script="Hang" typeface="맑은 고딕"/>
-        <a:font script="Hans" typeface="宋体"/>
-        <a:font script="Hant" typeface="新細明體"/>
-        <a:font script="Arab" typeface="Times New Roman"/>
-        <a:font script="Hebr" typeface="Times New Roman"/>
-        <a:font script="Thai" typeface="Angsana New"/>
-        <a:font script="Ethi" typeface="Nyala"/>
-        <a:font script="Beng" typeface="Vrinda"/>
-        <a:font script="Gujr" typeface="Shruti"/>
-        <a:font script="Khmr" typeface="MoolBoran"/>
-        <a:font script="Knda" typeface="Tunga"/>
-        <a:font script="Guru" typeface="Raavi"/>
-        <a:font script="Cans" typeface="Euphemia"/>
-        <a:font script="Cher" typeface="Plantagenet Cherokee"/>
-        <a:font script="Yiii" typeface="Microsoft Yi Baiti"/>
-        <a:font script="Tibt" typeface="Microsoft Himalaya"/>
-        <a:font script="Thaa" typeface="MV Boli"/>
-        <a:font script="Deva" typeface="Mangal"/>
-        <a:font script="Telu" typeface="Gautami"/>
-        <a:font script="Taml" typeface="Latha"/>
-        <a:font script="Syrc" typeface="Estrangelo Edessa"/>
-        <a:font script="Orya" typeface="Kalinga"/>
-        <a:font script="Mlym" typeface="Kartika"/>
-        <a:font script="Laoo" typeface="DokChampa"/>
-        <a:font script="Sinh" typeface="Iskoola Pota"/>
-        <a:font script="Mong" typeface="Mongolian Baiti"/>
-        <a:font script="Viet" typeface="Times New Roman"/>
-        <a:font script="Uigh" typeface="Microsoft Uighur"/>
-        <a:font script="Geor" typeface="Sylfaen"/>
-      </a:majorFont>
-      <a:minorFont>
-        <a:latin typeface="Arial"/>
-        <a:ea typeface=""/>
-        <a:cs typeface=""/>
-        <a:font script="Jpan" typeface="ＭＳ Ｐゴシック"/>
-        <a:font script="Hang" typeface="맑은 고딕"/>
-        <a:font script="Hans" typeface="宋体"/>
-        <a:font script="Hant" typeface="新細明體"/>
-        <a:font script="Arab" typeface="Arial"/>
-        <a:font script="Hebr" typeface="Arial"/>
-        <a:font script="Thai" typeface="Cordia New"/>
-        <a:font script="Ethi" typeface="Nyala"/>
-        <a:font script="Beng" typeface="Vrinda"/>
-        <a:font script="Gujr" typeface="Shruti"/>
-        <a:font script="Khmr" typeface="DaunPenh"/>
-        <a:font script="Knda" typeface="Tunga"/>
-        <a:font script="Guru" typeface="Raavi"/>
-        <a:font script="Cans" typeface="Euphemia"/>
-        <a:font script="Cher" typeface="Plantagenet Cherokee"/>
-        <a:font script="Yiii" typeface="Microsoft Yi Baiti"/>
-        <a:font script="Tibt" typeface="Microsoft Himalaya"/>
-        <a:font script="Thaa" typeface="MV Boli"/>
-        <a:font script="Deva" typeface="Mangal"/>
-        <a:font script="Telu" typeface="Gautami"/>
-        <a:font script="Taml" typeface="Latha"/>
-        <a:font script="Syrc" typeface="Estrangelo Edessa"/>
-        <a:font script="Orya" typeface="Kalinga"/>
-        <a:font script="Mlym" typeface="Kartika"/>
-        <a:font script="Laoo" typeface="DokChampa"/>
-        <a:font script="Sinh" typeface="Iskoola Pota"/>
-        <a:font script="Mong" typeface="Mongolian Baiti"/>
-        <a:font script="Viet" typeface="Arial"/>
-        <a:font script="Uigh" typeface="Microsoft Uighur"/>
-        <a:font script="Geor" typeface="Sylfaen"/>
-      </a:minorFont>
-    </a:fontScheme>
-    <a:fmtScheme name="Office">
-      <a:fillStyleLst>
-        <a:solidFill>
-          <a:schemeClr val="phClr"/>
-        </a:solidFill>
-        <a:gradFill rotWithShape="1">
-          <a:gsLst>
-            <a:gs pos="0">
-              <a:schemeClr val="phClr">
-                <a:tint val="50000"/>
-                <a:satMod val="300000"/>
-              </a:schemeClr>
-            </a:gs>
-            <a:gs pos="35000">
-              <a:schemeClr val="phClr">
-                <a:tint val="37000"/>
-                <a:satMod val="300000"/>
-              </a:schemeClr>
-            </a:gs>
-            <a:gs pos="100000">
-              <a:schemeClr val="phClr">
-                <a:tint val="15000"/>
-                <a:satMod val="350000"/>
-              </a:schemeClr>
-            </a:gs>
-          </a:gsLst>
-          <a:lin ang="16200000" scaled="1"/>
-        </a:gradFill>
-        <a:gradFill rotWithShape="1">
-          <a:gsLst>
-            <a:gs pos="0">
-              <a:schemeClr val="phClr">
-                <a:tint val="100000"/>
-                <a:shade val="100000"/>
-                <a:satMod val="130000"/>
-              </a:schemeClr>
-            </a:gs>
-            <a:gs pos="100000">
-              <a:schemeClr val="phClr">
-                <a:tint val="50000"/>
-                <a:shade val="100000"/>
-                <a:satMod val="350000"/>
-              </a:schemeClr>
-            </a:gs>
-          </a:gsLst>
-          <a:lin ang="16200000" scaled="0"/>
-        </a:gradFill>
-      </a:fillStyleLst>
-      <a:lnStyleLst>
-        <a:ln w="9525" cap="flat" cmpd="sng" algn="ctr">
-          <a:solidFill>
-            <a:schemeClr val="phClr">
-              <a:shade val="95000"/>
-              <a:satMod val="105000"/>
-            </a:schemeClr>
-          </a:solidFill>
-          <a:prstDash val="solid"/>
-        </a:ln>
-        <a:ln w="25400" cap="flat" cmpd="sng" algn="ctr">
-          <a:solidFill>
-            <a:schemeClr val="phClr"/>
-          </a:solidFill>
-          <a:prstDash val="solid"/>
-        </a:ln>
-        <a:ln w="38100" cap="flat" cmpd="sng" algn="ctr">
-          <a:solidFill>
-            <a:schemeClr val="phClr"/>
-          </a:solidFill>
-          <a:prstDash val="solid"/>
-        </a:ln>
-      </a:lnStyleLst>
-      <a:effectStyleLst>
-        <a:effectStyle>
-          <a:effectLst>
-            <a:outerShdw blurRad="40000" dist="20000" dir="5400000" rotWithShape="0">
-              <a:srgbClr val="000000">
-                <a:alpha val="38000"/>
-              </a:srgbClr>
-            </a:outerShdw>
-          </a:effectLst>
-        </a:effectStyle>
-        <a:effectStyle>
-          <a:effectLst>
-            <a:outerShdw blurRad="40000" dist="23000" dir="5400000" rotWithShape="0">
-              <a:srgbClr val="000000">
-                <a:alpha val="35000"/>
-              </a:srgbClr>
-            </a:outerShdw>
-          </a:effectLst>
-        </a:effectStyle>
-        <a:effectStyle>
-          <a:effectLst>
-            <a:outerShdw blurRad="40000" dist="23000" dir="5400000" rotWithShape="0">
-              <a:srgbClr val="000000">
-                <a:alpha val="35000"/>
-              </a:srgbClr>
-            </a:outerShdw>
-          </a:effectLst>
-          <a:scene3d>
-            <a:camera prst="orthographicFront">
-              <a:rot lat="0" lon="0" rev="0"/>
-            </a:camera>
-            <a:lightRig rig="threePt" dir="t">
-              <a:rot lat="0" lon="0" rev="1200000"/>
-            </a:lightRig>
-          </a:scene3d>
-          <a:sp3d>
-            <a:bevelT w="63500" h="25400"/>
-          </a:sp3d>
-        </a:effectStyle>
-      </a:effectStyleLst>
-      <a:bgFillStyleLst>
-        <a:solidFill>
-          <a:schemeClr val="phClr"/>
-        </a:solidFill>
-        <a:gradFill rotWithShape="1">
-          <a:gsLst>
-            <a:gs pos="0">
-              <a:schemeClr val="phClr">
-                <a:tint val="40000"/>
-                <a:satMod val="350000"/>
-              </a:schemeClr>
-            </a:gs>
-            <a:gs pos="40000">
-              <a:schemeClr val="phClr">
-                <a:tint val="45000"/>
-                <a:shade val="99000"/>
-                <a:satMod val="350000"/>
-              </a:schemeClr>
-            </a:gs>
-            <a:gs pos="100000">
-              <a:schemeClr val="phClr">
-                <a:shade val="20000"/>
-                <a:satMod val="255000"/>
-              </a:schemeClr>
-            </a:gs>
-          </a:gsLst>
-          <a:path path="circle">
-            <a:fillToRect l="50000" t="-80000" r="50000" b="180000"/>
-          </a:path>
-        </a:gradFill>
-        <a:gradFill rotWithShape="1">
-          <a:gsLst>
-            <a:gs pos="0">
-              <a:schemeClr val="phClr">
-                <a:tint val="80000"/>
-                <a:satMod val="300000"/>
-              </a:schemeClr>
-            </a:gs>
-            <a:gs pos="100000">
-              <a:schemeClr val="phClr">
-                <a:shade val="30000"/>
-                <a:satMod val="200000"/>
-              </a:schemeClr>
-            </a:gs>
-          </a:gsLst>
-          <a:path path="circle">
-            <a:fillToRect l="50000" t="50000" r="50000" b="50000"/>
-          </a:path>
-        </a:gradFill>
-      </a:bgFillStyleLst>
-    </a:fmtScheme>
-  </a:themeElements>
-</a:theme>
-</file>
-
-<file path=ppt/theme/theme2.xml><?xml version="1.0" encoding="utf-8"?>
 <a:theme xmlns:a="http://schemas.openxmlformats.org/drawingml/2006/main" xmlns:r="http://schemas.openxmlformats.org/officeDocument/2006/relationships">
   <a:themeElements>
     <a:clrScheme name="Default">
@@ -15977,4 +16300,283 @@
     </a:fmtScheme>
   </a:themeElements>
 </a:theme>
+</file>
+
+<file path=ppt/theme/theme2.xml><?xml version="1.0" encoding="utf-8"?>
+<a:theme xmlns:a="http://schemas.openxmlformats.org/drawingml/2006/main" xmlns:r="http://schemas.openxmlformats.org/officeDocument/2006/relationships" name="POSS Slides Template">
+  <a:themeElements>
+    <a:clrScheme name="Simple Light">
+      <a:dk1>
+        <a:srgbClr val="000000"/>
+      </a:dk1>
+      <a:lt1>
+        <a:srgbClr val="FFFFFF"/>
+      </a:lt1>
+      <a:dk2>
+        <a:srgbClr val="404040"/>
+      </a:dk2>
+      <a:lt2>
+        <a:srgbClr val="808080"/>
+      </a:lt2>
+      <a:accent1>
+        <a:srgbClr val="D0D0D0"/>
+      </a:accent1>
+      <a:accent2>
+        <a:srgbClr val="4169E1"/>
+      </a:accent2>
+      <a:accent3>
+        <a:srgbClr val="4CAF50"/>
+      </a:accent3>
+      <a:accent4>
+        <a:srgbClr val="FEB612"/>
+      </a:accent4>
+      <a:accent5>
+        <a:srgbClr val="F36838"/>
+      </a:accent5>
+      <a:accent6>
+        <a:srgbClr val="8E44AD"/>
+      </a:accent6>
+      <a:hlink>
+        <a:srgbClr val="1E90FF"/>
+      </a:hlink>
+      <a:folHlink>
+        <a:srgbClr val="0097A7"/>
+      </a:folHlink>
+    </a:clrScheme>
+    <a:fontScheme name="Office">
+      <a:majorFont>
+        <a:latin typeface="Arial"/>
+        <a:ea typeface=""/>
+        <a:cs typeface=""/>
+        <a:font script="Jpan" typeface="ＭＳ Ｐゴシック"/>
+        <a:font script="Hang" typeface="맑은 고딕"/>
+        <a:font script="Hans" typeface="宋体"/>
+        <a:font script="Hant" typeface="新細明體"/>
+        <a:font script="Arab" typeface="Times New Roman"/>
+        <a:font script="Hebr" typeface="Times New Roman"/>
+        <a:font script="Thai" typeface="Angsana New"/>
+        <a:font script="Ethi" typeface="Nyala"/>
+        <a:font script="Beng" typeface="Vrinda"/>
+        <a:font script="Gujr" typeface="Shruti"/>
+        <a:font script="Khmr" typeface="MoolBoran"/>
+        <a:font script="Knda" typeface="Tunga"/>
+        <a:font script="Guru" typeface="Raavi"/>
+        <a:font script="Cans" typeface="Euphemia"/>
+        <a:font script="Cher" typeface="Plantagenet Cherokee"/>
+        <a:font script="Yiii" typeface="Microsoft Yi Baiti"/>
+        <a:font script="Tibt" typeface="Microsoft Himalaya"/>
+        <a:font script="Thaa" typeface="MV Boli"/>
+        <a:font script="Deva" typeface="Mangal"/>
+        <a:font script="Telu" typeface="Gautami"/>
+        <a:font script="Taml" typeface="Latha"/>
+        <a:font script="Syrc" typeface="Estrangelo Edessa"/>
+        <a:font script="Orya" typeface="Kalinga"/>
+        <a:font script="Mlym" typeface="Kartika"/>
+        <a:font script="Laoo" typeface="DokChampa"/>
+        <a:font script="Sinh" typeface="Iskoola Pota"/>
+        <a:font script="Mong" typeface="Mongolian Baiti"/>
+        <a:font script="Viet" typeface="Times New Roman"/>
+        <a:font script="Uigh" typeface="Microsoft Uighur"/>
+        <a:font script="Geor" typeface="Sylfaen"/>
+      </a:majorFont>
+      <a:minorFont>
+        <a:latin typeface="Arial"/>
+        <a:ea typeface=""/>
+        <a:cs typeface=""/>
+        <a:font script="Jpan" typeface="ＭＳ Ｐゴシック"/>
+        <a:font script="Hang" typeface="맑은 고딕"/>
+        <a:font script="Hans" typeface="宋体"/>
+        <a:font script="Hant" typeface="新細明體"/>
+        <a:font script="Arab" typeface="Arial"/>
+        <a:font script="Hebr" typeface="Arial"/>
+        <a:font script="Thai" typeface="Cordia New"/>
+        <a:font script="Ethi" typeface="Nyala"/>
+        <a:font script="Beng" typeface="Vrinda"/>
+        <a:font script="Gujr" typeface="Shruti"/>
+        <a:font script="Khmr" typeface="DaunPenh"/>
+        <a:font script="Knda" typeface="Tunga"/>
+        <a:font script="Guru" typeface="Raavi"/>
+        <a:font script="Cans" typeface="Euphemia"/>
+        <a:font script="Cher" typeface="Plantagenet Cherokee"/>
+        <a:font script="Yiii" typeface="Microsoft Yi Baiti"/>
+        <a:font script="Tibt" typeface="Microsoft Himalaya"/>
+        <a:font script="Thaa" typeface="MV Boli"/>
+        <a:font script="Deva" typeface="Mangal"/>
+        <a:font script="Telu" typeface="Gautami"/>
+        <a:font script="Taml" typeface="Latha"/>
+        <a:font script="Syrc" typeface="Estrangelo Edessa"/>
+        <a:font script="Orya" typeface="Kalinga"/>
+        <a:font script="Mlym" typeface="Kartika"/>
+        <a:font script="Laoo" typeface="DokChampa"/>
+        <a:font script="Sinh" typeface="Iskoola Pota"/>
+        <a:font script="Mong" typeface="Mongolian Baiti"/>
+        <a:font script="Viet" typeface="Arial"/>
+        <a:font script="Uigh" typeface="Microsoft Uighur"/>
+        <a:font script="Geor" typeface="Sylfaen"/>
+      </a:minorFont>
+    </a:fontScheme>
+    <a:fmtScheme name="Office">
+      <a:fillStyleLst>
+        <a:solidFill>
+          <a:schemeClr val="phClr"/>
+        </a:solidFill>
+        <a:gradFill rotWithShape="1">
+          <a:gsLst>
+            <a:gs pos="0">
+              <a:schemeClr val="phClr">
+                <a:tint val="50000"/>
+                <a:satMod val="300000"/>
+              </a:schemeClr>
+            </a:gs>
+            <a:gs pos="35000">
+              <a:schemeClr val="phClr">
+                <a:tint val="37000"/>
+                <a:satMod val="300000"/>
+              </a:schemeClr>
+            </a:gs>
+            <a:gs pos="100000">
+              <a:schemeClr val="phClr">
+                <a:tint val="15000"/>
+                <a:satMod val="350000"/>
+              </a:schemeClr>
+            </a:gs>
+          </a:gsLst>
+          <a:lin ang="16200000" scaled="1"/>
+        </a:gradFill>
+        <a:gradFill rotWithShape="1">
+          <a:gsLst>
+            <a:gs pos="0">
+              <a:schemeClr val="phClr">
+                <a:tint val="100000"/>
+                <a:shade val="100000"/>
+                <a:satMod val="130000"/>
+              </a:schemeClr>
+            </a:gs>
+            <a:gs pos="100000">
+              <a:schemeClr val="phClr">
+                <a:tint val="50000"/>
+                <a:shade val="100000"/>
+                <a:satMod val="350000"/>
+              </a:schemeClr>
+            </a:gs>
+          </a:gsLst>
+          <a:lin ang="16200000" scaled="0"/>
+        </a:gradFill>
+      </a:fillStyleLst>
+      <a:lnStyleLst>
+        <a:ln w="9525" cap="flat" cmpd="sng" algn="ctr">
+          <a:solidFill>
+            <a:schemeClr val="phClr">
+              <a:shade val="95000"/>
+              <a:satMod val="105000"/>
+            </a:schemeClr>
+          </a:solidFill>
+          <a:prstDash val="solid"/>
+        </a:ln>
+        <a:ln w="25400" cap="flat" cmpd="sng" algn="ctr">
+          <a:solidFill>
+            <a:schemeClr val="phClr"/>
+          </a:solidFill>
+          <a:prstDash val="solid"/>
+        </a:ln>
+        <a:ln w="38100" cap="flat" cmpd="sng" algn="ctr">
+          <a:solidFill>
+            <a:schemeClr val="phClr"/>
+          </a:solidFill>
+          <a:prstDash val="solid"/>
+        </a:ln>
+      </a:lnStyleLst>
+      <a:effectStyleLst>
+        <a:effectStyle>
+          <a:effectLst>
+            <a:outerShdw blurRad="40000" dist="20000" dir="5400000" rotWithShape="0">
+              <a:srgbClr val="000000">
+                <a:alpha val="38000"/>
+              </a:srgbClr>
+            </a:outerShdw>
+          </a:effectLst>
+        </a:effectStyle>
+        <a:effectStyle>
+          <a:effectLst>
+            <a:outerShdw blurRad="40000" dist="23000" dir="5400000" rotWithShape="0">
+              <a:srgbClr val="000000">
+                <a:alpha val="35000"/>
+              </a:srgbClr>
+            </a:outerShdw>
+          </a:effectLst>
+        </a:effectStyle>
+        <a:effectStyle>
+          <a:effectLst>
+            <a:outerShdw blurRad="40000" dist="23000" dir="5400000" rotWithShape="0">
+              <a:srgbClr val="000000">
+                <a:alpha val="35000"/>
+              </a:srgbClr>
+            </a:outerShdw>
+          </a:effectLst>
+          <a:scene3d>
+            <a:camera prst="orthographicFront">
+              <a:rot lat="0" lon="0" rev="0"/>
+            </a:camera>
+            <a:lightRig rig="threePt" dir="t">
+              <a:rot lat="0" lon="0" rev="1200000"/>
+            </a:lightRig>
+          </a:scene3d>
+          <a:sp3d>
+            <a:bevelT w="63500" h="25400"/>
+          </a:sp3d>
+        </a:effectStyle>
+      </a:effectStyleLst>
+      <a:bgFillStyleLst>
+        <a:solidFill>
+          <a:schemeClr val="phClr"/>
+        </a:solidFill>
+        <a:gradFill rotWithShape="1">
+          <a:gsLst>
+            <a:gs pos="0">
+              <a:schemeClr val="phClr">
+                <a:tint val="40000"/>
+                <a:satMod val="350000"/>
+              </a:schemeClr>
+            </a:gs>
+            <a:gs pos="40000">
+              <a:schemeClr val="phClr">
+                <a:tint val="45000"/>
+                <a:shade val="99000"/>
+                <a:satMod val="350000"/>
+              </a:schemeClr>
+            </a:gs>
+            <a:gs pos="100000">
+              <a:schemeClr val="phClr">
+                <a:shade val="20000"/>
+                <a:satMod val="255000"/>
+              </a:schemeClr>
+            </a:gs>
+          </a:gsLst>
+          <a:path path="circle">
+            <a:fillToRect l="50000" t="-80000" r="50000" b="180000"/>
+          </a:path>
+        </a:gradFill>
+        <a:gradFill rotWithShape="1">
+          <a:gsLst>
+            <a:gs pos="0">
+              <a:schemeClr val="phClr">
+                <a:tint val="80000"/>
+                <a:satMod val="300000"/>
+              </a:schemeClr>
+            </a:gs>
+            <a:gs pos="100000">
+              <a:schemeClr val="phClr">
+                <a:shade val="30000"/>
+                <a:satMod val="200000"/>
+              </a:schemeClr>
+            </a:gs>
+          </a:gsLst>
+          <a:path path="circle">
+            <a:fillToRect l="50000" t="50000" r="50000" b="50000"/>
+          </a:path>
+        </a:gradFill>
+      </a:bgFillStyleLst>
+    </a:fmtScheme>
+  </a:themeElements>
+</a:theme>
 </file>
</xml_diff>